<commit_message>
Polymorphims insteda of condition
</commit_message>
<xml_diff>
--- a/docs/noif.pptx
+++ b/docs/noif.pptx
@@ -6,14 +6,13 @@
     <p:sldMasterId id="2147483648" r:id="rId2"/>
   </p:sldMasterIdLst>
   <p:notesMasterIdLst>
-    <p:notesMasterId r:id="rId8"/>
+    <p:notesMasterId r:id="rId7"/>
   </p:notesMasterIdLst>
   <p:sldIdLst>
     <p:sldId id="264" r:id="rId3"/>
     <p:sldId id="311" r:id="rId4"/>
     <p:sldId id="288" r:id="rId5"/>
-    <p:sldId id="310" r:id="rId6"/>
-    <p:sldId id="291" r:id="rId7"/>
+    <p:sldId id="312" r:id="rId6"/>
   </p:sldIdLst>
   <p:sldSz cx="9144000" cy="6858000" type="screen4x3"/>
   <p:notesSz cx="6858000" cy="9144000"/>
@@ -925,91 +924,7 @@
     </p:spTree>
     <p:extLst>
       <p:ext uri="{BB962C8B-B14F-4D97-AF65-F5344CB8AC3E}">
-        <p14:creationId xmlns:p14="http://schemas.microsoft.com/office/powerpoint/2010/main" val="3791005458"/>
-      </p:ext>
-    </p:extLst>
-  </p:cSld>
-  <p:clrMapOvr>
-    <a:masterClrMapping/>
-  </p:clrMapOvr>
-</p:notes>
-</file>
-
-<file path=ppt/notesSlides/notesSlide5.xml><?xml version="1.0" encoding="utf-8"?>
-<p:notes xmlns:a="http://schemas.openxmlformats.org/drawingml/2006/main" xmlns:r="http://schemas.openxmlformats.org/officeDocument/2006/relationships" xmlns:p="http://schemas.openxmlformats.org/presentationml/2006/main">
-  <p:cSld>
-    <p:spTree>
-      <p:nvGrpSpPr>
-        <p:cNvPr id="1" name=""/>
-        <p:cNvGrpSpPr/>
-        <p:nvPr/>
-      </p:nvGrpSpPr>
-      <p:grpSpPr>
-        <a:xfrm>
-          <a:off x="0" y="0"/>
-          <a:ext cx="0" cy="0"/>
-          <a:chOff x="0" y="0"/>
-          <a:chExt cx="0" cy="0"/>
-        </a:xfrm>
-      </p:grpSpPr>
-      <p:sp>
-        <p:nvSpPr>
-          <p:cNvPr id="2" name="Slide Image Placeholder 1"/>
-          <p:cNvSpPr>
-            <a:spLocks noGrp="1" noRot="1" noChangeAspect="1"/>
-          </p:cNvSpPr>
-          <p:nvPr>
-            <p:ph type="sldImg"/>
-          </p:nvPr>
-        </p:nvSpPr>
-        <p:spPr/>
-      </p:sp>
-      <p:sp>
-        <p:nvSpPr>
-          <p:cNvPr id="3" name="Notes Placeholder 2"/>
-          <p:cNvSpPr>
-            <a:spLocks noGrp="1"/>
-          </p:cNvSpPr>
-          <p:nvPr>
-            <p:ph type="body" idx="1"/>
-          </p:nvPr>
-        </p:nvSpPr>
-        <p:spPr/>
-        <p:txBody>
-          <a:bodyPr/>
-          <a:lstStyle/>
-          <a:p>
-            <a:endParaRPr lang="it-IT" dirty="0"/>
-          </a:p>
-        </p:txBody>
-      </p:sp>
-      <p:sp>
-        <p:nvSpPr>
-          <p:cNvPr id="4" name="Slide Number Placeholder 3"/>
-          <p:cNvSpPr>
-            <a:spLocks noGrp="1"/>
-          </p:cNvSpPr>
-          <p:nvPr>
-            <p:ph type="sldNum" sz="quarter" idx="10"/>
-          </p:nvPr>
-        </p:nvSpPr>
-        <p:spPr/>
-        <p:txBody>
-          <a:bodyPr/>
-          <a:lstStyle/>
-          <a:p>
-            <a:fld id="{2C5A56FE-B2E8-4285-8F31-2AEEB8EA39C6}" type="slidenum">
-              <a:rPr lang="en-GB" smtClean="0"/>
-              <a:t>5</a:t>
-            </a:fld>
-            <a:endParaRPr lang="en-GB"/>
-          </a:p>
-        </p:txBody>
-      </p:sp>
-    </p:spTree>
-    <p:extLst>
-      <p:ext uri="{BB962C8B-B14F-4D97-AF65-F5344CB8AC3E}">
-        <p14:creationId xmlns:p14="http://schemas.microsoft.com/office/powerpoint/2010/main" val="4071013871"/>
+        <p14:creationId xmlns:p14="http://schemas.microsoft.com/office/powerpoint/2010/main" val="2576243999"/>
       </p:ext>
     </p:extLst>
   </p:cSld>
@@ -3721,8 +3636,9 @@
           <a:p>
             <a:r>
               <a:rPr lang="en-US" sz="2400" dirty="0" smtClean="0"/>
-              <a:t>What is SOLID?</a:t>
+              <a:t>No IF</a:t>
             </a:r>
+            <a:endParaRPr lang="en-US" sz="2400" dirty="0" smtClean="0"/>
           </a:p>
           <a:p>
             <a:endParaRPr lang="en-US" sz="1800" dirty="0" smtClean="0"/>
@@ -3741,7 +3657,7 @@
         <p:spPr>
           <a:xfrm>
             <a:off x="621372" y="1501213"/>
-            <a:ext cx="8210747" cy="4647426"/>
+            <a:ext cx="8210747" cy="2800767"/>
           </a:xfrm>
           <a:prstGeom prst="rect">
             <a:avLst/>
@@ -3764,2293 +3680,104 @@
             </a:endParaRPr>
           </a:p>
           <a:p>
-            <a:r>
-              <a:rPr lang="en-GB" sz="2400" b="1" dirty="0" smtClean="0">
-                <a:latin typeface="Chronicle Display" pitchFamily="50" charset="0"/>
-              </a:rPr>
-              <a:t>SOLID</a:t>
-            </a:r>
-            <a:r>
-              <a:rPr lang="en-GB" sz="1600" u="sng" dirty="0" smtClean="0">
-                <a:latin typeface="Chronicle Display" pitchFamily="50" charset="0"/>
-              </a:rPr>
-              <a:t> </a:t>
-            </a:r>
+            <a:pPr marL="285750" indent="-285750">
+              <a:buFontTx/>
+              <a:buChar char="-"/>
+            </a:pPr>
             <a:r>
               <a:rPr lang="en-GB" sz="1600" dirty="0" smtClean="0">
                 <a:latin typeface="Chronicle Display" pitchFamily="50" charset="0"/>
               </a:rPr>
-              <a:t>is an acronym for five OOD principles by Robert C. Martin (uncle bob)</a:t>
+              <a:t>Let programming language functional extension help you</a:t>
             </a:r>
-            <a:endParaRPr lang="en-GB" sz="1600" u="sng" dirty="0">
-              <a:latin typeface="Chronicle Display" pitchFamily="50" charset="0"/>
-            </a:endParaRPr>
-          </a:p>
-          <a:p>
-            <a:endParaRPr lang="en-GB" sz="1600" u="sng" dirty="0" smtClean="0">
-              <a:latin typeface="Chronicle Display" pitchFamily="50" charset="0"/>
-            </a:endParaRPr>
-          </a:p>
-          <a:p>
+          </a:p>
+          <a:p>
+            <a:pPr marL="285750" indent="-285750">
+              <a:buFontTx/>
+              <a:buChar char="-"/>
+            </a:pPr>
             <a:endParaRPr lang="en-GB" sz="1600" dirty="0" smtClean="0">
               <a:latin typeface="Chronicle Display" pitchFamily="50" charset="0"/>
             </a:endParaRPr>
           </a:p>
           <a:p>
+            <a:pPr marL="285750" indent="-285750">
+              <a:buFontTx/>
+              <a:buChar char="-"/>
+            </a:pPr>
             <a:r>
               <a:rPr lang="en-GB" sz="1600" dirty="0" smtClean="0">
                 <a:latin typeface="Chronicle Display" pitchFamily="50" charset="0"/>
               </a:rPr>
-              <a:t>These principles, when applied, help developer in</a:t>
+              <a:t>Use a dictionary of objects when possible</a:t>
             </a:r>
           </a:p>
           <a:p>
-            <a:r>
-              <a:rPr lang="en-GB" sz="1600" dirty="0">
-                <a:latin typeface="Chronicle Display" pitchFamily="50" charset="0"/>
-              </a:rPr>
-              <a:t>	</a:t>
-            </a:r>
+            <a:pPr marL="285750" indent="-285750">
+              <a:buFontTx/>
+              <a:buChar char="-"/>
+            </a:pPr>
             <a:endParaRPr lang="en-GB" sz="1600" dirty="0" smtClean="0">
               <a:latin typeface="Chronicle Display" pitchFamily="50" charset="0"/>
             </a:endParaRPr>
           </a:p>
           <a:p>
-            <a:r>
-              <a:rPr lang="en-GB" sz="1600" dirty="0">
-                <a:latin typeface="Chronicle Display" pitchFamily="50" charset="0"/>
-              </a:rPr>
-              <a:t>	</a:t>
-            </a:r>
+            <a:pPr marL="285750" indent="-285750">
+              <a:buFontTx/>
+              <a:buChar char="-"/>
+            </a:pPr>
             <a:r>
               <a:rPr lang="en-GB" sz="1600" dirty="0" smtClean="0">
                 <a:latin typeface="Chronicle Display" pitchFamily="50" charset="0"/>
               </a:rPr>
-              <a:t>easily maintain software</a:t>
+              <a:t>Replace conditional with polymorphism</a:t>
             </a:r>
           </a:p>
           <a:p>
-            <a:r>
-              <a:rPr lang="en-GB" sz="1600" dirty="0">
-                <a:latin typeface="Chronicle Display" pitchFamily="50" charset="0"/>
-              </a:rPr>
-              <a:t>	</a:t>
-            </a:r>
-            <a:endParaRPr lang="en-GB" sz="1600" dirty="0" smtClean="0">
+            <a:pPr marL="285750" indent="-285750">
+              <a:buFontTx/>
+              <a:buChar char="-"/>
+            </a:pPr>
+            <a:endParaRPr lang="en-GB" sz="1600" dirty="0">
               <a:latin typeface="Chronicle Display" pitchFamily="50" charset="0"/>
             </a:endParaRPr>
           </a:p>
           <a:p>
-            <a:r>
-              <a:rPr lang="en-GB" sz="1600" dirty="0">
-                <a:latin typeface="Chronicle Display" pitchFamily="50" charset="0"/>
-              </a:rPr>
-              <a:t>	</a:t>
-            </a:r>
+            <a:pPr marL="285750" indent="-285750">
+              <a:buFontTx/>
+              <a:buChar char="-"/>
+            </a:pPr>
             <a:r>
               <a:rPr lang="en-GB" sz="1600" dirty="0" smtClean="0">
                 <a:latin typeface="Chronicle Display" pitchFamily="50" charset="0"/>
               </a:rPr>
-              <a:t>extend software</a:t>
+              <a:t>Use dependency injection to resolve the right concrete instance instead of passing flags</a:t>
             </a:r>
           </a:p>
           <a:p>
+            <a:pPr marL="285750" indent="-285750">
+              <a:buFontTx/>
+              <a:buChar char="-"/>
+            </a:pPr>
             <a:endParaRPr lang="en-GB" sz="1600" dirty="0">
               <a:latin typeface="Chronicle Display" pitchFamily="50" charset="0"/>
             </a:endParaRPr>
           </a:p>
           <a:p>
-            <a:r>
-              <a:rPr lang="en-GB" sz="1600" dirty="0" smtClean="0">
-                <a:latin typeface="Chronicle Display" pitchFamily="50" charset="0"/>
-              </a:rPr>
-              <a:t>	avoid smells</a:t>
-            </a:r>
-          </a:p>
-          <a:p>
-            <a:endParaRPr lang="en-GB" sz="1600" dirty="0">
+            <a:pPr marL="285750" indent="-285750">
+              <a:buFontTx/>
+              <a:buChar char="-"/>
+            </a:pPr>
+            <a:endParaRPr lang="en-GB" sz="1600" dirty="0" smtClean="0">
               <a:latin typeface="Chronicle Display" pitchFamily="50" charset="0"/>
             </a:endParaRPr>
-          </a:p>
-          <a:p>
-            <a:r>
-              <a:rPr lang="en-GB" sz="1600" dirty="0" smtClean="0">
-                <a:latin typeface="Chronicle Display" pitchFamily="50" charset="0"/>
-              </a:rPr>
-              <a:t>	easily refactor code</a:t>
-            </a:r>
-          </a:p>
-          <a:p>
-            <a:endParaRPr lang="en-GB" sz="1600" dirty="0">
-              <a:latin typeface="Chronicle Display" pitchFamily="50" charset="0"/>
-            </a:endParaRPr>
-          </a:p>
-          <a:p>
-            <a:r>
-              <a:rPr lang="en-GB" sz="1600" dirty="0" smtClean="0">
-                <a:latin typeface="Chronicle Display" pitchFamily="50" charset="0"/>
-              </a:rPr>
-              <a:t>	achieve low coupling, high cohesion and string encapsulation</a:t>
-            </a:r>
-          </a:p>
-          <a:p>
-            <a:endParaRPr lang="en-GB" sz="1600" dirty="0">
-              <a:latin typeface="Chronicle Display" pitchFamily="50" charset="0"/>
-            </a:endParaRPr>
-          </a:p>
-          <a:p>
-            <a:r>
-              <a:rPr lang="en-GB" sz="1600" dirty="0" smtClean="0">
-                <a:latin typeface="Chronicle Display" pitchFamily="50" charset="0"/>
-              </a:rPr>
-              <a:t>	software easier to read, easier to understand and easier to change</a:t>
-            </a:r>
           </a:p>
         </p:txBody>
       </p:sp>
     </p:spTree>
     <p:extLst>
       <p:ext uri="{BB962C8B-B14F-4D97-AF65-F5344CB8AC3E}">
-        <p14:creationId xmlns:p14="http://schemas.microsoft.com/office/powerpoint/2010/main" val="944026845"/>
-      </p:ext>
-    </p:extLst>
-  </p:cSld>
-  <p:clrMapOvr>
-    <a:masterClrMapping/>
-  </p:clrMapOvr>
-  <p:timing>
-    <p:tnLst>
-      <p:par>
-        <p:cTn id="1" dur="indefinite" restart="never" nodeType="tmRoot"/>
-      </p:par>
-    </p:tnLst>
-  </p:timing>
-</p:sld>
-</file>
-
-<file path=ppt/slides/slide5.xml><?xml version="1.0" encoding="utf-8"?>
-<p:sld xmlns:a="http://schemas.openxmlformats.org/drawingml/2006/main" xmlns:r="http://schemas.openxmlformats.org/officeDocument/2006/relationships" xmlns:p="http://schemas.openxmlformats.org/presentationml/2006/main">
-  <p:cSld>
-    <p:spTree>
-      <p:nvGrpSpPr>
-        <p:cNvPr id="1" name=""/>
-        <p:cNvGrpSpPr/>
-        <p:nvPr/>
-      </p:nvGrpSpPr>
-      <p:grpSpPr>
-        <a:xfrm>
-          <a:off x="0" y="0"/>
-          <a:ext cx="0" cy="0"/>
-          <a:chOff x="0" y="0"/>
-          <a:chExt cx="0" cy="0"/>
-        </a:xfrm>
-      </p:grpSpPr>
-      <p:sp>
-        <p:nvSpPr>
-          <p:cNvPr id="2" name="Text Placeholder 1"/>
-          <p:cNvSpPr>
-            <a:spLocks noGrp="1"/>
-          </p:cNvSpPr>
-          <p:nvPr>
-            <p:ph type="body" sz="quarter" idx="11"/>
-          </p:nvPr>
-        </p:nvSpPr>
-        <p:spPr>
-          <a:xfrm>
-            <a:off x="328613" y="1079047"/>
-            <a:ext cx="8401246" cy="485802"/>
-          </a:xfrm>
-        </p:spPr>
-        <p:txBody>
-          <a:bodyPr/>
-          <a:lstStyle/>
-          <a:p>
-            <a:r>
-              <a:rPr lang="en-US" sz="2400" dirty="0"/>
-              <a:t>SRP </a:t>
-            </a:r>
-            <a:r>
-              <a:rPr lang="en-US" sz="2400" dirty="0" smtClean="0"/>
-              <a:t>Single Responsibility </a:t>
-            </a:r>
-            <a:r>
-              <a:rPr lang="en-US" sz="2400" dirty="0"/>
-              <a:t>Principle</a:t>
-            </a:r>
-          </a:p>
-          <a:p>
-            <a:endParaRPr lang="en-US" sz="1800" dirty="0" smtClean="0"/>
-          </a:p>
-          <a:p>
-            <a:endParaRPr lang="en-US" sz="1800" dirty="0" smtClean="0"/>
-          </a:p>
-        </p:txBody>
-      </p:sp>
-      <p:sp>
-        <p:nvSpPr>
-          <p:cNvPr id="5" name="TextBox 4"/>
-          <p:cNvSpPr txBox="1"/>
-          <p:nvPr/>
-        </p:nvSpPr>
-        <p:spPr>
-          <a:xfrm>
-            <a:off x="621372" y="1564849"/>
-            <a:ext cx="8210747" cy="4862870"/>
-          </a:xfrm>
-          <a:prstGeom prst="rect">
-            <a:avLst/>
-          </a:prstGeom>
-          <a:solidFill>
-            <a:schemeClr val="tx1"/>
-          </a:solidFill>
-        </p:spPr>
-        <p:txBody>
-          <a:bodyPr wrap="square" rtlCol="0">
-            <a:spAutoFit/>
-          </a:bodyPr>
-          <a:lstStyle/>
-          <a:p>
-            <a:r>
-              <a:rPr lang="it-IT" sz="1000" dirty="0">
-                <a:solidFill>
-                  <a:srgbClr val="DCDCDC"/>
-                </a:solidFill>
-                <a:highlight>
-                  <a:srgbClr val="1E1E1E"/>
-                </a:highlight>
-                <a:latin typeface="Consolas" panose="020B0609020204030204" pitchFamily="49" charset="0"/>
-              </a:rPr>
-              <a:t> </a:t>
-            </a:r>
-            <a:r>
-              <a:rPr lang="it-IT" sz="1000" dirty="0">
-                <a:solidFill>
-                  <a:srgbClr val="569CD6"/>
-                </a:solidFill>
-                <a:highlight>
-                  <a:srgbClr val="1E1E1E"/>
-                </a:highlight>
-                <a:latin typeface="Consolas" panose="020B0609020204030204" pitchFamily="49" charset="0"/>
-              </a:rPr>
-              <a:t>public</a:t>
-            </a:r>
-            <a:r>
-              <a:rPr lang="it-IT" sz="1000" dirty="0">
-                <a:solidFill>
-                  <a:srgbClr val="DCDCDC"/>
-                </a:solidFill>
-                <a:highlight>
-                  <a:srgbClr val="1E1E1E"/>
-                </a:highlight>
-                <a:latin typeface="Consolas" panose="020B0609020204030204" pitchFamily="49" charset="0"/>
-              </a:rPr>
-              <a:t> </a:t>
-            </a:r>
-            <a:r>
-              <a:rPr lang="it-IT" sz="1000" dirty="0" err="1">
-                <a:solidFill>
-                  <a:srgbClr val="569CD6"/>
-                </a:solidFill>
-                <a:highlight>
-                  <a:srgbClr val="1E1E1E"/>
-                </a:highlight>
-                <a:latin typeface="Consolas" panose="020B0609020204030204" pitchFamily="49" charset="0"/>
-              </a:rPr>
-              <a:t>class</a:t>
-            </a:r>
-            <a:r>
-              <a:rPr lang="it-IT" sz="1000" dirty="0">
-                <a:solidFill>
-                  <a:srgbClr val="DCDCDC"/>
-                </a:solidFill>
-                <a:highlight>
-                  <a:srgbClr val="1E1E1E"/>
-                </a:highlight>
-                <a:latin typeface="Consolas" panose="020B0609020204030204" pitchFamily="49" charset="0"/>
-              </a:rPr>
-              <a:t> </a:t>
-            </a:r>
-            <a:r>
-              <a:rPr lang="it-IT" sz="1000" dirty="0" err="1">
-                <a:solidFill>
-                  <a:srgbClr val="4EC9B0"/>
-                </a:solidFill>
-                <a:highlight>
-                  <a:srgbClr val="1E1E1E"/>
-                </a:highlight>
-                <a:latin typeface="Consolas" panose="020B0609020204030204" pitchFamily="49" charset="0"/>
-              </a:rPr>
-              <a:t>AreaCalculator</a:t>
-            </a:r>
-            <a:endParaRPr lang="it-IT" sz="1000" dirty="0">
-              <a:solidFill>
-                <a:srgbClr val="DCDCDC"/>
-              </a:solidFill>
-              <a:highlight>
-                <a:srgbClr val="1E1E1E"/>
-              </a:highlight>
-              <a:latin typeface="Consolas" panose="020B0609020204030204" pitchFamily="49" charset="0"/>
-            </a:endParaRPr>
-          </a:p>
-          <a:p>
-            <a:r>
-              <a:rPr lang="it-IT" sz="1000" dirty="0">
-                <a:solidFill>
-                  <a:srgbClr val="DCDCDC"/>
-                </a:solidFill>
-                <a:highlight>
-                  <a:srgbClr val="1E1E1E"/>
-                </a:highlight>
-                <a:latin typeface="Consolas" panose="020B0609020204030204" pitchFamily="49" charset="0"/>
-              </a:rPr>
-              <a:t> {</a:t>
-            </a:r>
-          </a:p>
-          <a:p>
-            <a:r>
-              <a:rPr lang="it-IT" sz="1000" dirty="0">
-                <a:solidFill>
-                  <a:srgbClr val="DCDCDC"/>
-                </a:solidFill>
-                <a:highlight>
-                  <a:srgbClr val="1E1E1E"/>
-                </a:highlight>
-                <a:latin typeface="Consolas" panose="020B0609020204030204" pitchFamily="49" charset="0"/>
-              </a:rPr>
-              <a:t> </a:t>
-            </a:r>
-            <a:r>
-              <a:rPr lang="it-IT" sz="1000" dirty="0" smtClean="0">
-                <a:solidFill>
-                  <a:srgbClr val="DCDCDC"/>
-                </a:solidFill>
-                <a:highlight>
-                  <a:srgbClr val="1E1E1E"/>
-                </a:highlight>
-                <a:latin typeface="Consolas" panose="020B0609020204030204" pitchFamily="49" charset="0"/>
-              </a:rPr>
-              <a:t>	 </a:t>
-            </a:r>
-            <a:r>
-              <a:rPr lang="it-IT" sz="1000" dirty="0" smtClean="0">
-                <a:solidFill>
-                  <a:srgbClr val="569CD6"/>
-                </a:solidFill>
-                <a:highlight>
-                  <a:srgbClr val="1E1E1E"/>
-                </a:highlight>
-                <a:latin typeface="Consolas" panose="020B0609020204030204" pitchFamily="49" charset="0"/>
-              </a:rPr>
-              <a:t>private</a:t>
-            </a:r>
-            <a:r>
-              <a:rPr lang="it-IT" sz="1000" dirty="0" smtClean="0">
-                <a:solidFill>
-                  <a:srgbClr val="DCDCDC"/>
-                </a:solidFill>
-                <a:highlight>
-                  <a:srgbClr val="1E1E1E"/>
-                </a:highlight>
-                <a:latin typeface="Consolas" panose="020B0609020204030204" pitchFamily="49" charset="0"/>
-              </a:rPr>
-              <a:t> </a:t>
-            </a:r>
-            <a:r>
-              <a:rPr lang="it-IT" sz="1000" dirty="0" err="1">
-                <a:solidFill>
-                  <a:srgbClr val="569CD6"/>
-                </a:solidFill>
-                <a:highlight>
-                  <a:srgbClr val="1E1E1E"/>
-                </a:highlight>
-                <a:latin typeface="Consolas" panose="020B0609020204030204" pitchFamily="49" charset="0"/>
-              </a:rPr>
-              <a:t>readonly</a:t>
-            </a:r>
-            <a:r>
-              <a:rPr lang="it-IT" sz="1000" dirty="0">
-                <a:solidFill>
-                  <a:srgbClr val="DCDCDC"/>
-                </a:solidFill>
-                <a:highlight>
-                  <a:srgbClr val="1E1E1E"/>
-                </a:highlight>
-                <a:latin typeface="Consolas" panose="020B0609020204030204" pitchFamily="49" charset="0"/>
-              </a:rPr>
-              <a:t> </a:t>
-            </a:r>
-            <a:r>
-              <a:rPr lang="it-IT" sz="1000" dirty="0" err="1">
-                <a:solidFill>
-                  <a:srgbClr val="4EC9B0"/>
-                </a:solidFill>
-                <a:highlight>
-                  <a:srgbClr val="1E1E1E"/>
-                </a:highlight>
-                <a:latin typeface="Consolas" panose="020B0609020204030204" pitchFamily="49" charset="0"/>
-              </a:rPr>
-              <a:t>Shape</a:t>
-            </a:r>
-            <a:r>
-              <a:rPr lang="it-IT" sz="1000" dirty="0">
-                <a:solidFill>
-                  <a:srgbClr val="DCDCDC"/>
-                </a:solidFill>
-                <a:highlight>
-                  <a:srgbClr val="1E1E1E"/>
-                </a:highlight>
-                <a:latin typeface="Consolas" panose="020B0609020204030204" pitchFamily="49" charset="0"/>
-              </a:rPr>
-              <a:t>[] </a:t>
-            </a:r>
-            <a:r>
-              <a:rPr lang="it-IT" sz="1000" dirty="0" err="1">
-                <a:solidFill>
-                  <a:srgbClr val="DCDCDC"/>
-                </a:solidFill>
-                <a:highlight>
-                  <a:srgbClr val="1E1E1E"/>
-                </a:highlight>
-                <a:latin typeface="Consolas" panose="020B0609020204030204" pitchFamily="49" charset="0"/>
-              </a:rPr>
-              <a:t>shapes</a:t>
-            </a:r>
-            <a:r>
-              <a:rPr lang="it-IT" sz="1000" dirty="0">
-                <a:solidFill>
-                  <a:srgbClr val="DCDCDC"/>
-                </a:solidFill>
-                <a:highlight>
-                  <a:srgbClr val="1E1E1E"/>
-                </a:highlight>
-                <a:latin typeface="Consolas" panose="020B0609020204030204" pitchFamily="49" charset="0"/>
-              </a:rPr>
-              <a:t>;</a:t>
-            </a:r>
-          </a:p>
-          <a:p>
-            <a:r>
-              <a:rPr lang="it-IT" sz="1000" dirty="0">
-                <a:solidFill>
-                  <a:srgbClr val="DCDCDC"/>
-                </a:solidFill>
-                <a:highlight>
-                  <a:srgbClr val="1E1E1E"/>
-                </a:highlight>
-                <a:latin typeface="Consolas" panose="020B0609020204030204" pitchFamily="49" charset="0"/>
-              </a:rPr>
-              <a:t>        </a:t>
-            </a:r>
-            <a:r>
-              <a:rPr lang="it-IT" sz="1000" dirty="0">
-                <a:solidFill>
-                  <a:srgbClr val="569CD6"/>
-                </a:solidFill>
-                <a:highlight>
-                  <a:srgbClr val="1E1E1E"/>
-                </a:highlight>
-                <a:latin typeface="Consolas" panose="020B0609020204030204" pitchFamily="49" charset="0"/>
-              </a:rPr>
-              <a:t>public</a:t>
-            </a:r>
-            <a:r>
-              <a:rPr lang="it-IT" sz="1000" dirty="0">
-                <a:solidFill>
-                  <a:srgbClr val="DCDCDC"/>
-                </a:solidFill>
-                <a:highlight>
-                  <a:srgbClr val="1E1E1E"/>
-                </a:highlight>
-                <a:latin typeface="Consolas" panose="020B0609020204030204" pitchFamily="49" charset="0"/>
-              </a:rPr>
-              <a:t> </a:t>
-            </a:r>
-            <a:r>
-              <a:rPr lang="it-IT" sz="1000" dirty="0" err="1">
-                <a:solidFill>
-                  <a:srgbClr val="DCDCDC"/>
-                </a:solidFill>
-                <a:highlight>
-                  <a:srgbClr val="1E1E1E"/>
-                </a:highlight>
-                <a:latin typeface="Consolas" panose="020B0609020204030204" pitchFamily="49" charset="0"/>
-              </a:rPr>
-              <a:t>AreaCalculator</a:t>
-            </a:r>
-            <a:r>
-              <a:rPr lang="it-IT" sz="1000" dirty="0">
-                <a:solidFill>
-                  <a:srgbClr val="DCDCDC"/>
-                </a:solidFill>
-                <a:highlight>
-                  <a:srgbClr val="1E1E1E"/>
-                </a:highlight>
-                <a:latin typeface="Consolas" panose="020B0609020204030204" pitchFamily="49" charset="0"/>
-              </a:rPr>
-              <a:t>(</a:t>
-            </a:r>
-            <a:r>
-              <a:rPr lang="it-IT" sz="1000" dirty="0" err="1">
-                <a:solidFill>
-                  <a:srgbClr val="4EC9B0"/>
-                </a:solidFill>
-                <a:highlight>
-                  <a:srgbClr val="1E1E1E"/>
-                </a:highlight>
-                <a:latin typeface="Consolas" panose="020B0609020204030204" pitchFamily="49" charset="0"/>
-              </a:rPr>
-              <a:t>Shape</a:t>
-            </a:r>
-            <a:r>
-              <a:rPr lang="it-IT" sz="1000" dirty="0">
-                <a:solidFill>
-                  <a:srgbClr val="DCDCDC"/>
-                </a:solidFill>
-                <a:highlight>
-                  <a:srgbClr val="1E1E1E"/>
-                </a:highlight>
-                <a:latin typeface="Consolas" panose="020B0609020204030204" pitchFamily="49" charset="0"/>
-              </a:rPr>
-              <a:t>[] </a:t>
-            </a:r>
-            <a:r>
-              <a:rPr lang="it-IT" sz="1000" dirty="0" err="1">
-                <a:solidFill>
-                  <a:srgbClr val="DCDCDC"/>
-                </a:solidFill>
-                <a:highlight>
-                  <a:srgbClr val="1E1E1E"/>
-                </a:highlight>
-                <a:latin typeface="Consolas" panose="020B0609020204030204" pitchFamily="49" charset="0"/>
-              </a:rPr>
-              <a:t>shapes</a:t>
-            </a:r>
-            <a:r>
-              <a:rPr lang="it-IT" sz="1000" dirty="0">
-                <a:solidFill>
-                  <a:srgbClr val="DCDCDC"/>
-                </a:solidFill>
-                <a:highlight>
-                  <a:srgbClr val="1E1E1E"/>
-                </a:highlight>
-                <a:latin typeface="Consolas" panose="020B0609020204030204" pitchFamily="49" charset="0"/>
-              </a:rPr>
-              <a:t>)</a:t>
-            </a:r>
-          </a:p>
-          <a:p>
-            <a:r>
-              <a:rPr lang="it-IT" sz="1000" dirty="0">
-                <a:solidFill>
-                  <a:srgbClr val="DCDCDC"/>
-                </a:solidFill>
-                <a:highlight>
-                  <a:srgbClr val="1E1E1E"/>
-                </a:highlight>
-                <a:latin typeface="Consolas" panose="020B0609020204030204" pitchFamily="49" charset="0"/>
-              </a:rPr>
-              <a:t>        {</a:t>
-            </a:r>
-          </a:p>
-          <a:p>
-            <a:r>
-              <a:rPr lang="it-IT" sz="1000" dirty="0">
-                <a:solidFill>
-                  <a:srgbClr val="DCDCDC"/>
-                </a:solidFill>
-                <a:highlight>
-                  <a:srgbClr val="1E1E1E"/>
-                </a:highlight>
-                <a:latin typeface="Consolas" panose="020B0609020204030204" pitchFamily="49" charset="0"/>
-              </a:rPr>
-              <a:t>            </a:t>
-            </a:r>
-            <a:r>
-              <a:rPr lang="it-IT" sz="1000" dirty="0" err="1">
-                <a:solidFill>
-                  <a:srgbClr val="569CD6"/>
-                </a:solidFill>
-                <a:highlight>
-                  <a:srgbClr val="1E1E1E"/>
-                </a:highlight>
-                <a:latin typeface="Consolas" panose="020B0609020204030204" pitchFamily="49" charset="0"/>
-              </a:rPr>
-              <a:t>this</a:t>
-            </a:r>
-            <a:r>
-              <a:rPr lang="it-IT" sz="1000" dirty="0" err="1">
-                <a:solidFill>
-                  <a:srgbClr val="B4B4B4"/>
-                </a:solidFill>
-                <a:highlight>
-                  <a:srgbClr val="1E1E1E"/>
-                </a:highlight>
-                <a:latin typeface="Consolas" panose="020B0609020204030204" pitchFamily="49" charset="0"/>
-              </a:rPr>
-              <a:t>.</a:t>
-            </a:r>
-            <a:r>
-              <a:rPr lang="it-IT" sz="1000" dirty="0" err="1">
-                <a:solidFill>
-                  <a:srgbClr val="DCDCDC"/>
-                </a:solidFill>
-                <a:highlight>
-                  <a:srgbClr val="1E1E1E"/>
-                </a:highlight>
-                <a:latin typeface="Consolas" panose="020B0609020204030204" pitchFamily="49" charset="0"/>
-              </a:rPr>
-              <a:t>shapes</a:t>
-            </a:r>
-            <a:r>
-              <a:rPr lang="it-IT" sz="1000" dirty="0">
-                <a:solidFill>
-                  <a:srgbClr val="DCDCDC"/>
-                </a:solidFill>
-                <a:highlight>
-                  <a:srgbClr val="1E1E1E"/>
-                </a:highlight>
-                <a:latin typeface="Consolas" panose="020B0609020204030204" pitchFamily="49" charset="0"/>
-              </a:rPr>
-              <a:t> </a:t>
-            </a:r>
-            <a:r>
-              <a:rPr lang="it-IT" sz="1000" dirty="0">
-                <a:solidFill>
-                  <a:srgbClr val="B4B4B4"/>
-                </a:solidFill>
-                <a:highlight>
-                  <a:srgbClr val="1E1E1E"/>
-                </a:highlight>
-                <a:latin typeface="Consolas" panose="020B0609020204030204" pitchFamily="49" charset="0"/>
-              </a:rPr>
-              <a:t>=</a:t>
-            </a:r>
-            <a:r>
-              <a:rPr lang="it-IT" sz="1000" dirty="0">
-                <a:solidFill>
-                  <a:srgbClr val="DCDCDC"/>
-                </a:solidFill>
-                <a:highlight>
-                  <a:srgbClr val="1E1E1E"/>
-                </a:highlight>
-                <a:latin typeface="Consolas" panose="020B0609020204030204" pitchFamily="49" charset="0"/>
-              </a:rPr>
-              <a:t> </a:t>
-            </a:r>
-            <a:r>
-              <a:rPr lang="it-IT" sz="1000" dirty="0" err="1">
-                <a:solidFill>
-                  <a:srgbClr val="DCDCDC"/>
-                </a:solidFill>
-                <a:highlight>
-                  <a:srgbClr val="1E1E1E"/>
-                </a:highlight>
-                <a:latin typeface="Consolas" panose="020B0609020204030204" pitchFamily="49" charset="0"/>
-              </a:rPr>
-              <a:t>shapes</a:t>
-            </a:r>
-            <a:r>
-              <a:rPr lang="it-IT" sz="1000" dirty="0">
-                <a:solidFill>
-                  <a:srgbClr val="DCDCDC"/>
-                </a:solidFill>
-                <a:highlight>
-                  <a:srgbClr val="1E1E1E"/>
-                </a:highlight>
-                <a:latin typeface="Consolas" panose="020B0609020204030204" pitchFamily="49" charset="0"/>
-              </a:rPr>
-              <a:t>;</a:t>
-            </a:r>
-          </a:p>
-          <a:p>
-            <a:r>
-              <a:rPr lang="it-IT" sz="1000" dirty="0">
-                <a:solidFill>
-                  <a:srgbClr val="DCDCDC"/>
-                </a:solidFill>
-                <a:highlight>
-                  <a:srgbClr val="1E1E1E"/>
-                </a:highlight>
-                <a:latin typeface="Consolas" panose="020B0609020204030204" pitchFamily="49" charset="0"/>
-              </a:rPr>
-              <a:t>        }        </a:t>
-            </a:r>
-            <a:endParaRPr lang="it-IT" sz="1000" dirty="0" smtClean="0">
-              <a:solidFill>
-                <a:srgbClr val="DCDCDC"/>
-              </a:solidFill>
-              <a:highlight>
-                <a:srgbClr val="1E1E1E"/>
-              </a:highlight>
-              <a:latin typeface="Consolas" panose="020B0609020204030204" pitchFamily="49" charset="0"/>
-            </a:endParaRPr>
-          </a:p>
-          <a:p>
-            <a:r>
-              <a:rPr lang="it-IT" sz="1000" dirty="0">
-                <a:solidFill>
-                  <a:srgbClr val="DCDCDC"/>
-                </a:solidFill>
-                <a:highlight>
-                  <a:srgbClr val="1E1E1E"/>
-                </a:highlight>
-                <a:latin typeface="Consolas" panose="020B0609020204030204" pitchFamily="49" charset="0"/>
-              </a:rPr>
-              <a:t>	</a:t>
-            </a:r>
-            <a:r>
-              <a:rPr lang="it-IT" sz="1000" dirty="0" smtClean="0">
-                <a:solidFill>
-                  <a:srgbClr val="DCDCDC"/>
-                </a:solidFill>
-                <a:highlight>
-                  <a:srgbClr val="1E1E1E"/>
-                </a:highlight>
-                <a:latin typeface="Consolas" panose="020B0609020204030204" pitchFamily="49" charset="0"/>
-              </a:rPr>
-              <a:t>  </a:t>
-            </a:r>
-            <a:r>
-              <a:rPr lang="it-IT" sz="1000" dirty="0" smtClean="0">
-                <a:solidFill>
-                  <a:srgbClr val="569CD6"/>
-                </a:solidFill>
-                <a:highlight>
-                  <a:srgbClr val="1E1E1E"/>
-                </a:highlight>
-                <a:latin typeface="Consolas" panose="020B0609020204030204" pitchFamily="49" charset="0"/>
-              </a:rPr>
-              <a:t>public</a:t>
-            </a:r>
-            <a:r>
-              <a:rPr lang="it-IT" sz="1000" dirty="0" smtClean="0">
-                <a:solidFill>
-                  <a:srgbClr val="DCDCDC"/>
-                </a:solidFill>
-                <a:highlight>
-                  <a:srgbClr val="1E1E1E"/>
-                </a:highlight>
-                <a:latin typeface="Consolas" panose="020B0609020204030204" pitchFamily="49" charset="0"/>
-              </a:rPr>
-              <a:t> </a:t>
-            </a:r>
-            <a:r>
-              <a:rPr lang="it-IT" sz="1000" dirty="0" smtClean="0">
-                <a:solidFill>
-                  <a:srgbClr val="569CD6"/>
-                </a:solidFill>
-                <a:highlight>
-                  <a:srgbClr val="1E1E1E"/>
-                </a:highlight>
-                <a:latin typeface="Consolas" panose="020B0609020204030204" pitchFamily="49" charset="0"/>
-              </a:rPr>
-              <a:t>float</a:t>
-            </a:r>
-            <a:r>
-              <a:rPr lang="it-IT" sz="1000" dirty="0" smtClean="0">
-                <a:solidFill>
-                  <a:srgbClr val="DCDCDC"/>
-                </a:solidFill>
-                <a:highlight>
-                  <a:srgbClr val="1E1E1E"/>
-                </a:highlight>
-                <a:latin typeface="Consolas" panose="020B0609020204030204" pitchFamily="49" charset="0"/>
-              </a:rPr>
-              <a:t> Sum()</a:t>
-            </a:r>
-          </a:p>
-          <a:p>
-            <a:r>
-              <a:rPr lang="it-IT" sz="1000" dirty="0" smtClean="0">
-                <a:solidFill>
-                  <a:srgbClr val="DCDCDC"/>
-                </a:solidFill>
-                <a:highlight>
-                  <a:srgbClr val="1E1E1E"/>
-                </a:highlight>
-                <a:latin typeface="Consolas" panose="020B0609020204030204" pitchFamily="49" charset="0"/>
-              </a:rPr>
-              <a:t>        </a:t>
-            </a:r>
-            <a:r>
-              <a:rPr lang="it-IT" sz="1000" dirty="0">
-                <a:solidFill>
-                  <a:srgbClr val="DCDCDC"/>
-                </a:solidFill>
-                <a:highlight>
-                  <a:srgbClr val="1E1E1E"/>
-                </a:highlight>
-                <a:latin typeface="Consolas" panose="020B0609020204030204" pitchFamily="49" charset="0"/>
-              </a:rPr>
-              <a:t>{</a:t>
-            </a:r>
-          </a:p>
-          <a:p>
-            <a:r>
-              <a:rPr lang="it-IT" sz="1000" dirty="0">
-                <a:solidFill>
-                  <a:srgbClr val="DCDCDC"/>
-                </a:solidFill>
-                <a:highlight>
-                  <a:srgbClr val="1E1E1E"/>
-                </a:highlight>
-                <a:latin typeface="Consolas" panose="020B0609020204030204" pitchFamily="49" charset="0"/>
-              </a:rPr>
-              <a:t>            </a:t>
-            </a:r>
-            <a:r>
-              <a:rPr lang="it-IT" sz="1000" dirty="0">
-                <a:solidFill>
-                  <a:srgbClr val="569CD6"/>
-                </a:solidFill>
-                <a:highlight>
-                  <a:srgbClr val="1E1E1E"/>
-                </a:highlight>
-                <a:latin typeface="Consolas" panose="020B0609020204030204" pitchFamily="49" charset="0"/>
-              </a:rPr>
-              <a:t>float</a:t>
-            </a:r>
-            <a:r>
-              <a:rPr lang="it-IT" sz="1000" dirty="0">
-                <a:solidFill>
-                  <a:srgbClr val="DCDCDC"/>
-                </a:solidFill>
-                <a:highlight>
-                  <a:srgbClr val="1E1E1E"/>
-                </a:highlight>
-                <a:latin typeface="Consolas" panose="020B0609020204030204" pitchFamily="49" charset="0"/>
-              </a:rPr>
-              <a:t> sum </a:t>
-            </a:r>
-            <a:r>
-              <a:rPr lang="it-IT" sz="1000" dirty="0">
-                <a:solidFill>
-                  <a:srgbClr val="B4B4B4"/>
-                </a:solidFill>
-                <a:highlight>
-                  <a:srgbClr val="1E1E1E"/>
-                </a:highlight>
-                <a:latin typeface="Consolas" panose="020B0609020204030204" pitchFamily="49" charset="0"/>
-              </a:rPr>
-              <a:t>=</a:t>
-            </a:r>
-            <a:r>
-              <a:rPr lang="it-IT" sz="1000" dirty="0">
-                <a:solidFill>
-                  <a:srgbClr val="DCDCDC"/>
-                </a:solidFill>
-                <a:highlight>
-                  <a:srgbClr val="1E1E1E"/>
-                </a:highlight>
-                <a:latin typeface="Consolas" panose="020B0609020204030204" pitchFamily="49" charset="0"/>
-              </a:rPr>
-              <a:t> </a:t>
-            </a:r>
-            <a:r>
-              <a:rPr lang="it-IT" sz="1000" dirty="0">
-                <a:solidFill>
-                  <a:srgbClr val="B5CEA8"/>
-                </a:solidFill>
-                <a:highlight>
-                  <a:srgbClr val="1E1E1E"/>
-                </a:highlight>
-                <a:latin typeface="Consolas" panose="020B0609020204030204" pitchFamily="49" charset="0"/>
-              </a:rPr>
-              <a:t>0</a:t>
-            </a:r>
-            <a:r>
-              <a:rPr lang="it-IT" sz="1000" dirty="0">
-                <a:solidFill>
-                  <a:srgbClr val="DCDCDC"/>
-                </a:solidFill>
-                <a:highlight>
-                  <a:srgbClr val="1E1E1E"/>
-                </a:highlight>
-                <a:latin typeface="Consolas" panose="020B0609020204030204" pitchFamily="49" charset="0"/>
-              </a:rPr>
-              <a:t>;</a:t>
-            </a:r>
-          </a:p>
-          <a:p>
-            <a:r>
-              <a:rPr lang="en-US" sz="1000" dirty="0">
-                <a:solidFill>
-                  <a:srgbClr val="DCDCDC"/>
-                </a:solidFill>
-                <a:highlight>
-                  <a:srgbClr val="1E1E1E"/>
-                </a:highlight>
-                <a:latin typeface="Consolas" panose="020B0609020204030204" pitchFamily="49" charset="0"/>
-              </a:rPr>
-              <a:t>            </a:t>
-            </a:r>
-            <a:r>
-              <a:rPr lang="en-US" sz="1000" dirty="0" err="1">
-                <a:solidFill>
-                  <a:srgbClr val="569CD6"/>
-                </a:solidFill>
-                <a:highlight>
-                  <a:srgbClr val="1E1E1E"/>
-                </a:highlight>
-                <a:latin typeface="Consolas" panose="020B0609020204030204" pitchFamily="49" charset="0"/>
-              </a:rPr>
-              <a:t>foreach</a:t>
-            </a:r>
-            <a:r>
-              <a:rPr lang="en-US" sz="1000" dirty="0">
-                <a:solidFill>
-                  <a:srgbClr val="DCDCDC"/>
-                </a:solidFill>
-                <a:highlight>
-                  <a:srgbClr val="1E1E1E"/>
-                </a:highlight>
-                <a:latin typeface="Consolas" panose="020B0609020204030204" pitchFamily="49" charset="0"/>
-              </a:rPr>
-              <a:t> (</a:t>
-            </a:r>
-            <a:r>
-              <a:rPr lang="en-US" sz="1000" dirty="0" err="1">
-                <a:solidFill>
-                  <a:srgbClr val="569CD6"/>
-                </a:solidFill>
-                <a:highlight>
-                  <a:srgbClr val="1E1E1E"/>
-                </a:highlight>
-                <a:latin typeface="Consolas" panose="020B0609020204030204" pitchFamily="49" charset="0"/>
-              </a:rPr>
-              <a:t>var</a:t>
-            </a:r>
-            <a:r>
-              <a:rPr lang="en-US" sz="1000" dirty="0">
-                <a:solidFill>
-                  <a:srgbClr val="DCDCDC"/>
-                </a:solidFill>
-                <a:highlight>
-                  <a:srgbClr val="1E1E1E"/>
-                </a:highlight>
-                <a:latin typeface="Consolas" panose="020B0609020204030204" pitchFamily="49" charset="0"/>
-              </a:rPr>
-              <a:t> s </a:t>
-            </a:r>
-            <a:r>
-              <a:rPr lang="en-US" sz="1000" dirty="0">
-                <a:solidFill>
-                  <a:srgbClr val="569CD6"/>
-                </a:solidFill>
-                <a:highlight>
-                  <a:srgbClr val="1E1E1E"/>
-                </a:highlight>
-                <a:latin typeface="Consolas" panose="020B0609020204030204" pitchFamily="49" charset="0"/>
-              </a:rPr>
-              <a:t>in</a:t>
-            </a:r>
-            <a:r>
-              <a:rPr lang="en-US" sz="1000" dirty="0">
-                <a:solidFill>
-                  <a:srgbClr val="DCDCDC"/>
-                </a:solidFill>
-                <a:highlight>
-                  <a:srgbClr val="1E1E1E"/>
-                </a:highlight>
-                <a:latin typeface="Consolas" panose="020B0609020204030204" pitchFamily="49" charset="0"/>
-              </a:rPr>
-              <a:t> shapes)</a:t>
-            </a:r>
-          </a:p>
-          <a:p>
-            <a:r>
-              <a:rPr lang="it-IT" sz="1000" dirty="0" smtClean="0">
-                <a:solidFill>
-                  <a:srgbClr val="DCDCDC"/>
-                </a:solidFill>
-                <a:highlight>
-                  <a:srgbClr val="1E1E1E"/>
-                </a:highlight>
-                <a:latin typeface="Consolas" panose="020B0609020204030204" pitchFamily="49" charset="0"/>
-              </a:rPr>
-              <a:t>            {</a:t>
-            </a:r>
-          </a:p>
-          <a:p>
-            <a:r>
-              <a:rPr lang="en-US" sz="1000" dirty="0" smtClean="0">
-                <a:solidFill>
-                  <a:srgbClr val="DCDCDC"/>
-                </a:solidFill>
-                <a:highlight>
-                  <a:srgbClr val="1E1E1E"/>
-                </a:highlight>
-                <a:latin typeface="Consolas" panose="020B0609020204030204" pitchFamily="49" charset="0"/>
-              </a:rPr>
-              <a:t>                </a:t>
-            </a:r>
-            <a:r>
-              <a:rPr lang="en-US" sz="1000" dirty="0" err="1">
-                <a:solidFill>
-                  <a:srgbClr val="569CD6"/>
-                </a:solidFill>
-                <a:highlight>
-                  <a:srgbClr val="1E1E1E"/>
-                </a:highlight>
-                <a:latin typeface="Consolas" panose="020B0609020204030204" pitchFamily="49" charset="0"/>
-              </a:rPr>
-              <a:t>var</a:t>
-            </a:r>
-            <a:r>
-              <a:rPr lang="en-US" sz="1000" dirty="0">
-                <a:solidFill>
-                  <a:srgbClr val="DCDCDC"/>
-                </a:solidFill>
-                <a:highlight>
-                  <a:srgbClr val="1E1E1E"/>
-                </a:highlight>
-                <a:latin typeface="Consolas" panose="020B0609020204030204" pitchFamily="49" charset="0"/>
-              </a:rPr>
-              <a:t> square </a:t>
-            </a:r>
-            <a:r>
-              <a:rPr lang="en-US" sz="1000" dirty="0">
-                <a:solidFill>
-                  <a:srgbClr val="B4B4B4"/>
-                </a:solidFill>
-                <a:highlight>
-                  <a:srgbClr val="1E1E1E"/>
-                </a:highlight>
-                <a:latin typeface="Consolas" panose="020B0609020204030204" pitchFamily="49" charset="0"/>
-              </a:rPr>
-              <a:t>=</a:t>
-            </a:r>
-            <a:r>
-              <a:rPr lang="en-US" sz="1000" dirty="0">
-                <a:solidFill>
-                  <a:srgbClr val="DCDCDC"/>
-                </a:solidFill>
-                <a:highlight>
-                  <a:srgbClr val="1E1E1E"/>
-                </a:highlight>
-                <a:latin typeface="Consolas" panose="020B0609020204030204" pitchFamily="49" charset="0"/>
-              </a:rPr>
-              <a:t> s </a:t>
-            </a:r>
-            <a:r>
-              <a:rPr lang="en-US" sz="1000" dirty="0">
-                <a:solidFill>
-                  <a:srgbClr val="569CD6"/>
-                </a:solidFill>
-                <a:highlight>
-                  <a:srgbClr val="1E1E1E"/>
-                </a:highlight>
-                <a:latin typeface="Consolas" panose="020B0609020204030204" pitchFamily="49" charset="0"/>
-              </a:rPr>
-              <a:t>as</a:t>
-            </a:r>
-            <a:r>
-              <a:rPr lang="en-US" sz="1000" dirty="0">
-                <a:solidFill>
-                  <a:srgbClr val="DCDCDC"/>
-                </a:solidFill>
-                <a:highlight>
-                  <a:srgbClr val="1E1E1E"/>
-                </a:highlight>
-                <a:latin typeface="Consolas" panose="020B0609020204030204" pitchFamily="49" charset="0"/>
-              </a:rPr>
-              <a:t> </a:t>
-            </a:r>
-            <a:r>
-              <a:rPr lang="en-US" sz="1000" dirty="0">
-                <a:solidFill>
-                  <a:srgbClr val="4EC9B0"/>
-                </a:solidFill>
-                <a:highlight>
-                  <a:srgbClr val="1E1E1E"/>
-                </a:highlight>
-                <a:latin typeface="Consolas" panose="020B0609020204030204" pitchFamily="49" charset="0"/>
-              </a:rPr>
-              <a:t>Square</a:t>
-            </a:r>
-            <a:r>
-              <a:rPr lang="en-US" sz="1000" dirty="0">
-                <a:solidFill>
-                  <a:srgbClr val="DCDCDC"/>
-                </a:solidFill>
-                <a:highlight>
-                  <a:srgbClr val="1E1E1E"/>
-                </a:highlight>
-                <a:latin typeface="Consolas" panose="020B0609020204030204" pitchFamily="49" charset="0"/>
-              </a:rPr>
-              <a:t>;</a:t>
-            </a:r>
-          </a:p>
-          <a:p>
-            <a:r>
-              <a:rPr lang="it-IT" sz="1000" dirty="0">
-                <a:solidFill>
-                  <a:srgbClr val="DCDCDC"/>
-                </a:solidFill>
-                <a:highlight>
-                  <a:srgbClr val="1E1E1E"/>
-                </a:highlight>
-                <a:latin typeface="Consolas" panose="020B0609020204030204" pitchFamily="49" charset="0"/>
-              </a:rPr>
-              <a:t>                </a:t>
-            </a:r>
-            <a:r>
-              <a:rPr lang="it-IT" sz="1000" dirty="0" err="1">
-                <a:solidFill>
-                  <a:srgbClr val="569CD6"/>
-                </a:solidFill>
-                <a:highlight>
-                  <a:srgbClr val="1E1E1E"/>
-                </a:highlight>
-                <a:latin typeface="Consolas" panose="020B0609020204030204" pitchFamily="49" charset="0"/>
-              </a:rPr>
-              <a:t>if</a:t>
-            </a:r>
-            <a:r>
-              <a:rPr lang="it-IT" sz="1000" dirty="0">
-                <a:solidFill>
-                  <a:srgbClr val="DCDCDC"/>
-                </a:solidFill>
-                <a:highlight>
-                  <a:srgbClr val="1E1E1E"/>
-                </a:highlight>
-                <a:latin typeface="Consolas" panose="020B0609020204030204" pitchFamily="49" charset="0"/>
-              </a:rPr>
-              <a:t> (</a:t>
-            </a:r>
-            <a:r>
-              <a:rPr lang="it-IT" sz="1000" dirty="0" err="1">
-                <a:solidFill>
-                  <a:srgbClr val="DCDCDC"/>
-                </a:solidFill>
-                <a:highlight>
-                  <a:srgbClr val="1E1E1E"/>
-                </a:highlight>
-                <a:latin typeface="Consolas" panose="020B0609020204030204" pitchFamily="49" charset="0"/>
-              </a:rPr>
-              <a:t>square</a:t>
-            </a:r>
-            <a:r>
-              <a:rPr lang="it-IT" sz="1000" dirty="0">
-                <a:solidFill>
-                  <a:srgbClr val="DCDCDC"/>
-                </a:solidFill>
-                <a:highlight>
-                  <a:srgbClr val="1E1E1E"/>
-                </a:highlight>
-                <a:latin typeface="Consolas" panose="020B0609020204030204" pitchFamily="49" charset="0"/>
-              </a:rPr>
-              <a:t> </a:t>
-            </a:r>
-            <a:r>
-              <a:rPr lang="it-IT" sz="1000" dirty="0">
-                <a:solidFill>
-                  <a:srgbClr val="B4B4B4"/>
-                </a:solidFill>
-                <a:highlight>
-                  <a:srgbClr val="1E1E1E"/>
-                </a:highlight>
-                <a:latin typeface="Consolas" panose="020B0609020204030204" pitchFamily="49" charset="0"/>
-              </a:rPr>
-              <a:t>!=</a:t>
-            </a:r>
-            <a:r>
-              <a:rPr lang="it-IT" sz="1000" dirty="0">
-                <a:solidFill>
-                  <a:srgbClr val="DCDCDC"/>
-                </a:solidFill>
-                <a:highlight>
-                  <a:srgbClr val="1E1E1E"/>
-                </a:highlight>
-                <a:latin typeface="Consolas" panose="020B0609020204030204" pitchFamily="49" charset="0"/>
-              </a:rPr>
-              <a:t> </a:t>
-            </a:r>
-            <a:r>
-              <a:rPr lang="it-IT" sz="1000" dirty="0" err="1">
-                <a:solidFill>
-                  <a:srgbClr val="569CD6"/>
-                </a:solidFill>
-                <a:highlight>
-                  <a:srgbClr val="1E1E1E"/>
-                </a:highlight>
-                <a:latin typeface="Consolas" panose="020B0609020204030204" pitchFamily="49" charset="0"/>
-              </a:rPr>
-              <a:t>null</a:t>
-            </a:r>
-            <a:r>
-              <a:rPr lang="it-IT" sz="1000" dirty="0">
-                <a:solidFill>
-                  <a:srgbClr val="DCDCDC"/>
-                </a:solidFill>
-                <a:highlight>
-                  <a:srgbClr val="1E1E1E"/>
-                </a:highlight>
-                <a:latin typeface="Consolas" panose="020B0609020204030204" pitchFamily="49" charset="0"/>
-              </a:rPr>
-              <a:t>)</a:t>
-            </a:r>
-          </a:p>
-          <a:p>
-            <a:r>
-              <a:rPr lang="it-IT" sz="1000" dirty="0">
-                <a:solidFill>
-                  <a:srgbClr val="DCDCDC"/>
-                </a:solidFill>
-                <a:highlight>
-                  <a:srgbClr val="1E1E1E"/>
-                </a:highlight>
-                <a:latin typeface="Consolas" panose="020B0609020204030204" pitchFamily="49" charset="0"/>
-              </a:rPr>
-              <a:t>                {</a:t>
-            </a:r>
-          </a:p>
-          <a:p>
-            <a:r>
-              <a:rPr lang="it-IT" sz="1000" dirty="0">
-                <a:solidFill>
-                  <a:srgbClr val="DCDCDC"/>
-                </a:solidFill>
-                <a:highlight>
-                  <a:srgbClr val="1E1E1E"/>
-                </a:highlight>
-                <a:latin typeface="Consolas" panose="020B0609020204030204" pitchFamily="49" charset="0"/>
-              </a:rPr>
-              <a:t>                    sum </a:t>
-            </a:r>
-            <a:r>
-              <a:rPr lang="it-IT" sz="1000" dirty="0">
-                <a:solidFill>
-                  <a:srgbClr val="B4B4B4"/>
-                </a:solidFill>
-                <a:highlight>
-                  <a:srgbClr val="1E1E1E"/>
-                </a:highlight>
-                <a:latin typeface="Consolas" panose="020B0609020204030204" pitchFamily="49" charset="0"/>
-              </a:rPr>
-              <a:t>+=</a:t>
-            </a:r>
-            <a:r>
-              <a:rPr lang="it-IT" sz="1000" dirty="0">
-                <a:solidFill>
-                  <a:srgbClr val="DCDCDC"/>
-                </a:solidFill>
-                <a:highlight>
-                  <a:srgbClr val="1E1E1E"/>
-                </a:highlight>
-                <a:latin typeface="Consolas" panose="020B0609020204030204" pitchFamily="49" charset="0"/>
-              </a:rPr>
-              <a:t> </a:t>
-            </a:r>
-            <a:r>
-              <a:rPr lang="it-IT" sz="1000" dirty="0" err="1">
-                <a:solidFill>
-                  <a:srgbClr val="DCDCDC"/>
-                </a:solidFill>
-                <a:highlight>
-                  <a:srgbClr val="1E1E1E"/>
-                </a:highlight>
-                <a:latin typeface="Consolas" panose="020B0609020204030204" pitchFamily="49" charset="0"/>
-              </a:rPr>
-              <a:t>square</a:t>
-            </a:r>
-            <a:r>
-              <a:rPr lang="it-IT" sz="1000" dirty="0" err="1">
-                <a:solidFill>
-                  <a:srgbClr val="B4B4B4"/>
-                </a:solidFill>
-                <a:highlight>
-                  <a:srgbClr val="1E1E1E"/>
-                </a:highlight>
-                <a:latin typeface="Consolas" panose="020B0609020204030204" pitchFamily="49" charset="0"/>
-              </a:rPr>
-              <a:t>.</a:t>
-            </a:r>
-            <a:r>
-              <a:rPr lang="it-IT" sz="1000" dirty="0" err="1">
-                <a:solidFill>
-                  <a:srgbClr val="DCDCDC"/>
-                </a:solidFill>
-                <a:highlight>
-                  <a:srgbClr val="1E1E1E"/>
-                </a:highlight>
-                <a:latin typeface="Consolas" panose="020B0609020204030204" pitchFamily="49" charset="0"/>
-              </a:rPr>
-              <a:t>GetLenght</a:t>
-            </a:r>
-            <a:r>
-              <a:rPr lang="it-IT" sz="1000" dirty="0">
-                <a:solidFill>
-                  <a:srgbClr val="DCDCDC"/>
-                </a:solidFill>
-                <a:highlight>
-                  <a:srgbClr val="1E1E1E"/>
-                </a:highlight>
-                <a:latin typeface="Consolas" panose="020B0609020204030204" pitchFamily="49" charset="0"/>
-              </a:rPr>
-              <a:t>() </a:t>
-            </a:r>
-            <a:r>
-              <a:rPr lang="it-IT" sz="1000" dirty="0">
-                <a:solidFill>
-                  <a:srgbClr val="B4B4B4"/>
-                </a:solidFill>
-                <a:highlight>
-                  <a:srgbClr val="1E1E1E"/>
-                </a:highlight>
-                <a:latin typeface="Consolas" panose="020B0609020204030204" pitchFamily="49" charset="0"/>
-              </a:rPr>
-              <a:t>*</a:t>
-            </a:r>
-            <a:r>
-              <a:rPr lang="it-IT" sz="1000" dirty="0">
-                <a:solidFill>
-                  <a:srgbClr val="DCDCDC"/>
-                </a:solidFill>
-                <a:highlight>
-                  <a:srgbClr val="1E1E1E"/>
-                </a:highlight>
-                <a:latin typeface="Consolas" panose="020B0609020204030204" pitchFamily="49" charset="0"/>
-              </a:rPr>
-              <a:t> </a:t>
-            </a:r>
-            <a:r>
-              <a:rPr lang="it-IT" sz="1000" dirty="0" err="1">
-                <a:solidFill>
-                  <a:srgbClr val="DCDCDC"/>
-                </a:solidFill>
-                <a:highlight>
-                  <a:srgbClr val="1E1E1E"/>
-                </a:highlight>
-                <a:latin typeface="Consolas" panose="020B0609020204030204" pitchFamily="49" charset="0"/>
-              </a:rPr>
-              <a:t>square</a:t>
-            </a:r>
-            <a:r>
-              <a:rPr lang="it-IT" sz="1000" dirty="0" err="1">
-                <a:solidFill>
-                  <a:srgbClr val="B4B4B4"/>
-                </a:solidFill>
-                <a:highlight>
-                  <a:srgbClr val="1E1E1E"/>
-                </a:highlight>
-                <a:latin typeface="Consolas" panose="020B0609020204030204" pitchFamily="49" charset="0"/>
-              </a:rPr>
-              <a:t>.</a:t>
-            </a:r>
-            <a:r>
-              <a:rPr lang="it-IT" sz="1000" dirty="0" err="1">
-                <a:solidFill>
-                  <a:srgbClr val="DCDCDC"/>
-                </a:solidFill>
-                <a:highlight>
-                  <a:srgbClr val="1E1E1E"/>
-                </a:highlight>
-                <a:latin typeface="Consolas" panose="020B0609020204030204" pitchFamily="49" charset="0"/>
-              </a:rPr>
-              <a:t>GetLenght</a:t>
-            </a:r>
-            <a:r>
-              <a:rPr lang="it-IT" sz="1000" dirty="0">
-                <a:solidFill>
-                  <a:srgbClr val="DCDCDC"/>
-                </a:solidFill>
-                <a:highlight>
-                  <a:srgbClr val="1E1E1E"/>
-                </a:highlight>
-                <a:latin typeface="Consolas" panose="020B0609020204030204" pitchFamily="49" charset="0"/>
-              </a:rPr>
-              <a:t>();</a:t>
-            </a:r>
-          </a:p>
-          <a:p>
-            <a:r>
-              <a:rPr lang="it-IT" sz="1000" dirty="0">
-                <a:solidFill>
-                  <a:srgbClr val="DCDCDC"/>
-                </a:solidFill>
-                <a:highlight>
-                  <a:srgbClr val="1E1E1E"/>
-                </a:highlight>
-                <a:latin typeface="Consolas" panose="020B0609020204030204" pitchFamily="49" charset="0"/>
-              </a:rPr>
-              <a:t>                }</a:t>
-            </a:r>
-          </a:p>
-          <a:p>
-            <a:endParaRPr lang="it-IT" sz="1000" dirty="0">
-              <a:solidFill>
-                <a:srgbClr val="DCDCDC"/>
-              </a:solidFill>
-              <a:highlight>
-                <a:srgbClr val="1E1E1E"/>
-              </a:highlight>
-              <a:latin typeface="Consolas" panose="020B0609020204030204" pitchFamily="49" charset="0"/>
-            </a:endParaRPr>
-          </a:p>
-          <a:p>
-            <a:r>
-              <a:rPr lang="it-IT" sz="1000" dirty="0">
-                <a:solidFill>
-                  <a:srgbClr val="DCDCDC"/>
-                </a:solidFill>
-                <a:highlight>
-                  <a:srgbClr val="1E1E1E"/>
-                </a:highlight>
-                <a:latin typeface="Consolas" panose="020B0609020204030204" pitchFamily="49" charset="0"/>
-              </a:rPr>
-              <a:t>                </a:t>
-            </a:r>
-            <a:r>
-              <a:rPr lang="it-IT" sz="1000" dirty="0" err="1">
-                <a:solidFill>
-                  <a:srgbClr val="569CD6"/>
-                </a:solidFill>
-                <a:highlight>
-                  <a:srgbClr val="1E1E1E"/>
-                </a:highlight>
-                <a:latin typeface="Consolas" panose="020B0609020204030204" pitchFamily="49" charset="0"/>
-              </a:rPr>
-              <a:t>var</a:t>
-            </a:r>
-            <a:r>
-              <a:rPr lang="it-IT" sz="1000" dirty="0">
-                <a:solidFill>
-                  <a:srgbClr val="DCDCDC"/>
-                </a:solidFill>
-                <a:highlight>
-                  <a:srgbClr val="1E1E1E"/>
-                </a:highlight>
-                <a:latin typeface="Consolas" panose="020B0609020204030204" pitchFamily="49" charset="0"/>
-              </a:rPr>
-              <a:t> </a:t>
-            </a:r>
-            <a:r>
-              <a:rPr lang="it-IT" sz="1000" dirty="0" err="1">
-                <a:solidFill>
-                  <a:srgbClr val="DCDCDC"/>
-                </a:solidFill>
-                <a:highlight>
-                  <a:srgbClr val="1E1E1E"/>
-                </a:highlight>
-                <a:latin typeface="Consolas" panose="020B0609020204030204" pitchFamily="49" charset="0"/>
-              </a:rPr>
-              <a:t>circle</a:t>
-            </a:r>
-            <a:r>
-              <a:rPr lang="it-IT" sz="1000" dirty="0">
-                <a:solidFill>
-                  <a:srgbClr val="DCDCDC"/>
-                </a:solidFill>
-                <a:highlight>
-                  <a:srgbClr val="1E1E1E"/>
-                </a:highlight>
-                <a:latin typeface="Consolas" panose="020B0609020204030204" pitchFamily="49" charset="0"/>
-              </a:rPr>
-              <a:t> </a:t>
-            </a:r>
-            <a:r>
-              <a:rPr lang="it-IT" sz="1000" dirty="0">
-                <a:solidFill>
-                  <a:srgbClr val="B4B4B4"/>
-                </a:solidFill>
-                <a:highlight>
-                  <a:srgbClr val="1E1E1E"/>
-                </a:highlight>
-                <a:latin typeface="Consolas" panose="020B0609020204030204" pitchFamily="49" charset="0"/>
-              </a:rPr>
-              <a:t>=</a:t>
-            </a:r>
-            <a:r>
-              <a:rPr lang="it-IT" sz="1000" dirty="0">
-                <a:solidFill>
-                  <a:srgbClr val="DCDCDC"/>
-                </a:solidFill>
-                <a:highlight>
-                  <a:srgbClr val="1E1E1E"/>
-                </a:highlight>
-                <a:latin typeface="Consolas" panose="020B0609020204030204" pitchFamily="49" charset="0"/>
-              </a:rPr>
-              <a:t> s </a:t>
-            </a:r>
-            <a:r>
-              <a:rPr lang="it-IT" sz="1000" dirty="0" err="1">
-                <a:solidFill>
-                  <a:srgbClr val="569CD6"/>
-                </a:solidFill>
-                <a:highlight>
-                  <a:srgbClr val="1E1E1E"/>
-                </a:highlight>
-                <a:latin typeface="Consolas" panose="020B0609020204030204" pitchFamily="49" charset="0"/>
-              </a:rPr>
-              <a:t>as</a:t>
-            </a:r>
-            <a:r>
-              <a:rPr lang="it-IT" sz="1000" dirty="0">
-                <a:solidFill>
-                  <a:srgbClr val="DCDCDC"/>
-                </a:solidFill>
-                <a:highlight>
-                  <a:srgbClr val="1E1E1E"/>
-                </a:highlight>
-                <a:latin typeface="Consolas" panose="020B0609020204030204" pitchFamily="49" charset="0"/>
-              </a:rPr>
-              <a:t> </a:t>
-            </a:r>
-            <a:r>
-              <a:rPr lang="it-IT" sz="1000" dirty="0" err="1">
-                <a:solidFill>
-                  <a:srgbClr val="4EC9B0"/>
-                </a:solidFill>
-                <a:highlight>
-                  <a:srgbClr val="1E1E1E"/>
-                </a:highlight>
-                <a:latin typeface="Consolas" panose="020B0609020204030204" pitchFamily="49" charset="0"/>
-              </a:rPr>
-              <a:t>Circle</a:t>
-            </a:r>
-            <a:r>
-              <a:rPr lang="it-IT" sz="1000" dirty="0">
-                <a:solidFill>
-                  <a:srgbClr val="DCDCDC"/>
-                </a:solidFill>
-                <a:highlight>
-                  <a:srgbClr val="1E1E1E"/>
-                </a:highlight>
-                <a:latin typeface="Consolas" panose="020B0609020204030204" pitchFamily="49" charset="0"/>
-              </a:rPr>
-              <a:t>;</a:t>
-            </a:r>
-          </a:p>
-          <a:p>
-            <a:r>
-              <a:rPr lang="it-IT" sz="1000" dirty="0">
-                <a:solidFill>
-                  <a:srgbClr val="DCDCDC"/>
-                </a:solidFill>
-                <a:highlight>
-                  <a:srgbClr val="1E1E1E"/>
-                </a:highlight>
-                <a:latin typeface="Consolas" panose="020B0609020204030204" pitchFamily="49" charset="0"/>
-              </a:rPr>
-              <a:t>                </a:t>
-            </a:r>
-            <a:r>
-              <a:rPr lang="it-IT" sz="1000" dirty="0" err="1">
-                <a:solidFill>
-                  <a:srgbClr val="569CD6"/>
-                </a:solidFill>
-                <a:highlight>
-                  <a:srgbClr val="1E1E1E"/>
-                </a:highlight>
-                <a:latin typeface="Consolas" panose="020B0609020204030204" pitchFamily="49" charset="0"/>
-              </a:rPr>
-              <a:t>if</a:t>
-            </a:r>
-            <a:r>
-              <a:rPr lang="it-IT" sz="1000" dirty="0">
-                <a:solidFill>
-                  <a:srgbClr val="DCDCDC"/>
-                </a:solidFill>
-                <a:highlight>
-                  <a:srgbClr val="1E1E1E"/>
-                </a:highlight>
-                <a:latin typeface="Consolas" panose="020B0609020204030204" pitchFamily="49" charset="0"/>
-              </a:rPr>
-              <a:t> (</a:t>
-            </a:r>
-            <a:r>
-              <a:rPr lang="it-IT" sz="1000" dirty="0" err="1">
-                <a:solidFill>
-                  <a:srgbClr val="DCDCDC"/>
-                </a:solidFill>
-                <a:highlight>
-                  <a:srgbClr val="1E1E1E"/>
-                </a:highlight>
-                <a:latin typeface="Consolas" panose="020B0609020204030204" pitchFamily="49" charset="0"/>
-              </a:rPr>
-              <a:t>circle</a:t>
-            </a:r>
-            <a:r>
-              <a:rPr lang="it-IT" sz="1000" dirty="0">
-                <a:solidFill>
-                  <a:srgbClr val="DCDCDC"/>
-                </a:solidFill>
-                <a:highlight>
-                  <a:srgbClr val="1E1E1E"/>
-                </a:highlight>
-                <a:latin typeface="Consolas" panose="020B0609020204030204" pitchFamily="49" charset="0"/>
-              </a:rPr>
-              <a:t> </a:t>
-            </a:r>
-            <a:r>
-              <a:rPr lang="it-IT" sz="1000" dirty="0">
-                <a:solidFill>
-                  <a:srgbClr val="B4B4B4"/>
-                </a:solidFill>
-                <a:highlight>
-                  <a:srgbClr val="1E1E1E"/>
-                </a:highlight>
-                <a:latin typeface="Consolas" panose="020B0609020204030204" pitchFamily="49" charset="0"/>
-              </a:rPr>
-              <a:t>!=</a:t>
-            </a:r>
-            <a:r>
-              <a:rPr lang="it-IT" sz="1000" dirty="0">
-                <a:solidFill>
-                  <a:srgbClr val="DCDCDC"/>
-                </a:solidFill>
-                <a:highlight>
-                  <a:srgbClr val="1E1E1E"/>
-                </a:highlight>
-                <a:latin typeface="Consolas" panose="020B0609020204030204" pitchFamily="49" charset="0"/>
-              </a:rPr>
-              <a:t> </a:t>
-            </a:r>
-            <a:r>
-              <a:rPr lang="it-IT" sz="1000" dirty="0" err="1">
-                <a:solidFill>
-                  <a:srgbClr val="569CD6"/>
-                </a:solidFill>
-                <a:highlight>
-                  <a:srgbClr val="1E1E1E"/>
-                </a:highlight>
-                <a:latin typeface="Consolas" panose="020B0609020204030204" pitchFamily="49" charset="0"/>
-              </a:rPr>
-              <a:t>null</a:t>
-            </a:r>
-            <a:r>
-              <a:rPr lang="it-IT" sz="1000" dirty="0">
-                <a:solidFill>
-                  <a:srgbClr val="DCDCDC"/>
-                </a:solidFill>
-                <a:highlight>
-                  <a:srgbClr val="1E1E1E"/>
-                </a:highlight>
-                <a:latin typeface="Consolas" panose="020B0609020204030204" pitchFamily="49" charset="0"/>
-              </a:rPr>
-              <a:t>)</a:t>
-            </a:r>
-          </a:p>
-          <a:p>
-            <a:r>
-              <a:rPr lang="it-IT" sz="1000" dirty="0">
-                <a:solidFill>
-                  <a:srgbClr val="DCDCDC"/>
-                </a:solidFill>
-                <a:highlight>
-                  <a:srgbClr val="1E1E1E"/>
-                </a:highlight>
-                <a:latin typeface="Consolas" panose="020B0609020204030204" pitchFamily="49" charset="0"/>
-              </a:rPr>
-              <a:t>                {</a:t>
-            </a:r>
-          </a:p>
-          <a:p>
-            <a:r>
-              <a:rPr lang="it-IT" sz="1000" dirty="0">
-                <a:solidFill>
-                  <a:srgbClr val="DCDCDC"/>
-                </a:solidFill>
-                <a:highlight>
-                  <a:srgbClr val="1E1E1E"/>
-                </a:highlight>
-                <a:latin typeface="Consolas" panose="020B0609020204030204" pitchFamily="49" charset="0"/>
-              </a:rPr>
-              <a:t>                    sum </a:t>
-            </a:r>
-            <a:r>
-              <a:rPr lang="it-IT" sz="1000" dirty="0">
-                <a:solidFill>
-                  <a:srgbClr val="B4B4B4"/>
-                </a:solidFill>
-                <a:highlight>
-                  <a:srgbClr val="1E1E1E"/>
-                </a:highlight>
-                <a:latin typeface="Consolas" panose="020B0609020204030204" pitchFamily="49" charset="0"/>
-              </a:rPr>
-              <a:t>+=</a:t>
-            </a:r>
-            <a:r>
-              <a:rPr lang="it-IT" sz="1000" dirty="0">
-                <a:solidFill>
-                  <a:srgbClr val="DCDCDC"/>
-                </a:solidFill>
-                <a:highlight>
-                  <a:srgbClr val="1E1E1E"/>
-                </a:highlight>
-                <a:latin typeface="Consolas" panose="020B0609020204030204" pitchFamily="49" charset="0"/>
-              </a:rPr>
-              <a:t> (</a:t>
-            </a:r>
-            <a:r>
-              <a:rPr lang="it-IT" sz="1000" dirty="0">
-                <a:solidFill>
-                  <a:srgbClr val="569CD6"/>
-                </a:solidFill>
-                <a:highlight>
-                  <a:srgbClr val="1E1E1E"/>
-                </a:highlight>
-                <a:latin typeface="Consolas" panose="020B0609020204030204" pitchFamily="49" charset="0"/>
-              </a:rPr>
-              <a:t>float</a:t>
-            </a:r>
-            <a:r>
-              <a:rPr lang="it-IT" sz="1000" dirty="0">
-                <a:solidFill>
-                  <a:srgbClr val="DCDCDC"/>
-                </a:solidFill>
-                <a:highlight>
-                  <a:srgbClr val="1E1E1E"/>
-                </a:highlight>
-                <a:latin typeface="Consolas" panose="020B0609020204030204" pitchFamily="49" charset="0"/>
-              </a:rPr>
-              <a:t>)(</a:t>
-            </a:r>
-            <a:r>
-              <a:rPr lang="it-IT" sz="1000" dirty="0" err="1">
-                <a:solidFill>
-                  <a:srgbClr val="DCDCDC"/>
-                </a:solidFill>
-                <a:highlight>
-                  <a:srgbClr val="1E1E1E"/>
-                </a:highlight>
-                <a:latin typeface="Consolas" panose="020B0609020204030204" pitchFamily="49" charset="0"/>
-              </a:rPr>
-              <a:t>circle</a:t>
-            </a:r>
-            <a:r>
-              <a:rPr lang="it-IT" sz="1000" dirty="0" err="1">
-                <a:solidFill>
-                  <a:srgbClr val="B4B4B4"/>
-                </a:solidFill>
-                <a:highlight>
-                  <a:srgbClr val="1E1E1E"/>
-                </a:highlight>
-                <a:latin typeface="Consolas" panose="020B0609020204030204" pitchFamily="49" charset="0"/>
-              </a:rPr>
-              <a:t>.</a:t>
-            </a:r>
-            <a:r>
-              <a:rPr lang="it-IT" sz="1000" dirty="0" err="1">
-                <a:solidFill>
-                  <a:srgbClr val="DCDCDC"/>
-                </a:solidFill>
-                <a:highlight>
-                  <a:srgbClr val="1E1E1E"/>
-                </a:highlight>
-                <a:latin typeface="Consolas" panose="020B0609020204030204" pitchFamily="49" charset="0"/>
-              </a:rPr>
-              <a:t>GetRadious</a:t>
-            </a:r>
-            <a:r>
-              <a:rPr lang="it-IT" sz="1000" dirty="0">
-                <a:solidFill>
-                  <a:srgbClr val="DCDCDC"/>
-                </a:solidFill>
-                <a:highlight>
-                  <a:srgbClr val="1E1E1E"/>
-                </a:highlight>
-                <a:latin typeface="Consolas" panose="020B0609020204030204" pitchFamily="49" charset="0"/>
-              </a:rPr>
-              <a:t>() </a:t>
-            </a:r>
-            <a:r>
-              <a:rPr lang="it-IT" sz="1000" dirty="0">
-                <a:solidFill>
-                  <a:srgbClr val="B4B4B4"/>
-                </a:solidFill>
-                <a:highlight>
-                  <a:srgbClr val="1E1E1E"/>
-                </a:highlight>
-                <a:latin typeface="Consolas" panose="020B0609020204030204" pitchFamily="49" charset="0"/>
-              </a:rPr>
-              <a:t>*</a:t>
-            </a:r>
-            <a:r>
-              <a:rPr lang="it-IT" sz="1000" dirty="0">
-                <a:solidFill>
-                  <a:srgbClr val="DCDCDC"/>
-                </a:solidFill>
-                <a:highlight>
-                  <a:srgbClr val="1E1E1E"/>
-                </a:highlight>
-                <a:latin typeface="Consolas" panose="020B0609020204030204" pitchFamily="49" charset="0"/>
-              </a:rPr>
-              <a:t> </a:t>
-            </a:r>
-            <a:r>
-              <a:rPr lang="it-IT" sz="1000" dirty="0" err="1">
-                <a:solidFill>
-                  <a:srgbClr val="DCDCDC"/>
-                </a:solidFill>
-                <a:highlight>
-                  <a:srgbClr val="1E1E1E"/>
-                </a:highlight>
-                <a:latin typeface="Consolas" panose="020B0609020204030204" pitchFamily="49" charset="0"/>
-              </a:rPr>
-              <a:t>circle</a:t>
-            </a:r>
-            <a:r>
-              <a:rPr lang="it-IT" sz="1000" dirty="0" err="1">
-                <a:solidFill>
-                  <a:srgbClr val="B4B4B4"/>
-                </a:solidFill>
-                <a:highlight>
-                  <a:srgbClr val="1E1E1E"/>
-                </a:highlight>
-                <a:latin typeface="Consolas" panose="020B0609020204030204" pitchFamily="49" charset="0"/>
-              </a:rPr>
-              <a:t>.</a:t>
-            </a:r>
-            <a:r>
-              <a:rPr lang="it-IT" sz="1000" dirty="0" err="1">
-                <a:solidFill>
-                  <a:srgbClr val="DCDCDC"/>
-                </a:solidFill>
-                <a:highlight>
-                  <a:srgbClr val="1E1E1E"/>
-                </a:highlight>
-                <a:latin typeface="Consolas" panose="020B0609020204030204" pitchFamily="49" charset="0"/>
-              </a:rPr>
-              <a:t>GetRadious</a:t>
-            </a:r>
-            <a:r>
-              <a:rPr lang="it-IT" sz="1000" dirty="0">
-                <a:solidFill>
-                  <a:srgbClr val="DCDCDC"/>
-                </a:solidFill>
-                <a:highlight>
-                  <a:srgbClr val="1E1E1E"/>
-                </a:highlight>
-                <a:latin typeface="Consolas" panose="020B0609020204030204" pitchFamily="49" charset="0"/>
-              </a:rPr>
-              <a:t>() </a:t>
-            </a:r>
-            <a:r>
-              <a:rPr lang="it-IT" sz="1000" dirty="0">
-                <a:solidFill>
-                  <a:srgbClr val="B4B4B4"/>
-                </a:solidFill>
-                <a:highlight>
-                  <a:srgbClr val="1E1E1E"/>
-                </a:highlight>
-                <a:latin typeface="Consolas" panose="020B0609020204030204" pitchFamily="49" charset="0"/>
-              </a:rPr>
-              <a:t>*</a:t>
-            </a:r>
-            <a:r>
-              <a:rPr lang="it-IT" sz="1000" dirty="0">
-                <a:solidFill>
-                  <a:srgbClr val="DCDCDC"/>
-                </a:solidFill>
-                <a:highlight>
-                  <a:srgbClr val="1E1E1E"/>
-                </a:highlight>
-                <a:latin typeface="Consolas" panose="020B0609020204030204" pitchFamily="49" charset="0"/>
-              </a:rPr>
-              <a:t> </a:t>
-            </a:r>
-            <a:r>
-              <a:rPr lang="it-IT" sz="1000" dirty="0" err="1">
-                <a:solidFill>
-                  <a:srgbClr val="4EC9B0"/>
-                </a:solidFill>
-                <a:highlight>
-                  <a:srgbClr val="1E1E1E"/>
-                </a:highlight>
-                <a:latin typeface="Consolas" panose="020B0609020204030204" pitchFamily="49" charset="0"/>
-              </a:rPr>
-              <a:t>Math</a:t>
-            </a:r>
-            <a:r>
-              <a:rPr lang="it-IT" sz="1000" dirty="0" err="1">
-                <a:solidFill>
-                  <a:srgbClr val="B4B4B4"/>
-                </a:solidFill>
-                <a:highlight>
-                  <a:srgbClr val="1E1E1E"/>
-                </a:highlight>
-                <a:latin typeface="Consolas" panose="020B0609020204030204" pitchFamily="49" charset="0"/>
-              </a:rPr>
-              <a:t>.</a:t>
-            </a:r>
-            <a:r>
-              <a:rPr lang="it-IT" sz="1000" dirty="0" err="1">
-                <a:solidFill>
-                  <a:srgbClr val="DCDCDC"/>
-                </a:solidFill>
-                <a:highlight>
-                  <a:srgbClr val="1E1E1E"/>
-                </a:highlight>
-                <a:latin typeface="Consolas" panose="020B0609020204030204" pitchFamily="49" charset="0"/>
-              </a:rPr>
-              <a:t>PI</a:t>
-            </a:r>
-            <a:r>
-              <a:rPr lang="it-IT" sz="1000" dirty="0">
-                <a:solidFill>
-                  <a:srgbClr val="DCDCDC"/>
-                </a:solidFill>
-                <a:highlight>
-                  <a:srgbClr val="1E1E1E"/>
-                </a:highlight>
-                <a:latin typeface="Consolas" panose="020B0609020204030204" pitchFamily="49" charset="0"/>
-              </a:rPr>
-              <a:t>);</a:t>
-            </a:r>
-          </a:p>
-          <a:p>
-            <a:r>
-              <a:rPr lang="it-IT" sz="1000" dirty="0">
-                <a:solidFill>
-                  <a:srgbClr val="DCDCDC"/>
-                </a:solidFill>
-                <a:highlight>
-                  <a:srgbClr val="1E1E1E"/>
-                </a:highlight>
-                <a:latin typeface="Consolas" panose="020B0609020204030204" pitchFamily="49" charset="0"/>
-              </a:rPr>
-              <a:t>                }</a:t>
-            </a:r>
-          </a:p>
-          <a:p>
-            <a:r>
-              <a:rPr lang="it-IT" sz="1000" dirty="0">
-                <a:solidFill>
-                  <a:srgbClr val="DCDCDC"/>
-                </a:solidFill>
-                <a:highlight>
-                  <a:srgbClr val="1E1E1E"/>
-                </a:highlight>
-                <a:latin typeface="Consolas" panose="020B0609020204030204" pitchFamily="49" charset="0"/>
-              </a:rPr>
-              <a:t>            }</a:t>
-            </a:r>
-          </a:p>
-          <a:p>
-            <a:r>
-              <a:rPr lang="it-IT" sz="1000" dirty="0">
-                <a:solidFill>
-                  <a:srgbClr val="DCDCDC"/>
-                </a:solidFill>
-                <a:highlight>
-                  <a:srgbClr val="1E1E1E"/>
-                </a:highlight>
-                <a:latin typeface="Consolas" panose="020B0609020204030204" pitchFamily="49" charset="0"/>
-              </a:rPr>
-              <a:t>            </a:t>
-            </a:r>
-            <a:r>
-              <a:rPr lang="it-IT" sz="1000" dirty="0" err="1">
-                <a:solidFill>
-                  <a:srgbClr val="569CD6"/>
-                </a:solidFill>
-                <a:highlight>
-                  <a:srgbClr val="1E1E1E"/>
-                </a:highlight>
-                <a:latin typeface="Consolas" panose="020B0609020204030204" pitchFamily="49" charset="0"/>
-              </a:rPr>
-              <a:t>return</a:t>
-            </a:r>
-            <a:r>
-              <a:rPr lang="it-IT" sz="1000" dirty="0">
-                <a:solidFill>
-                  <a:srgbClr val="DCDCDC"/>
-                </a:solidFill>
-                <a:highlight>
-                  <a:srgbClr val="1E1E1E"/>
-                </a:highlight>
-                <a:latin typeface="Consolas" panose="020B0609020204030204" pitchFamily="49" charset="0"/>
-              </a:rPr>
-              <a:t> sum;</a:t>
-            </a:r>
-          </a:p>
-          <a:p>
-            <a:r>
-              <a:rPr lang="it-IT" sz="1000" dirty="0">
-                <a:solidFill>
-                  <a:srgbClr val="DCDCDC"/>
-                </a:solidFill>
-                <a:highlight>
-                  <a:srgbClr val="1E1E1E"/>
-                </a:highlight>
-                <a:latin typeface="Consolas" panose="020B0609020204030204" pitchFamily="49" charset="0"/>
-              </a:rPr>
-              <a:t>        </a:t>
-            </a:r>
-            <a:r>
-              <a:rPr lang="it-IT" sz="1000" dirty="0" smtClean="0">
-                <a:solidFill>
-                  <a:srgbClr val="DCDCDC"/>
-                </a:solidFill>
-                <a:highlight>
-                  <a:srgbClr val="1E1E1E"/>
-                </a:highlight>
-                <a:latin typeface="Consolas" panose="020B0609020204030204" pitchFamily="49" charset="0"/>
-              </a:rPr>
-              <a:t>}</a:t>
-            </a:r>
-          </a:p>
-          <a:p>
-            <a:r>
-              <a:rPr lang="it-IT" sz="1000" dirty="0" smtClean="0">
-                <a:solidFill>
-                  <a:srgbClr val="DCDCDC"/>
-                </a:solidFill>
-                <a:highlight>
-                  <a:srgbClr val="1E1E1E"/>
-                </a:highlight>
-                <a:latin typeface="Consolas" panose="020B0609020204030204" pitchFamily="49" charset="0"/>
-              </a:rPr>
-              <a:t>	  </a:t>
-            </a:r>
-            <a:r>
-              <a:rPr lang="it-IT" sz="1000" dirty="0">
-                <a:solidFill>
-                  <a:srgbClr val="569CD6"/>
-                </a:solidFill>
-                <a:highlight>
-                  <a:srgbClr val="1E1E1E"/>
-                </a:highlight>
-                <a:latin typeface="Consolas" panose="020B0609020204030204" pitchFamily="49" charset="0"/>
-              </a:rPr>
-              <a:t>public</a:t>
-            </a:r>
-            <a:r>
-              <a:rPr lang="it-IT" sz="1000" dirty="0">
-                <a:solidFill>
-                  <a:srgbClr val="DCDCDC"/>
-                </a:solidFill>
-                <a:highlight>
-                  <a:srgbClr val="1E1E1E"/>
-                </a:highlight>
-                <a:latin typeface="Consolas" panose="020B0609020204030204" pitchFamily="49" charset="0"/>
-              </a:rPr>
-              <a:t> </a:t>
-            </a:r>
-            <a:r>
-              <a:rPr lang="it-IT" sz="1000" dirty="0" err="1">
-                <a:solidFill>
-                  <a:srgbClr val="569CD6"/>
-                </a:solidFill>
-                <a:highlight>
-                  <a:srgbClr val="1E1E1E"/>
-                </a:highlight>
-                <a:latin typeface="Consolas" panose="020B0609020204030204" pitchFamily="49" charset="0"/>
-              </a:rPr>
-              <a:t>string</a:t>
-            </a:r>
-            <a:r>
-              <a:rPr lang="it-IT" sz="1000" dirty="0">
-                <a:solidFill>
-                  <a:srgbClr val="DCDCDC"/>
-                </a:solidFill>
-                <a:highlight>
-                  <a:srgbClr val="1E1E1E"/>
-                </a:highlight>
-                <a:latin typeface="Consolas" panose="020B0609020204030204" pitchFamily="49" charset="0"/>
-              </a:rPr>
-              <a:t> Show()</a:t>
-            </a:r>
-          </a:p>
-          <a:p>
-            <a:r>
-              <a:rPr lang="it-IT" sz="1000" dirty="0">
-                <a:solidFill>
-                  <a:srgbClr val="DCDCDC"/>
-                </a:solidFill>
-                <a:highlight>
-                  <a:srgbClr val="1E1E1E"/>
-                </a:highlight>
-                <a:latin typeface="Consolas" panose="020B0609020204030204" pitchFamily="49" charset="0"/>
-              </a:rPr>
-              <a:t>        {</a:t>
-            </a:r>
-          </a:p>
-          <a:p>
-            <a:r>
-              <a:rPr lang="it-IT" sz="1000" dirty="0">
-                <a:solidFill>
-                  <a:srgbClr val="DCDCDC"/>
-                </a:solidFill>
-                <a:highlight>
-                  <a:srgbClr val="1E1E1E"/>
-                </a:highlight>
-                <a:latin typeface="Consolas" panose="020B0609020204030204" pitchFamily="49" charset="0"/>
-              </a:rPr>
-              <a:t>            </a:t>
-            </a:r>
-            <a:r>
-              <a:rPr lang="it-IT" sz="1000" dirty="0" err="1">
-                <a:solidFill>
-                  <a:srgbClr val="569CD6"/>
-                </a:solidFill>
-                <a:highlight>
-                  <a:srgbClr val="1E1E1E"/>
-                </a:highlight>
-                <a:latin typeface="Consolas" panose="020B0609020204030204" pitchFamily="49" charset="0"/>
-              </a:rPr>
-              <a:t>return</a:t>
-            </a:r>
-            <a:r>
-              <a:rPr lang="it-IT" sz="1000" dirty="0">
-                <a:solidFill>
-                  <a:srgbClr val="DCDCDC"/>
-                </a:solidFill>
-                <a:highlight>
-                  <a:srgbClr val="1E1E1E"/>
-                </a:highlight>
-                <a:latin typeface="Consolas" panose="020B0609020204030204" pitchFamily="49" charset="0"/>
-              </a:rPr>
-              <a:t> </a:t>
-            </a:r>
-            <a:r>
-              <a:rPr lang="it-IT" sz="1000" dirty="0" err="1">
-                <a:solidFill>
-                  <a:srgbClr val="569CD6"/>
-                </a:solidFill>
-                <a:highlight>
-                  <a:srgbClr val="1E1E1E"/>
-                </a:highlight>
-                <a:latin typeface="Consolas" panose="020B0609020204030204" pitchFamily="49" charset="0"/>
-              </a:rPr>
-              <a:t>string</a:t>
-            </a:r>
-            <a:r>
-              <a:rPr lang="it-IT" sz="1000" dirty="0" err="1">
-                <a:solidFill>
-                  <a:srgbClr val="B4B4B4"/>
-                </a:solidFill>
-                <a:highlight>
-                  <a:srgbClr val="1E1E1E"/>
-                </a:highlight>
-                <a:latin typeface="Consolas" panose="020B0609020204030204" pitchFamily="49" charset="0"/>
-              </a:rPr>
-              <a:t>.</a:t>
-            </a:r>
-            <a:r>
-              <a:rPr lang="it-IT" sz="1000" dirty="0" err="1">
-                <a:solidFill>
-                  <a:srgbClr val="DCDCDC"/>
-                </a:solidFill>
-                <a:highlight>
-                  <a:srgbClr val="1E1E1E"/>
-                </a:highlight>
-                <a:latin typeface="Consolas" panose="020B0609020204030204" pitchFamily="49" charset="0"/>
-              </a:rPr>
-              <a:t>Format</a:t>
-            </a:r>
-            <a:r>
-              <a:rPr lang="it-IT" sz="1000" dirty="0">
-                <a:solidFill>
-                  <a:srgbClr val="DCDCDC"/>
-                </a:solidFill>
-                <a:highlight>
-                  <a:srgbClr val="1E1E1E"/>
-                </a:highlight>
-                <a:latin typeface="Consolas" panose="020B0609020204030204" pitchFamily="49" charset="0"/>
-              </a:rPr>
-              <a:t>(</a:t>
-            </a:r>
-            <a:r>
-              <a:rPr lang="it-IT" sz="1000" dirty="0">
-                <a:solidFill>
-                  <a:srgbClr val="D69D85"/>
-                </a:solidFill>
-                <a:highlight>
-                  <a:srgbClr val="1E1E1E"/>
-                </a:highlight>
-                <a:latin typeface="Consolas" panose="020B0609020204030204" pitchFamily="49" charset="0"/>
-              </a:rPr>
-              <a:t>"&lt;div&gt;</a:t>
-            </a:r>
-            <a:r>
-              <a:rPr lang="it-IT" sz="1000" dirty="0">
-                <a:solidFill>
-                  <a:srgbClr val="80FF80"/>
-                </a:solidFill>
-                <a:highlight>
-                  <a:srgbClr val="1E1E1E"/>
-                </a:highlight>
-                <a:latin typeface="Consolas" panose="020B0609020204030204" pitchFamily="49" charset="0"/>
-              </a:rPr>
-              <a:t>{0}</a:t>
-            </a:r>
-            <a:r>
-              <a:rPr lang="it-IT" sz="1000" dirty="0">
-                <a:solidFill>
-                  <a:srgbClr val="D69D85"/>
-                </a:solidFill>
-                <a:highlight>
-                  <a:srgbClr val="1E1E1E"/>
-                </a:highlight>
-                <a:latin typeface="Consolas" panose="020B0609020204030204" pitchFamily="49" charset="0"/>
-              </a:rPr>
-              <a:t>&lt;/div&gt;"</a:t>
-            </a:r>
-            <a:r>
-              <a:rPr lang="it-IT" sz="1000" dirty="0">
-                <a:solidFill>
-                  <a:srgbClr val="DCDCDC"/>
-                </a:solidFill>
-                <a:highlight>
-                  <a:srgbClr val="1E1E1E"/>
-                </a:highlight>
-                <a:latin typeface="Consolas" panose="020B0609020204030204" pitchFamily="49" charset="0"/>
-              </a:rPr>
-              <a:t>, Sum());</a:t>
-            </a:r>
-          </a:p>
-          <a:p>
-            <a:r>
-              <a:rPr lang="it-IT" sz="1000" dirty="0">
-                <a:solidFill>
-                  <a:srgbClr val="DCDCDC"/>
-                </a:solidFill>
-                <a:highlight>
-                  <a:srgbClr val="1E1E1E"/>
-                </a:highlight>
-                <a:latin typeface="Consolas" panose="020B0609020204030204" pitchFamily="49" charset="0"/>
-              </a:rPr>
-              <a:t>        }</a:t>
-            </a:r>
-          </a:p>
-          <a:p>
-            <a:r>
-              <a:rPr lang="it-IT" sz="1000" dirty="0" smtClean="0">
-                <a:solidFill>
-                  <a:srgbClr val="DCDCDC"/>
-                </a:solidFill>
-                <a:highlight>
-                  <a:srgbClr val="1E1E1E"/>
-                </a:highlight>
-                <a:latin typeface="Consolas" panose="020B0609020204030204" pitchFamily="49" charset="0"/>
-              </a:rPr>
-              <a:t> </a:t>
-            </a:r>
-            <a:r>
-              <a:rPr lang="it-IT" sz="1000" dirty="0">
-                <a:solidFill>
-                  <a:srgbClr val="DCDCDC"/>
-                </a:solidFill>
-                <a:highlight>
-                  <a:srgbClr val="1E1E1E"/>
-                </a:highlight>
-                <a:latin typeface="Consolas" panose="020B0609020204030204" pitchFamily="49" charset="0"/>
-              </a:rPr>
-              <a:t>}</a:t>
-            </a:r>
-            <a:endParaRPr lang="en-GB" sz="1000" dirty="0" smtClean="0">
-              <a:latin typeface="Chronicle Display" pitchFamily="50" charset="0"/>
-            </a:endParaRPr>
-          </a:p>
-        </p:txBody>
-      </p:sp>
-    </p:spTree>
-    <p:extLst>
-      <p:ext uri="{BB962C8B-B14F-4D97-AF65-F5344CB8AC3E}">
-        <p14:creationId xmlns:p14="http://schemas.microsoft.com/office/powerpoint/2010/main" val="2045971338"/>
+        <p14:creationId xmlns:p14="http://schemas.microsoft.com/office/powerpoint/2010/main" val="2330356376"/>
       </p:ext>
     </p:extLst>
   </p:cSld>

</xml_diff>

<commit_message>
adding callbacks to solve
</commit_message>
<xml_diff>
--- a/docs/noif.pptx
+++ b/docs/noif.pptx
@@ -6,7 +6,7 @@
     <p:sldMasterId id="2147483648" r:id="rId2"/>
   </p:sldMasterIdLst>
   <p:notesMasterIdLst>
-    <p:notesMasterId r:id="rId13"/>
+    <p:notesMasterId r:id="rId17"/>
   </p:notesMasterIdLst>
   <p:sldIdLst>
     <p:sldId id="264" r:id="rId3"/>
@@ -18,7 +18,11 @@
     <p:sldId id="318" r:id="rId9"/>
     <p:sldId id="319" r:id="rId10"/>
     <p:sldId id="320" r:id="rId11"/>
-    <p:sldId id="317" r:id="rId12"/>
+    <p:sldId id="321" r:id="rId12"/>
+    <p:sldId id="322" r:id="rId13"/>
+    <p:sldId id="323" r:id="rId14"/>
+    <p:sldId id="324" r:id="rId15"/>
+    <p:sldId id="317" r:id="rId16"/>
   </p:sldIdLst>
   <p:sldSz cx="9144000" cy="6858000" type="screen4x3"/>
   <p:notesSz cx="6858000" cy="9144000"/>
@@ -629,6 +633,55 @@
           <a:bodyPr/>
           <a:lstStyle/>
           <a:p>
+            <a:pPr marL="171450" marR="0" lvl="0" indent="-171450" algn="l" defTabSz="914400" rtl="0" eaLnBrk="1" fontAlgn="auto" latinLnBrk="0" hangingPunct="1">
+              <a:lnSpc>
+                <a:spcPct val="100000"/>
+              </a:lnSpc>
+              <a:spcBef>
+                <a:spcPts val="0"/>
+              </a:spcBef>
+              <a:spcAft>
+                <a:spcPts val="0"/>
+              </a:spcAft>
+              <a:buClrTx/>
+              <a:buSzTx/>
+              <a:buFontTx/>
+              <a:buNone/>
+              <a:tabLst/>
+              <a:defRPr/>
+            </a:pPr>
+            <a:r>
+              <a:rPr lang="it-IT" dirty="0" smtClean="0"/>
+              <a:t>- </a:t>
+            </a:r>
+            <a:r>
+              <a:rPr lang="it-IT" dirty="0" err="1" smtClean="0"/>
+              <a:t>Sometimes</a:t>
+            </a:r>
+            <a:r>
+              <a:rPr lang="it-IT" dirty="0" smtClean="0"/>
+              <a:t> </a:t>
+            </a:r>
+            <a:r>
+              <a:rPr lang="it-IT" dirty="0" err="1" smtClean="0"/>
+              <a:t>methods</a:t>
+            </a:r>
+            <a:r>
+              <a:rPr lang="it-IT" dirty="0" smtClean="0"/>
+              <a:t> </a:t>
+            </a:r>
+            <a:r>
+              <a:rPr lang="it-IT" dirty="0" err="1" smtClean="0"/>
+              <a:t>return</a:t>
+            </a:r>
+            <a:r>
+              <a:rPr lang="it-IT" dirty="0" smtClean="0"/>
+              <a:t> </a:t>
+            </a:r>
+            <a:r>
+              <a:rPr lang="it-IT" dirty="0" err="1" smtClean="0"/>
+              <a:t>null</a:t>
+            </a:r>
             <a:endParaRPr lang="it-IT" dirty="0"/>
           </a:p>
         </p:txBody>
@@ -651,6 +704,354 @@
             <a:fld id="{2C5A56FE-B2E8-4285-8F31-2AEEB8EA39C6}" type="slidenum">
               <a:rPr lang="en-GB" smtClean="0"/>
               <a:t>10</a:t>
+            </a:fld>
+            <a:endParaRPr lang="en-GB"/>
+          </a:p>
+        </p:txBody>
+      </p:sp>
+    </p:spTree>
+    <p:extLst>
+      <p:ext uri="{BB962C8B-B14F-4D97-AF65-F5344CB8AC3E}">
+        <p14:creationId xmlns:p14="http://schemas.microsoft.com/office/powerpoint/2010/main" val="792088354"/>
+      </p:ext>
+    </p:extLst>
+  </p:cSld>
+  <p:clrMapOvr>
+    <a:masterClrMapping/>
+  </p:clrMapOvr>
+</p:notes>
+</file>
+
+<file path=ppt/notesSlides/notesSlide11.xml><?xml version="1.0" encoding="utf-8"?>
+<p:notes xmlns:a="http://schemas.openxmlformats.org/drawingml/2006/main" xmlns:r="http://schemas.openxmlformats.org/officeDocument/2006/relationships" xmlns:p="http://schemas.openxmlformats.org/presentationml/2006/main">
+  <p:cSld>
+    <p:spTree>
+      <p:nvGrpSpPr>
+        <p:cNvPr id="1" name=""/>
+        <p:cNvGrpSpPr/>
+        <p:nvPr/>
+      </p:nvGrpSpPr>
+      <p:grpSpPr>
+        <a:xfrm>
+          <a:off x="0" y="0"/>
+          <a:ext cx="0" cy="0"/>
+          <a:chOff x="0" y="0"/>
+          <a:chExt cx="0" cy="0"/>
+        </a:xfrm>
+      </p:grpSpPr>
+      <p:sp>
+        <p:nvSpPr>
+          <p:cNvPr id="2" name="Slide Image Placeholder 1"/>
+          <p:cNvSpPr>
+            <a:spLocks noGrp="1" noRot="1" noChangeAspect="1"/>
+          </p:cNvSpPr>
+          <p:nvPr>
+            <p:ph type="sldImg"/>
+          </p:nvPr>
+        </p:nvSpPr>
+        <p:spPr/>
+      </p:sp>
+      <p:sp>
+        <p:nvSpPr>
+          <p:cNvPr id="3" name="Notes Placeholder 2"/>
+          <p:cNvSpPr>
+            <a:spLocks noGrp="1"/>
+          </p:cNvSpPr>
+          <p:nvPr>
+            <p:ph type="body" idx="1"/>
+          </p:nvPr>
+        </p:nvSpPr>
+        <p:spPr/>
+        <p:txBody>
+          <a:bodyPr/>
+          <a:lstStyle/>
+          <a:p>
+            <a:pPr marL="171450" indent="-171450">
+              <a:buFontTx/>
+              <a:buChar char="-"/>
+            </a:pPr>
+            <a:endParaRPr lang="it-IT" dirty="0"/>
+          </a:p>
+        </p:txBody>
+      </p:sp>
+      <p:sp>
+        <p:nvSpPr>
+          <p:cNvPr id="4" name="Slide Number Placeholder 3"/>
+          <p:cNvSpPr>
+            <a:spLocks noGrp="1"/>
+          </p:cNvSpPr>
+          <p:nvPr>
+            <p:ph type="sldNum" sz="quarter" idx="10"/>
+          </p:nvPr>
+        </p:nvSpPr>
+        <p:spPr/>
+        <p:txBody>
+          <a:bodyPr/>
+          <a:lstStyle/>
+          <a:p>
+            <a:fld id="{2C5A56FE-B2E8-4285-8F31-2AEEB8EA39C6}" type="slidenum">
+              <a:rPr lang="en-GB" smtClean="0"/>
+              <a:t>11</a:t>
+            </a:fld>
+            <a:endParaRPr lang="en-GB"/>
+          </a:p>
+        </p:txBody>
+      </p:sp>
+    </p:spTree>
+    <p:extLst>
+      <p:ext uri="{BB962C8B-B14F-4D97-AF65-F5344CB8AC3E}">
+        <p14:creationId xmlns:p14="http://schemas.microsoft.com/office/powerpoint/2010/main" val="1151283582"/>
+      </p:ext>
+    </p:extLst>
+  </p:cSld>
+  <p:clrMapOvr>
+    <a:masterClrMapping/>
+  </p:clrMapOvr>
+</p:notes>
+</file>
+
+<file path=ppt/notesSlides/notesSlide12.xml><?xml version="1.0" encoding="utf-8"?>
+<p:notes xmlns:a="http://schemas.openxmlformats.org/drawingml/2006/main" xmlns:r="http://schemas.openxmlformats.org/officeDocument/2006/relationships" xmlns:p="http://schemas.openxmlformats.org/presentationml/2006/main">
+  <p:cSld>
+    <p:spTree>
+      <p:nvGrpSpPr>
+        <p:cNvPr id="1" name=""/>
+        <p:cNvGrpSpPr/>
+        <p:nvPr/>
+      </p:nvGrpSpPr>
+      <p:grpSpPr>
+        <a:xfrm>
+          <a:off x="0" y="0"/>
+          <a:ext cx="0" cy="0"/>
+          <a:chOff x="0" y="0"/>
+          <a:chExt cx="0" cy="0"/>
+        </a:xfrm>
+      </p:grpSpPr>
+      <p:sp>
+        <p:nvSpPr>
+          <p:cNvPr id="2" name="Slide Image Placeholder 1"/>
+          <p:cNvSpPr>
+            <a:spLocks noGrp="1" noRot="1" noChangeAspect="1"/>
+          </p:cNvSpPr>
+          <p:nvPr>
+            <p:ph type="sldImg"/>
+          </p:nvPr>
+        </p:nvSpPr>
+        <p:spPr/>
+      </p:sp>
+      <p:sp>
+        <p:nvSpPr>
+          <p:cNvPr id="3" name="Notes Placeholder 2"/>
+          <p:cNvSpPr>
+            <a:spLocks noGrp="1"/>
+          </p:cNvSpPr>
+          <p:nvPr>
+            <p:ph type="body" idx="1"/>
+          </p:nvPr>
+        </p:nvSpPr>
+        <p:spPr/>
+        <p:txBody>
+          <a:bodyPr/>
+          <a:lstStyle/>
+          <a:p>
+            <a:pPr marL="171450" indent="-171450">
+              <a:buFontTx/>
+              <a:buChar char="-"/>
+            </a:pPr>
+            <a:endParaRPr lang="it-IT" dirty="0"/>
+          </a:p>
+        </p:txBody>
+      </p:sp>
+      <p:sp>
+        <p:nvSpPr>
+          <p:cNvPr id="4" name="Slide Number Placeholder 3"/>
+          <p:cNvSpPr>
+            <a:spLocks noGrp="1"/>
+          </p:cNvSpPr>
+          <p:nvPr>
+            <p:ph type="sldNum" sz="quarter" idx="10"/>
+          </p:nvPr>
+        </p:nvSpPr>
+        <p:spPr/>
+        <p:txBody>
+          <a:bodyPr/>
+          <a:lstStyle/>
+          <a:p>
+            <a:fld id="{2C5A56FE-B2E8-4285-8F31-2AEEB8EA39C6}" type="slidenum">
+              <a:rPr lang="en-GB" smtClean="0"/>
+              <a:t>12</a:t>
+            </a:fld>
+            <a:endParaRPr lang="en-GB"/>
+          </a:p>
+        </p:txBody>
+      </p:sp>
+    </p:spTree>
+    <p:extLst>
+      <p:ext uri="{BB962C8B-B14F-4D97-AF65-F5344CB8AC3E}">
+        <p14:creationId xmlns:p14="http://schemas.microsoft.com/office/powerpoint/2010/main" val="1710101006"/>
+      </p:ext>
+    </p:extLst>
+  </p:cSld>
+  <p:clrMapOvr>
+    <a:masterClrMapping/>
+  </p:clrMapOvr>
+</p:notes>
+</file>
+
+<file path=ppt/notesSlides/notesSlide13.xml><?xml version="1.0" encoding="utf-8"?>
+<p:notes xmlns:a="http://schemas.openxmlformats.org/drawingml/2006/main" xmlns:r="http://schemas.openxmlformats.org/officeDocument/2006/relationships" xmlns:p="http://schemas.openxmlformats.org/presentationml/2006/main">
+  <p:cSld>
+    <p:spTree>
+      <p:nvGrpSpPr>
+        <p:cNvPr id="1" name=""/>
+        <p:cNvGrpSpPr/>
+        <p:nvPr/>
+      </p:nvGrpSpPr>
+      <p:grpSpPr>
+        <a:xfrm>
+          <a:off x="0" y="0"/>
+          <a:ext cx="0" cy="0"/>
+          <a:chOff x="0" y="0"/>
+          <a:chExt cx="0" cy="0"/>
+        </a:xfrm>
+      </p:grpSpPr>
+      <p:sp>
+        <p:nvSpPr>
+          <p:cNvPr id="2" name="Slide Image Placeholder 1"/>
+          <p:cNvSpPr>
+            <a:spLocks noGrp="1" noRot="1" noChangeAspect="1"/>
+          </p:cNvSpPr>
+          <p:nvPr>
+            <p:ph type="sldImg"/>
+          </p:nvPr>
+        </p:nvSpPr>
+        <p:spPr/>
+      </p:sp>
+      <p:sp>
+        <p:nvSpPr>
+          <p:cNvPr id="3" name="Notes Placeholder 2"/>
+          <p:cNvSpPr>
+            <a:spLocks noGrp="1"/>
+          </p:cNvSpPr>
+          <p:nvPr>
+            <p:ph type="body" idx="1"/>
+          </p:nvPr>
+        </p:nvSpPr>
+        <p:spPr/>
+        <p:txBody>
+          <a:bodyPr/>
+          <a:lstStyle/>
+          <a:p>
+            <a:pPr marL="171450" indent="-171450">
+              <a:buFontTx/>
+              <a:buChar char="-"/>
+            </a:pPr>
+            <a:endParaRPr lang="it-IT" dirty="0"/>
+          </a:p>
+        </p:txBody>
+      </p:sp>
+      <p:sp>
+        <p:nvSpPr>
+          <p:cNvPr id="4" name="Slide Number Placeholder 3"/>
+          <p:cNvSpPr>
+            <a:spLocks noGrp="1"/>
+          </p:cNvSpPr>
+          <p:nvPr>
+            <p:ph type="sldNum" sz="quarter" idx="10"/>
+          </p:nvPr>
+        </p:nvSpPr>
+        <p:spPr/>
+        <p:txBody>
+          <a:bodyPr/>
+          <a:lstStyle/>
+          <a:p>
+            <a:fld id="{2C5A56FE-B2E8-4285-8F31-2AEEB8EA39C6}" type="slidenum">
+              <a:rPr lang="en-GB" smtClean="0"/>
+              <a:t>13</a:t>
+            </a:fld>
+            <a:endParaRPr lang="en-GB"/>
+          </a:p>
+        </p:txBody>
+      </p:sp>
+    </p:spTree>
+    <p:extLst>
+      <p:ext uri="{BB962C8B-B14F-4D97-AF65-F5344CB8AC3E}">
+        <p14:creationId xmlns:p14="http://schemas.microsoft.com/office/powerpoint/2010/main" val="181527561"/>
+      </p:ext>
+    </p:extLst>
+  </p:cSld>
+  <p:clrMapOvr>
+    <a:masterClrMapping/>
+  </p:clrMapOvr>
+</p:notes>
+</file>
+
+<file path=ppt/notesSlides/notesSlide14.xml><?xml version="1.0" encoding="utf-8"?>
+<p:notes xmlns:a="http://schemas.openxmlformats.org/drawingml/2006/main" xmlns:r="http://schemas.openxmlformats.org/officeDocument/2006/relationships" xmlns:p="http://schemas.openxmlformats.org/presentationml/2006/main">
+  <p:cSld>
+    <p:spTree>
+      <p:nvGrpSpPr>
+        <p:cNvPr id="1" name=""/>
+        <p:cNvGrpSpPr/>
+        <p:nvPr/>
+      </p:nvGrpSpPr>
+      <p:grpSpPr>
+        <a:xfrm>
+          <a:off x="0" y="0"/>
+          <a:ext cx="0" cy="0"/>
+          <a:chOff x="0" y="0"/>
+          <a:chExt cx="0" cy="0"/>
+        </a:xfrm>
+      </p:grpSpPr>
+      <p:sp>
+        <p:nvSpPr>
+          <p:cNvPr id="2" name="Slide Image Placeholder 1"/>
+          <p:cNvSpPr>
+            <a:spLocks noGrp="1" noRot="1" noChangeAspect="1"/>
+          </p:cNvSpPr>
+          <p:nvPr>
+            <p:ph type="sldImg"/>
+          </p:nvPr>
+        </p:nvSpPr>
+        <p:spPr/>
+      </p:sp>
+      <p:sp>
+        <p:nvSpPr>
+          <p:cNvPr id="3" name="Notes Placeholder 2"/>
+          <p:cNvSpPr>
+            <a:spLocks noGrp="1"/>
+          </p:cNvSpPr>
+          <p:nvPr>
+            <p:ph type="body" idx="1"/>
+          </p:nvPr>
+        </p:nvSpPr>
+        <p:spPr/>
+        <p:txBody>
+          <a:bodyPr/>
+          <a:lstStyle/>
+          <a:p>
+            <a:endParaRPr lang="it-IT" dirty="0"/>
+          </a:p>
+        </p:txBody>
+      </p:sp>
+      <p:sp>
+        <p:nvSpPr>
+          <p:cNvPr id="4" name="Slide Number Placeholder 3"/>
+          <p:cNvSpPr>
+            <a:spLocks noGrp="1"/>
+          </p:cNvSpPr>
+          <p:nvPr>
+            <p:ph type="sldNum" sz="quarter" idx="10"/>
+          </p:nvPr>
+        </p:nvSpPr>
+        <p:spPr/>
+        <p:txBody>
+          <a:bodyPr/>
+          <a:lstStyle/>
+          <a:p>
+            <a:fld id="{2C5A56FE-B2E8-4285-8F31-2AEEB8EA39C6}" type="slidenum">
+              <a:rPr lang="en-GB" smtClean="0"/>
+              <a:t>14</a:t>
             </a:fld>
             <a:endParaRPr lang="en-GB"/>
           </a:p>
@@ -1608,60 +2009,6 @@
         <p:txBody>
           <a:bodyPr/>
           <a:lstStyle/>
-          <a:p>
-            <a:pPr marL="171450" indent="-171450">
-              <a:buFontTx/>
-              <a:buChar char="-"/>
-            </a:pPr>
-            <a:r>
-              <a:rPr lang="it-IT" dirty="0" err="1" smtClean="0"/>
-              <a:t>Every</a:t>
-            </a:r>
-            <a:r>
-              <a:rPr lang="it-IT" baseline="0" dirty="0" smtClean="0"/>
-              <a:t> time </a:t>
-            </a:r>
-            <a:r>
-              <a:rPr lang="it-IT" baseline="0" dirty="0" err="1" smtClean="0"/>
-              <a:t>we</a:t>
-            </a:r>
-            <a:r>
-              <a:rPr lang="it-IT" baseline="0" dirty="0" smtClean="0"/>
-              <a:t> call </a:t>
-            </a:r>
-            <a:r>
-              <a:rPr lang="it-IT" baseline="0" dirty="0" err="1" smtClean="0"/>
-              <a:t>getInstance</a:t>
-            </a:r>
-            <a:r>
-              <a:rPr lang="it-IT" baseline="0" dirty="0" smtClean="0"/>
-              <a:t> </a:t>
-            </a:r>
-            <a:r>
-              <a:rPr lang="it-IT" baseline="0" dirty="0" err="1" smtClean="0"/>
-              <a:t>method</a:t>
-            </a:r>
-            <a:r>
-              <a:rPr lang="it-IT" baseline="0" dirty="0" smtClean="0"/>
-              <a:t> </a:t>
-            </a:r>
-            <a:r>
-              <a:rPr lang="it-IT" baseline="0" dirty="0" err="1" smtClean="0"/>
-              <a:t>we</a:t>
-            </a:r>
-            <a:r>
-              <a:rPr lang="it-IT" baseline="0" dirty="0" smtClean="0"/>
-              <a:t> </a:t>
-            </a:r>
-            <a:r>
-              <a:rPr lang="it-IT" baseline="0" dirty="0" err="1" smtClean="0"/>
-              <a:t>perform</a:t>
-            </a:r>
-            <a:r>
-              <a:rPr lang="it-IT" baseline="0" dirty="0" smtClean="0"/>
-              <a:t> an IF statement</a:t>
-            </a:r>
-          </a:p>
           <a:p>
             <a:pPr marL="171450" indent="-171450">
               <a:buFontTx/>
@@ -4228,6 +4575,1605 @@
         </p:nvSpPr>
         <p:spPr>
           <a:xfrm>
+            <a:off x="328613" y="1079046"/>
+            <a:ext cx="8401246" cy="5573423"/>
+          </a:xfrm>
+          <a:solidFill>
+            <a:schemeClr val="tx1"/>
+          </a:solidFill>
+        </p:spPr>
+        <p:txBody>
+          <a:bodyPr/>
+          <a:lstStyle/>
+          <a:p>
+            <a:r>
+              <a:rPr lang="en-US" sz="1800" dirty="0" smtClean="0">
+                <a:solidFill>
+                  <a:schemeClr val="bg1"/>
+                </a:solidFill>
+              </a:rPr>
+              <a:t>Return null</a:t>
+            </a:r>
+            <a:endParaRPr lang="en-US" sz="1800" dirty="0" smtClean="0">
+              <a:solidFill>
+                <a:schemeClr val="bg1"/>
+              </a:solidFill>
+            </a:endParaRPr>
+          </a:p>
+          <a:p>
+            <a:endParaRPr lang="en-US" sz="1800" dirty="0" smtClean="0">
+              <a:solidFill>
+                <a:schemeClr val="bg1"/>
+              </a:solidFill>
+            </a:endParaRPr>
+          </a:p>
+        </p:txBody>
+      </p:sp>
+      <p:pic>
+        <p:nvPicPr>
+          <p:cNvPr id="3" name="Picture 2"/>
+          <p:cNvPicPr>
+            <a:picLocks noChangeAspect="1"/>
+          </p:cNvPicPr>
+          <p:nvPr/>
+        </p:nvPicPr>
+        <p:blipFill>
+          <a:blip r:embed="rId3">
+            <a:extLst>
+              <a:ext uri="{28A0092B-C50C-407E-A947-70E740481C1C}">
+                <a14:useLocalDpi xmlns:a14="http://schemas.microsoft.com/office/drawing/2010/main" val="0"/>
+              </a:ext>
+            </a:extLst>
+          </a:blip>
+          <a:stretch>
+            <a:fillRect/>
+          </a:stretch>
+        </p:blipFill>
+        <p:spPr>
+          <a:xfrm>
+            <a:off x="1053579" y="1981899"/>
+            <a:ext cx="6951313" cy="3621947"/>
+          </a:xfrm>
+          <a:prstGeom prst="rect">
+            <a:avLst/>
+          </a:prstGeom>
+        </p:spPr>
+      </p:pic>
+      <p:sp>
+        <p:nvSpPr>
+          <p:cNvPr id="6" name="Left Arrow 5"/>
+          <p:cNvSpPr/>
+          <p:nvPr/>
+        </p:nvSpPr>
+        <p:spPr>
+          <a:xfrm>
+            <a:off x="3455445" y="4513277"/>
+            <a:ext cx="1460504" cy="627245"/>
+          </a:xfrm>
+          <a:prstGeom prst="leftArrow">
+            <a:avLst/>
+          </a:prstGeom>
+          <a:solidFill>
+            <a:srgbClr val="FF0000"/>
+          </a:solidFill>
+        </p:spPr>
+        <p:style>
+          <a:lnRef idx="1">
+            <a:schemeClr val="accent1"/>
+          </a:lnRef>
+          <a:fillRef idx="3">
+            <a:schemeClr val="accent1"/>
+          </a:fillRef>
+          <a:effectRef idx="2">
+            <a:schemeClr val="accent1"/>
+          </a:effectRef>
+          <a:fontRef idx="minor">
+            <a:schemeClr val="lt1"/>
+          </a:fontRef>
+        </p:style>
+        <p:txBody>
+          <a:bodyPr rtlCol="0" anchor="ctr"/>
+          <a:lstStyle/>
+          <a:p>
+            <a:pPr algn="ctr"/>
+            <a:endParaRPr lang="en-US"/>
+          </a:p>
+        </p:txBody>
+      </p:sp>
+    </p:spTree>
+    <p:extLst>
+      <p:ext uri="{BB962C8B-B14F-4D97-AF65-F5344CB8AC3E}">
+        <p14:creationId xmlns:p14="http://schemas.microsoft.com/office/powerpoint/2010/main" val="52689674"/>
+      </p:ext>
+    </p:extLst>
+  </p:cSld>
+  <p:clrMapOvr>
+    <a:masterClrMapping/>
+  </p:clrMapOvr>
+  <p:timing>
+    <p:tnLst>
+      <p:par>
+        <p:cTn id="1" dur="indefinite" restart="never" nodeType="tmRoot">
+          <p:childTnLst>
+            <p:seq concurrent="1" nextAc="seek">
+              <p:cTn id="2" dur="indefinite" nodeType="mainSeq">
+                <p:childTnLst>
+                  <p:par>
+                    <p:cTn id="3" fill="hold">
+                      <p:stCondLst>
+                        <p:cond delay="indefinite"/>
+                      </p:stCondLst>
+                      <p:childTnLst>
+                        <p:par>
+                          <p:cTn id="4" fill="hold">
+                            <p:stCondLst>
+                              <p:cond delay="0"/>
+                            </p:stCondLst>
+                            <p:childTnLst>
+                              <p:par>
+                                <p:cTn id="5" presetID="1" presetClass="entr" presetSubtype="0" fill="hold" nodeType="clickEffect">
+                                  <p:stCondLst>
+                                    <p:cond delay="0"/>
+                                  </p:stCondLst>
+                                  <p:childTnLst>
+                                    <p:set>
+                                      <p:cBhvr>
+                                        <p:cTn id="6" dur="1" fill="hold">
+                                          <p:stCondLst>
+                                            <p:cond delay="0"/>
+                                          </p:stCondLst>
+                                        </p:cTn>
+                                        <p:tgtEl>
+                                          <p:spTgt spid="3"/>
+                                        </p:tgtEl>
+                                        <p:attrNameLst>
+                                          <p:attrName>style.visibility</p:attrName>
+                                        </p:attrNameLst>
+                                      </p:cBhvr>
+                                      <p:to>
+                                        <p:strVal val="visible"/>
+                                      </p:to>
+                                    </p:set>
+                                  </p:childTnLst>
+                                </p:cTn>
+                              </p:par>
+                            </p:childTnLst>
+                          </p:cTn>
+                        </p:par>
+                      </p:childTnLst>
+                    </p:cTn>
+                  </p:par>
+                  <p:par>
+                    <p:cTn id="7" fill="hold">
+                      <p:stCondLst>
+                        <p:cond delay="indefinite"/>
+                      </p:stCondLst>
+                      <p:childTnLst>
+                        <p:par>
+                          <p:cTn id="8" fill="hold">
+                            <p:stCondLst>
+                              <p:cond delay="0"/>
+                            </p:stCondLst>
+                            <p:childTnLst>
+                              <p:par>
+                                <p:cTn id="9" presetID="1" presetClass="entr" presetSubtype="0" fill="hold" grpId="0" nodeType="clickEffect">
+                                  <p:stCondLst>
+                                    <p:cond delay="0"/>
+                                  </p:stCondLst>
+                                  <p:childTnLst>
+                                    <p:set>
+                                      <p:cBhvr>
+                                        <p:cTn id="10" dur="1" fill="hold">
+                                          <p:stCondLst>
+                                            <p:cond delay="0"/>
+                                          </p:stCondLst>
+                                        </p:cTn>
+                                        <p:tgtEl>
+                                          <p:spTgt spid="6"/>
+                                        </p:tgtEl>
+                                        <p:attrNameLst>
+                                          <p:attrName>style.visibility</p:attrName>
+                                        </p:attrNameLst>
+                                      </p:cBhvr>
+                                      <p:to>
+                                        <p:strVal val="visible"/>
+                                      </p:to>
+                                    </p:set>
+                                  </p:childTnLst>
+                                </p:cTn>
+                              </p:par>
+                            </p:childTnLst>
+                          </p:cTn>
+                        </p:par>
+                      </p:childTnLst>
+                    </p:cTn>
+                  </p:par>
+                </p:childTnLst>
+              </p:cTn>
+              <p:prevCondLst>
+                <p:cond evt="onPrev" delay="0">
+                  <p:tgtEl>
+                    <p:sldTgt/>
+                  </p:tgtEl>
+                </p:cond>
+              </p:prevCondLst>
+              <p:nextCondLst>
+                <p:cond evt="onNext" delay="0">
+                  <p:tgtEl>
+                    <p:sldTgt/>
+                  </p:tgtEl>
+                </p:cond>
+              </p:nextCondLst>
+            </p:seq>
+          </p:childTnLst>
+        </p:cTn>
+      </p:par>
+    </p:tnLst>
+    <p:bldLst>
+      <p:bldP spid="6" grpId="0" animBg="1"/>
+    </p:bldLst>
+  </p:timing>
+</p:sld>
+</file>
+
+<file path=ppt/slides/slide11.xml><?xml version="1.0" encoding="utf-8"?>
+<p:sld xmlns:a="http://schemas.openxmlformats.org/drawingml/2006/main" xmlns:r="http://schemas.openxmlformats.org/officeDocument/2006/relationships" xmlns:p="http://schemas.openxmlformats.org/presentationml/2006/main">
+  <p:cSld>
+    <p:spTree>
+      <p:nvGrpSpPr>
+        <p:cNvPr id="1" name=""/>
+        <p:cNvGrpSpPr/>
+        <p:nvPr/>
+      </p:nvGrpSpPr>
+      <p:grpSpPr>
+        <a:xfrm>
+          <a:off x="0" y="0"/>
+          <a:ext cx="0" cy="0"/>
+          <a:chOff x="0" y="0"/>
+          <a:chExt cx="0" cy="0"/>
+        </a:xfrm>
+      </p:grpSpPr>
+      <p:sp>
+        <p:nvSpPr>
+          <p:cNvPr id="2" name="Text Placeholder 1"/>
+          <p:cNvSpPr>
+            <a:spLocks noGrp="1"/>
+          </p:cNvSpPr>
+          <p:nvPr>
+            <p:ph type="body" sz="quarter" idx="11"/>
+          </p:nvPr>
+        </p:nvSpPr>
+        <p:spPr>
+          <a:xfrm>
+            <a:off x="328613" y="1079046"/>
+            <a:ext cx="8401246" cy="5573423"/>
+          </a:xfrm>
+          <a:solidFill>
+            <a:schemeClr val="tx1"/>
+          </a:solidFill>
+        </p:spPr>
+        <p:txBody>
+          <a:bodyPr/>
+          <a:lstStyle/>
+          <a:p>
+            <a:r>
+              <a:rPr lang="en-US" sz="1800" dirty="0" smtClean="0">
+                <a:solidFill>
+                  <a:schemeClr val="bg1"/>
+                </a:solidFill>
+              </a:rPr>
+              <a:t>Return null</a:t>
+            </a:r>
+            <a:endParaRPr lang="en-US" sz="1800" dirty="0" smtClean="0">
+              <a:solidFill>
+                <a:schemeClr val="bg1"/>
+              </a:solidFill>
+            </a:endParaRPr>
+          </a:p>
+        </p:txBody>
+      </p:sp>
+      <p:pic>
+        <p:nvPicPr>
+          <p:cNvPr id="4" name="Picture 3"/>
+          <p:cNvPicPr>
+            <a:picLocks noChangeAspect="1"/>
+          </p:cNvPicPr>
+          <p:nvPr/>
+        </p:nvPicPr>
+        <p:blipFill>
+          <a:blip r:embed="rId3">
+            <a:extLst>
+              <a:ext uri="{28A0092B-C50C-407E-A947-70E740481C1C}">
+                <a14:useLocalDpi xmlns:a14="http://schemas.microsoft.com/office/drawing/2010/main" val="0"/>
+              </a:ext>
+            </a:extLst>
+          </a:blip>
+          <a:stretch>
+            <a:fillRect/>
+          </a:stretch>
+        </p:blipFill>
+        <p:spPr>
+          <a:xfrm>
+            <a:off x="931178" y="3483877"/>
+            <a:ext cx="6807200" cy="1752600"/>
+          </a:xfrm>
+          <a:prstGeom prst="rect">
+            <a:avLst/>
+          </a:prstGeom>
+        </p:spPr>
+      </p:pic>
+      <p:sp>
+        <p:nvSpPr>
+          <p:cNvPr id="5" name="TextBox 4"/>
+          <p:cNvSpPr txBox="1"/>
+          <p:nvPr/>
+        </p:nvSpPr>
+        <p:spPr>
+          <a:xfrm>
+            <a:off x="931178" y="2256639"/>
+            <a:ext cx="3631956" cy="369332"/>
+          </a:xfrm>
+          <a:prstGeom prst="rect">
+            <a:avLst/>
+          </a:prstGeom>
+          <a:noFill/>
+        </p:spPr>
+        <p:txBody>
+          <a:bodyPr wrap="none" rtlCol="0">
+            <a:spAutoFit/>
+          </a:bodyPr>
+          <a:lstStyle/>
+          <a:p>
+            <a:r>
+              <a:rPr lang="en-US" dirty="0" smtClean="0">
+                <a:solidFill>
+                  <a:schemeClr val="bg1"/>
+                </a:solidFill>
+              </a:rPr>
+              <a:t>Client must check the return value </a:t>
+            </a:r>
+            <a:r>
+              <a:rPr lang="mr-IN" dirty="0" smtClean="0">
+                <a:solidFill>
+                  <a:schemeClr val="bg1"/>
+                </a:solidFill>
+              </a:rPr>
+              <a:t>…</a:t>
+            </a:r>
+            <a:endParaRPr lang="en-US" dirty="0">
+              <a:solidFill>
+                <a:schemeClr val="bg1"/>
+              </a:solidFill>
+            </a:endParaRPr>
+          </a:p>
+        </p:txBody>
+      </p:sp>
+      <p:sp>
+        <p:nvSpPr>
+          <p:cNvPr id="7" name="TextBox 6"/>
+          <p:cNvSpPr txBox="1"/>
+          <p:nvPr/>
+        </p:nvSpPr>
+        <p:spPr>
+          <a:xfrm>
+            <a:off x="931178" y="2779969"/>
+            <a:ext cx="3472233" cy="369332"/>
+          </a:xfrm>
+          <a:prstGeom prst="rect">
+            <a:avLst/>
+          </a:prstGeom>
+          <a:noFill/>
+        </p:spPr>
+        <p:txBody>
+          <a:bodyPr wrap="none" rtlCol="0">
+            <a:spAutoFit/>
+          </a:bodyPr>
+          <a:lstStyle/>
+          <a:p>
+            <a:r>
+              <a:rPr lang="mr-IN" dirty="0" smtClean="0">
+                <a:solidFill>
+                  <a:schemeClr val="bg1"/>
+                </a:solidFill>
+              </a:rPr>
+              <a:t>…</a:t>
+            </a:r>
+            <a:r>
+              <a:rPr lang="en-GB" dirty="0" smtClean="0">
+                <a:solidFill>
+                  <a:schemeClr val="bg1"/>
+                </a:solidFill>
+              </a:rPr>
+              <a:t> to avoid null reference exception</a:t>
+            </a:r>
+            <a:endParaRPr lang="en-US" dirty="0">
+              <a:solidFill>
+                <a:schemeClr val="bg1"/>
+              </a:solidFill>
+            </a:endParaRPr>
+          </a:p>
+        </p:txBody>
+      </p:sp>
+    </p:spTree>
+    <p:extLst>
+      <p:ext uri="{BB962C8B-B14F-4D97-AF65-F5344CB8AC3E}">
+        <p14:creationId xmlns:p14="http://schemas.microsoft.com/office/powerpoint/2010/main" val="1618826775"/>
+      </p:ext>
+    </p:extLst>
+  </p:cSld>
+  <p:clrMapOvr>
+    <a:masterClrMapping/>
+  </p:clrMapOvr>
+  <p:timing>
+    <p:tnLst>
+      <p:par>
+        <p:cTn id="1" dur="indefinite" restart="never" nodeType="tmRoot">
+          <p:childTnLst>
+            <p:seq concurrent="1" nextAc="seek">
+              <p:cTn id="2" dur="indefinite" nodeType="mainSeq">
+                <p:childTnLst>
+                  <p:par>
+                    <p:cTn id="3" fill="hold">
+                      <p:stCondLst>
+                        <p:cond delay="indefinite"/>
+                      </p:stCondLst>
+                      <p:childTnLst>
+                        <p:par>
+                          <p:cTn id="4" fill="hold">
+                            <p:stCondLst>
+                              <p:cond delay="0"/>
+                            </p:stCondLst>
+                            <p:childTnLst>
+                              <p:par>
+                                <p:cTn id="5" presetID="1" presetClass="entr" presetSubtype="0" fill="hold" grpId="0" nodeType="clickEffect">
+                                  <p:stCondLst>
+                                    <p:cond delay="0"/>
+                                  </p:stCondLst>
+                                  <p:childTnLst>
+                                    <p:set>
+                                      <p:cBhvr>
+                                        <p:cTn id="6" dur="1" fill="hold">
+                                          <p:stCondLst>
+                                            <p:cond delay="0"/>
+                                          </p:stCondLst>
+                                        </p:cTn>
+                                        <p:tgtEl>
+                                          <p:spTgt spid="5"/>
+                                        </p:tgtEl>
+                                        <p:attrNameLst>
+                                          <p:attrName>style.visibility</p:attrName>
+                                        </p:attrNameLst>
+                                      </p:cBhvr>
+                                      <p:to>
+                                        <p:strVal val="visible"/>
+                                      </p:to>
+                                    </p:set>
+                                  </p:childTnLst>
+                                </p:cTn>
+                              </p:par>
+                            </p:childTnLst>
+                          </p:cTn>
+                        </p:par>
+                      </p:childTnLst>
+                    </p:cTn>
+                  </p:par>
+                  <p:par>
+                    <p:cTn id="7" fill="hold">
+                      <p:stCondLst>
+                        <p:cond delay="indefinite"/>
+                      </p:stCondLst>
+                      <p:childTnLst>
+                        <p:par>
+                          <p:cTn id="8" fill="hold">
+                            <p:stCondLst>
+                              <p:cond delay="0"/>
+                            </p:stCondLst>
+                            <p:childTnLst>
+                              <p:par>
+                                <p:cTn id="9" presetID="1" presetClass="entr" presetSubtype="0" fill="hold" grpId="0" nodeType="clickEffect">
+                                  <p:stCondLst>
+                                    <p:cond delay="0"/>
+                                  </p:stCondLst>
+                                  <p:childTnLst>
+                                    <p:set>
+                                      <p:cBhvr>
+                                        <p:cTn id="10" dur="1" fill="hold">
+                                          <p:stCondLst>
+                                            <p:cond delay="0"/>
+                                          </p:stCondLst>
+                                        </p:cTn>
+                                        <p:tgtEl>
+                                          <p:spTgt spid="7"/>
+                                        </p:tgtEl>
+                                        <p:attrNameLst>
+                                          <p:attrName>style.visibility</p:attrName>
+                                        </p:attrNameLst>
+                                      </p:cBhvr>
+                                      <p:to>
+                                        <p:strVal val="visible"/>
+                                      </p:to>
+                                    </p:set>
+                                  </p:childTnLst>
+                                </p:cTn>
+                              </p:par>
+                            </p:childTnLst>
+                          </p:cTn>
+                        </p:par>
+                      </p:childTnLst>
+                    </p:cTn>
+                  </p:par>
+                  <p:par>
+                    <p:cTn id="11" fill="hold">
+                      <p:stCondLst>
+                        <p:cond delay="indefinite"/>
+                      </p:stCondLst>
+                      <p:childTnLst>
+                        <p:par>
+                          <p:cTn id="12" fill="hold">
+                            <p:stCondLst>
+                              <p:cond delay="0"/>
+                            </p:stCondLst>
+                            <p:childTnLst>
+                              <p:par>
+                                <p:cTn id="13" presetID="1" presetClass="entr" presetSubtype="0" fill="hold" nodeType="clickEffect">
+                                  <p:stCondLst>
+                                    <p:cond delay="0"/>
+                                  </p:stCondLst>
+                                  <p:childTnLst>
+                                    <p:set>
+                                      <p:cBhvr>
+                                        <p:cTn id="14" dur="1" fill="hold">
+                                          <p:stCondLst>
+                                            <p:cond delay="0"/>
+                                          </p:stCondLst>
+                                        </p:cTn>
+                                        <p:tgtEl>
+                                          <p:spTgt spid="4"/>
+                                        </p:tgtEl>
+                                        <p:attrNameLst>
+                                          <p:attrName>style.visibility</p:attrName>
+                                        </p:attrNameLst>
+                                      </p:cBhvr>
+                                      <p:to>
+                                        <p:strVal val="visible"/>
+                                      </p:to>
+                                    </p:set>
+                                  </p:childTnLst>
+                                </p:cTn>
+                              </p:par>
+                            </p:childTnLst>
+                          </p:cTn>
+                        </p:par>
+                      </p:childTnLst>
+                    </p:cTn>
+                  </p:par>
+                </p:childTnLst>
+              </p:cTn>
+              <p:prevCondLst>
+                <p:cond evt="onPrev" delay="0">
+                  <p:tgtEl>
+                    <p:sldTgt/>
+                  </p:tgtEl>
+                </p:cond>
+              </p:prevCondLst>
+              <p:nextCondLst>
+                <p:cond evt="onNext" delay="0">
+                  <p:tgtEl>
+                    <p:sldTgt/>
+                  </p:tgtEl>
+                </p:cond>
+              </p:nextCondLst>
+            </p:seq>
+          </p:childTnLst>
+        </p:cTn>
+      </p:par>
+    </p:tnLst>
+    <p:bldLst>
+      <p:bldP spid="5" grpId="0"/>
+      <p:bldP spid="7" grpId="0"/>
+    </p:bldLst>
+  </p:timing>
+</p:sld>
+</file>
+
+<file path=ppt/slides/slide12.xml><?xml version="1.0" encoding="utf-8"?>
+<p:sld xmlns:a="http://schemas.openxmlformats.org/drawingml/2006/main" xmlns:r="http://schemas.openxmlformats.org/officeDocument/2006/relationships" xmlns:p="http://schemas.openxmlformats.org/presentationml/2006/main">
+  <p:cSld>
+    <p:spTree>
+      <p:nvGrpSpPr>
+        <p:cNvPr id="1" name=""/>
+        <p:cNvGrpSpPr/>
+        <p:nvPr/>
+      </p:nvGrpSpPr>
+      <p:grpSpPr>
+        <a:xfrm>
+          <a:off x="0" y="0"/>
+          <a:ext cx="0" cy="0"/>
+          <a:chOff x="0" y="0"/>
+          <a:chExt cx="0" cy="0"/>
+        </a:xfrm>
+      </p:grpSpPr>
+      <p:sp>
+        <p:nvSpPr>
+          <p:cNvPr id="2" name="Text Placeholder 1"/>
+          <p:cNvSpPr>
+            <a:spLocks noGrp="1"/>
+          </p:cNvSpPr>
+          <p:nvPr>
+            <p:ph type="body" sz="quarter" idx="11"/>
+          </p:nvPr>
+        </p:nvSpPr>
+        <p:spPr>
+          <a:xfrm>
+            <a:off x="328613" y="1079046"/>
+            <a:ext cx="8401246" cy="5573423"/>
+          </a:xfrm>
+          <a:solidFill>
+            <a:schemeClr val="tx1"/>
+          </a:solidFill>
+        </p:spPr>
+        <p:txBody>
+          <a:bodyPr/>
+          <a:lstStyle/>
+          <a:p>
+            <a:r>
+              <a:rPr lang="en-US" sz="1800" dirty="0" smtClean="0">
+                <a:solidFill>
+                  <a:schemeClr val="bg1"/>
+                </a:solidFill>
+              </a:rPr>
+              <a:t>Return null </a:t>
+            </a:r>
+            <a:r>
+              <a:rPr lang="en-US" sz="1800" dirty="0" err="1" smtClean="0">
+                <a:solidFill>
+                  <a:schemeClr val="bg1"/>
+                </a:solidFill>
+              </a:rPr>
+              <a:t>javascript</a:t>
+            </a:r>
+            <a:r>
+              <a:rPr lang="en-US" sz="1800" dirty="0" smtClean="0">
+                <a:solidFill>
+                  <a:schemeClr val="bg1"/>
+                </a:solidFill>
+              </a:rPr>
+              <a:t> approach using callbacks</a:t>
+            </a:r>
+            <a:r>
+              <a:rPr lang="mr-IN" sz="1800" dirty="0" smtClean="0">
+                <a:solidFill>
+                  <a:schemeClr val="bg1"/>
+                </a:solidFill>
+              </a:rPr>
+              <a:t>…</a:t>
+            </a:r>
+            <a:endParaRPr lang="en-US" sz="1800" dirty="0" smtClean="0">
+              <a:solidFill>
+                <a:schemeClr val="bg1"/>
+              </a:solidFill>
+            </a:endParaRPr>
+          </a:p>
+        </p:txBody>
+      </p:sp>
+      <p:pic>
+        <p:nvPicPr>
+          <p:cNvPr id="3" name="Picture 2"/>
+          <p:cNvPicPr>
+            <a:picLocks noChangeAspect="1"/>
+          </p:cNvPicPr>
+          <p:nvPr/>
+        </p:nvPicPr>
+        <p:blipFill>
+          <a:blip r:embed="rId3">
+            <a:extLst>
+              <a:ext uri="{28A0092B-C50C-407E-A947-70E740481C1C}">
+                <a14:useLocalDpi xmlns:a14="http://schemas.microsoft.com/office/drawing/2010/main" val="0"/>
+              </a:ext>
+            </a:extLst>
+          </a:blip>
+          <a:stretch>
+            <a:fillRect/>
+          </a:stretch>
+        </p:blipFill>
+        <p:spPr>
+          <a:xfrm>
+            <a:off x="1107347" y="1713340"/>
+            <a:ext cx="7367282" cy="4687460"/>
+          </a:xfrm>
+          <a:prstGeom prst="rect">
+            <a:avLst/>
+          </a:prstGeom>
+        </p:spPr>
+      </p:pic>
+      <p:sp>
+        <p:nvSpPr>
+          <p:cNvPr id="6" name="Line Callout 2 5"/>
+          <p:cNvSpPr/>
+          <p:nvPr/>
+        </p:nvSpPr>
+        <p:spPr>
+          <a:xfrm>
+            <a:off x="5830348" y="1803633"/>
+            <a:ext cx="981512" cy="687897"/>
+          </a:xfrm>
+          <a:prstGeom prst="borderCallout2">
+            <a:avLst/>
+          </a:prstGeom>
+        </p:spPr>
+        <p:style>
+          <a:lnRef idx="1">
+            <a:schemeClr val="accent3"/>
+          </a:lnRef>
+          <a:fillRef idx="2">
+            <a:schemeClr val="accent3"/>
+          </a:fillRef>
+          <a:effectRef idx="1">
+            <a:schemeClr val="accent3"/>
+          </a:effectRef>
+          <a:fontRef idx="minor">
+            <a:schemeClr val="dk1"/>
+          </a:fontRef>
+        </p:style>
+        <p:txBody>
+          <a:bodyPr rtlCol="0" anchor="ctr"/>
+          <a:lstStyle/>
+          <a:p>
+            <a:pPr algn="ctr"/>
+            <a:r>
+              <a:rPr lang="en-US" dirty="0" smtClean="0"/>
+              <a:t>Success callback</a:t>
+            </a:r>
+            <a:endParaRPr lang="en-US" dirty="0"/>
+          </a:p>
+        </p:txBody>
+      </p:sp>
+      <p:sp>
+        <p:nvSpPr>
+          <p:cNvPr id="8" name="Line Callout 2 7"/>
+          <p:cNvSpPr/>
+          <p:nvPr/>
+        </p:nvSpPr>
+        <p:spPr>
+          <a:xfrm>
+            <a:off x="5830348" y="3109046"/>
+            <a:ext cx="981512" cy="687897"/>
+          </a:xfrm>
+          <a:prstGeom prst="borderCallout2">
+            <a:avLst>
+              <a:gd name="adj1" fmla="val 18750"/>
+              <a:gd name="adj2" fmla="val -8333"/>
+              <a:gd name="adj3" fmla="val 18750"/>
+              <a:gd name="adj4" fmla="val -16667"/>
+              <a:gd name="adj5" fmla="val -16768"/>
+              <a:gd name="adj6" fmla="val -51795"/>
+            </a:avLst>
+          </a:prstGeom>
+        </p:spPr>
+        <p:style>
+          <a:lnRef idx="1">
+            <a:schemeClr val="accent3"/>
+          </a:lnRef>
+          <a:fillRef idx="2">
+            <a:schemeClr val="accent3"/>
+          </a:fillRef>
+          <a:effectRef idx="1">
+            <a:schemeClr val="accent3"/>
+          </a:effectRef>
+          <a:fontRef idx="minor">
+            <a:schemeClr val="dk1"/>
+          </a:fontRef>
+        </p:style>
+        <p:txBody>
+          <a:bodyPr rtlCol="0" anchor="ctr"/>
+          <a:lstStyle/>
+          <a:p>
+            <a:pPr algn="ctr"/>
+            <a:r>
+              <a:rPr lang="en-US" dirty="0" smtClean="0"/>
+              <a:t>Empty</a:t>
+            </a:r>
+          </a:p>
+          <a:p>
+            <a:pPr algn="ctr"/>
+            <a:r>
+              <a:rPr lang="en-US" dirty="0" smtClean="0"/>
+              <a:t>callback</a:t>
+            </a:r>
+            <a:endParaRPr lang="en-US" dirty="0"/>
+          </a:p>
+        </p:txBody>
+      </p:sp>
+      <p:sp>
+        <p:nvSpPr>
+          <p:cNvPr id="9" name="Line Callout 2 8"/>
+          <p:cNvSpPr/>
+          <p:nvPr/>
+        </p:nvSpPr>
+        <p:spPr>
+          <a:xfrm>
+            <a:off x="3315049" y="3073504"/>
+            <a:ext cx="981512" cy="687897"/>
+          </a:xfrm>
+          <a:prstGeom prst="borderCallout2">
+            <a:avLst>
+              <a:gd name="adj1" fmla="val 18750"/>
+              <a:gd name="adj2" fmla="val -8333"/>
+              <a:gd name="adj3" fmla="val 18750"/>
+              <a:gd name="adj4" fmla="val -16667"/>
+              <a:gd name="adj5" fmla="val -77744"/>
+              <a:gd name="adj6" fmla="val -94530"/>
+            </a:avLst>
+          </a:prstGeom>
+        </p:spPr>
+        <p:style>
+          <a:lnRef idx="1">
+            <a:schemeClr val="accent3"/>
+          </a:lnRef>
+          <a:fillRef idx="2">
+            <a:schemeClr val="accent3"/>
+          </a:fillRef>
+          <a:effectRef idx="1">
+            <a:schemeClr val="accent3"/>
+          </a:effectRef>
+          <a:fontRef idx="minor">
+            <a:schemeClr val="dk1"/>
+          </a:fontRef>
+        </p:style>
+        <p:txBody>
+          <a:bodyPr rtlCol="0" anchor="ctr"/>
+          <a:lstStyle/>
+          <a:p>
+            <a:pPr algn="ctr"/>
+            <a:r>
+              <a:rPr lang="en-US" dirty="0" smtClean="0"/>
+              <a:t>No return</a:t>
+            </a:r>
+            <a:endParaRPr lang="en-US" dirty="0"/>
+          </a:p>
+        </p:txBody>
+      </p:sp>
+    </p:spTree>
+    <p:extLst>
+      <p:ext uri="{BB962C8B-B14F-4D97-AF65-F5344CB8AC3E}">
+        <p14:creationId xmlns:p14="http://schemas.microsoft.com/office/powerpoint/2010/main" val="1181875787"/>
+      </p:ext>
+    </p:extLst>
+  </p:cSld>
+  <p:clrMapOvr>
+    <a:masterClrMapping/>
+  </p:clrMapOvr>
+  <p:timing>
+    <p:tnLst>
+      <p:par>
+        <p:cTn id="1" dur="indefinite" restart="never" nodeType="tmRoot">
+          <p:childTnLst>
+            <p:seq concurrent="1" nextAc="seek">
+              <p:cTn id="2" dur="indefinite" nodeType="mainSeq">
+                <p:childTnLst>
+                  <p:par>
+                    <p:cTn id="3" fill="hold">
+                      <p:stCondLst>
+                        <p:cond delay="indefinite"/>
+                      </p:stCondLst>
+                      <p:childTnLst>
+                        <p:par>
+                          <p:cTn id="4" fill="hold">
+                            <p:stCondLst>
+                              <p:cond delay="0"/>
+                            </p:stCondLst>
+                            <p:childTnLst>
+                              <p:par>
+                                <p:cTn id="5" presetID="1" presetClass="entr" presetSubtype="0" fill="hold" nodeType="clickEffect">
+                                  <p:stCondLst>
+                                    <p:cond delay="0"/>
+                                  </p:stCondLst>
+                                  <p:childTnLst>
+                                    <p:set>
+                                      <p:cBhvr>
+                                        <p:cTn id="6" dur="1" fill="hold">
+                                          <p:stCondLst>
+                                            <p:cond delay="0"/>
+                                          </p:stCondLst>
+                                        </p:cTn>
+                                        <p:tgtEl>
+                                          <p:spTgt spid="3"/>
+                                        </p:tgtEl>
+                                        <p:attrNameLst>
+                                          <p:attrName>style.visibility</p:attrName>
+                                        </p:attrNameLst>
+                                      </p:cBhvr>
+                                      <p:to>
+                                        <p:strVal val="visible"/>
+                                      </p:to>
+                                    </p:set>
+                                  </p:childTnLst>
+                                </p:cTn>
+                              </p:par>
+                            </p:childTnLst>
+                          </p:cTn>
+                        </p:par>
+                      </p:childTnLst>
+                    </p:cTn>
+                  </p:par>
+                  <p:par>
+                    <p:cTn id="7" fill="hold">
+                      <p:stCondLst>
+                        <p:cond delay="indefinite"/>
+                      </p:stCondLst>
+                      <p:childTnLst>
+                        <p:par>
+                          <p:cTn id="8" fill="hold">
+                            <p:stCondLst>
+                              <p:cond delay="0"/>
+                            </p:stCondLst>
+                            <p:childTnLst>
+                              <p:par>
+                                <p:cTn id="9" presetID="1" presetClass="entr" presetSubtype="0" fill="hold" grpId="0" nodeType="clickEffect">
+                                  <p:stCondLst>
+                                    <p:cond delay="0"/>
+                                  </p:stCondLst>
+                                  <p:childTnLst>
+                                    <p:set>
+                                      <p:cBhvr>
+                                        <p:cTn id="10" dur="1" fill="hold">
+                                          <p:stCondLst>
+                                            <p:cond delay="0"/>
+                                          </p:stCondLst>
+                                        </p:cTn>
+                                        <p:tgtEl>
+                                          <p:spTgt spid="9"/>
+                                        </p:tgtEl>
+                                        <p:attrNameLst>
+                                          <p:attrName>style.visibility</p:attrName>
+                                        </p:attrNameLst>
+                                      </p:cBhvr>
+                                      <p:to>
+                                        <p:strVal val="visible"/>
+                                      </p:to>
+                                    </p:set>
+                                  </p:childTnLst>
+                                </p:cTn>
+                              </p:par>
+                            </p:childTnLst>
+                          </p:cTn>
+                        </p:par>
+                      </p:childTnLst>
+                    </p:cTn>
+                  </p:par>
+                  <p:par>
+                    <p:cTn id="11" fill="hold">
+                      <p:stCondLst>
+                        <p:cond delay="indefinite"/>
+                      </p:stCondLst>
+                      <p:childTnLst>
+                        <p:par>
+                          <p:cTn id="12" fill="hold">
+                            <p:stCondLst>
+                              <p:cond delay="0"/>
+                            </p:stCondLst>
+                            <p:childTnLst>
+                              <p:par>
+                                <p:cTn id="13" presetID="1" presetClass="entr" presetSubtype="0" fill="hold" grpId="0" nodeType="clickEffect">
+                                  <p:stCondLst>
+                                    <p:cond delay="0"/>
+                                  </p:stCondLst>
+                                  <p:childTnLst>
+                                    <p:set>
+                                      <p:cBhvr>
+                                        <p:cTn id="14" dur="1" fill="hold">
+                                          <p:stCondLst>
+                                            <p:cond delay="0"/>
+                                          </p:stCondLst>
+                                        </p:cTn>
+                                        <p:tgtEl>
+                                          <p:spTgt spid="6"/>
+                                        </p:tgtEl>
+                                        <p:attrNameLst>
+                                          <p:attrName>style.visibility</p:attrName>
+                                        </p:attrNameLst>
+                                      </p:cBhvr>
+                                      <p:to>
+                                        <p:strVal val="visible"/>
+                                      </p:to>
+                                    </p:set>
+                                  </p:childTnLst>
+                                </p:cTn>
+                              </p:par>
+                            </p:childTnLst>
+                          </p:cTn>
+                        </p:par>
+                      </p:childTnLst>
+                    </p:cTn>
+                  </p:par>
+                  <p:par>
+                    <p:cTn id="15" fill="hold">
+                      <p:stCondLst>
+                        <p:cond delay="indefinite"/>
+                      </p:stCondLst>
+                      <p:childTnLst>
+                        <p:par>
+                          <p:cTn id="16" fill="hold">
+                            <p:stCondLst>
+                              <p:cond delay="0"/>
+                            </p:stCondLst>
+                            <p:childTnLst>
+                              <p:par>
+                                <p:cTn id="17" presetID="1" presetClass="entr" presetSubtype="0" fill="hold" grpId="0" nodeType="clickEffect">
+                                  <p:stCondLst>
+                                    <p:cond delay="0"/>
+                                  </p:stCondLst>
+                                  <p:childTnLst>
+                                    <p:set>
+                                      <p:cBhvr>
+                                        <p:cTn id="18" dur="1" fill="hold">
+                                          <p:stCondLst>
+                                            <p:cond delay="0"/>
+                                          </p:stCondLst>
+                                        </p:cTn>
+                                        <p:tgtEl>
+                                          <p:spTgt spid="8"/>
+                                        </p:tgtEl>
+                                        <p:attrNameLst>
+                                          <p:attrName>style.visibility</p:attrName>
+                                        </p:attrNameLst>
+                                      </p:cBhvr>
+                                      <p:to>
+                                        <p:strVal val="visible"/>
+                                      </p:to>
+                                    </p:set>
+                                  </p:childTnLst>
+                                </p:cTn>
+                              </p:par>
+                            </p:childTnLst>
+                          </p:cTn>
+                        </p:par>
+                      </p:childTnLst>
+                    </p:cTn>
+                  </p:par>
+                </p:childTnLst>
+              </p:cTn>
+              <p:prevCondLst>
+                <p:cond evt="onPrev" delay="0">
+                  <p:tgtEl>
+                    <p:sldTgt/>
+                  </p:tgtEl>
+                </p:cond>
+              </p:prevCondLst>
+              <p:nextCondLst>
+                <p:cond evt="onNext" delay="0">
+                  <p:tgtEl>
+                    <p:sldTgt/>
+                  </p:tgtEl>
+                </p:cond>
+              </p:nextCondLst>
+            </p:seq>
+          </p:childTnLst>
+        </p:cTn>
+      </p:par>
+    </p:tnLst>
+    <p:bldLst>
+      <p:bldP spid="6" grpId="0" animBg="1"/>
+      <p:bldP spid="8" grpId="0" animBg="1"/>
+      <p:bldP spid="9" grpId="0" animBg="1"/>
+    </p:bldLst>
+  </p:timing>
+</p:sld>
+</file>
+
+<file path=ppt/slides/slide13.xml><?xml version="1.0" encoding="utf-8"?>
+<p:sld xmlns:a="http://schemas.openxmlformats.org/drawingml/2006/main" xmlns:r="http://schemas.openxmlformats.org/officeDocument/2006/relationships" xmlns:p="http://schemas.openxmlformats.org/presentationml/2006/main">
+  <p:cSld>
+    <p:spTree>
+      <p:nvGrpSpPr>
+        <p:cNvPr id="1" name=""/>
+        <p:cNvGrpSpPr/>
+        <p:nvPr/>
+      </p:nvGrpSpPr>
+      <p:grpSpPr>
+        <a:xfrm>
+          <a:off x="0" y="0"/>
+          <a:ext cx="0" cy="0"/>
+          <a:chOff x="0" y="0"/>
+          <a:chExt cx="0" cy="0"/>
+        </a:xfrm>
+      </p:grpSpPr>
+      <p:sp>
+        <p:nvSpPr>
+          <p:cNvPr id="2" name="Text Placeholder 1"/>
+          <p:cNvSpPr>
+            <a:spLocks noGrp="1"/>
+          </p:cNvSpPr>
+          <p:nvPr>
+            <p:ph type="body" sz="quarter" idx="11"/>
+          </p:nvPr>
+        </p:nvSpPr>
+        <p:spPr>
+          <a:xfrm>
+            <a:off x="202778" y="1146157"/>
+            <a:ext cx="8401246" cy="5573423"/>
+          </a:xfrm>
+          <a:solidFill>
+            <a:schemeClr val="tx1"/>
+          </a:solidFill>
+        </p:spPr>
+        <p:txBody>
+          <a:bodyPr/>
+          <a:lstStyle/>
+          <a:p>
+            <a:r>
+              <a:rPr lang="en-US" sz="1800" dirty="0" smtClean="0">
+                <a:solidFill>
+                  <a:schemeClr val="bg1"/>
+                </a:solidFill>
+              </a:rPr>
+              <a:t>Return null </a:t>
+            </a:r>
+            <a:r>
+              <a:rPr lang="en-US" sz="1800" dirty="0" err="1" smtClean="0">
+                <a:solidFill>
+                  <a:schemeClr val="bg1"/>
+                </a:solidFill>
+              </a:rPr>
+              <a:t>javascript</a:t>
+            </a:r>
+            <a:r>
+              <a:rPr lang="en-US" sz="1800" dirty="0" smtClean="0">
+                <a:solidFill>
+                  <a:schemeClr val="bg1"/>
+                </a:solidFill>
+              </a:rPr>
+              <a:t> approach from client</a:t>
+            </a:r>
+            <a:r>
+              <a:rPr lang="mr-IN" sz="1800" dirty="0" smtClean="0">
+                <a:solidFill>
+                  <a:schemeClr val="bg1"/>
+                </a:solidFill>
+              </a:rPr>
+              <a:t>…</a:t>
+            </a:r>
+            <a:endParaRPr lang="en-US" sz="1800" dirty="0" smtClean="0">
+              <a:solidFill>
+                <a:schemeClr val="bg1"/>
+              </a:solidFill>
+            </a:endParaRPr>
+          </a:p>
+        </p:txBody>
+      </p:sp>
+      <p:pic>
+        <p:nvPicPr>
+          <p:cNvPr id="4" name="Picture 3"/>
+          <p:cNvPicPr>
+            <a:picLocks noChangeAspect="1"/>
+          </p:cNvPicPr>
+          <p:nvPr/>
+        </p:nvPicPr>
+        <p:blipFill>
+          <a:blip r:embed="rId3">
+            <a:extLst>
+              <a:ext uri="{28A0092B-C50C-407E-A947-70E740481C1C}">
+                <a14:useLocalDpi xmlns:a14="http://schemas.microsoft.com/office/drawing/2010/main" val="0"/>
+              </a:ext>
+            </a:extLst>
+          </a:blip>
+          <a:stretch>
+            <a:fillRect/>
+          </a:stretch>
+        </p:blipFill>
+        <p:spPr>
+          <a:xfrm>
+            <a:off x="516036" y="2202109"/>
+            <a:ext cx="8026400" cy="2273300"/>
+          </a:xfrm>
+          <a:prstGeom prst="rect">
+            <a:avLst/>
+          </a:prstGeom>
+        </p:spPr>
+      </p:pic>
+      <p:sp>
+        <p:nvSpPr>
+          <p:cNvPr id="10" name="TextBox 9"/>
+          <p:cNvSpPr txBox="1"/>
+          <p:nvPr/>
+        </p:nvSpPr>
+        <p:spPr>
+          <a:xfrm>
+            <a:off x="696286" y="4919161"/>
+            <a:ext cx="1766125" cy="369332"/>
+          </a:xfrm>
+          <a:prstGeom prst="rect">
+            <a:avLst/>
+          </a:prstGeom>
+          <a:noFill/>
+        </p:spPr>
+        <p:txBody>
+          <a:bodyPr wrap="none" rtlCol="0">
+            <a:spAutoFit/>
+          </a:bodyPr>
+          <a:lstStyle/>
+          <a:p>
+            <a:r>
+              <a:rPr lang="en-US" dirty="0" smtClean="0">
+                <a:solidFill>
+                  <a:schemeClr val="bg1"/>
+                </a:solidFill>
+              </a:rPr>
+              <a:t>Using callbacks</a:t>
+            </a:r>
+            <a:r>
+              <a:rPr lang="mr-IN" dirty="0" smtClean="0">
+                <a:solidFill>
+                  <a:schemeClr val="bg1"/>
+                </a:solidFill>
+              </a:rPr>
+              <a:t>…</a:t>
+            </a:r>
+            <a:endParaRPr lang="en-US" dirty="0">
+              <a:solidFill>
+                <a:schemeClr val="bg1"/>
+              </a:solidFill>
+            </a:endParaRPr>
+          </a:p>
+        </p:txBody>
+      </p:sp>
+      <p:sp>
+        <p:nvSpPr>
+          <p:cNvPr id="11" name="TextBox 10"/>
+          <p:cNvSpPr txBox="1"/>
+          <p:nvPr/>
+        </p:nvSpPr>
+        <p:spPr>
+          <a:xfrm>
+            <a:off x="696286" y="5379273"/>
+            <a:ext cx="2645468" cy="369332"/>
+          </a:xfrm>
+          <a:prstGeom prst="rect">
+            <a:avLst/>
+          </a:prstGeom>
+          <a:noFill/>
+        </p:spPr>
+        <p:txBody>
+          <a:bodyPr wrap="none" rtlCol="0">
+            <a:spAutoFit/>
+          </a:bodyPr>
+          <a:lstStyle/>
+          <a:p>
+            <a:r>
+              <a:rPr lang="mr-IN" dirty="0" smtClean="0">
+                <a:solidFill>
+                  <a:schemeClr val="bg1"/>
+                </a:solidFill>
+              </a:rPr>
+              <a:t>…</a:t>
+            </a:r>
+            <a:r>
+              <a:rPr lang="en-GB" dirty="0" smtClean="0">
+                <a:solidFill>
+                  <a:schemeClr val="bg1"/>
+                </a:solidFill>
+              </a:rPr>
+              <a:t> we remove the IF and </a:t>
+            </a:r>
+            <a:r>
+              <a:rPr lang="mr-IN" dirty="0" smtClean="0">
+                <a:solidFill>
+                  <a:schemeClr val="bg1"/>
+                </a:solidFill>
+              </a:rPr>
+              <a:t>…</a:t>
+            </a:r>
+            <a:endParaRPr lang="en-US" dirty="0">
+              <a:solidFill>
+                <a:schemeClr val="bg1"/>
+              </a:solidFill>
+            </a:endParaRPr>
+          </a:p>
+        </p:txBody>
+      </p:sp>
+      <p:sp>
+        <p:nvSpPr>
+          <p:cNvPr id="12" name="TextBox 11"/>
+          <p:cNvSpPr txBox="1"/>
+          <p:nvPr/>
+        </p:nvSpPr>
+        <p:spPr>
+          <a:xfrm>
+            <a:off x="696286" y="5748605"/>
+            <a:ext cx="1922065" cy="369332"/>
+          </a:xfrm>
+          <a:prstGeom prst="rect">
+            <a:avLst/>
+          </a:prstGeom>
+          <a:noFill/>
+        </p:spPr>
+        <p:txBody>
+          <a:bodyPr wrap="none" rtlCol="0">
+            <a:spAutoFit/>
+          </a:bodyPr>
+          <a:lstStyle/>
+          <a:p>
+            <a:r>
+              <a:rPr lang="mr-IN" dirty="0" smtClean="0">
+                <a:solidFill>
+                  <a:schemeClr val="bg1"/>
+                </a:solidFill>
+              </a:rPr>
+              <a:t>…</a:t>
+            </a:r>
+            <a:r>
+              <a:rPr lang="en-GB" dirty="0" smtClean="0">
+                <a:solidFill>
+                  <a:schemeClr val="bg1"/>
+                </a:solidFill>
+              </a:rPr>
+              <a:t>the code is SAFE</a:t>
+            </a:r>
+            <a:endParaRPr lang="en-US" dirty="0">
+              <a:solidFill>
+                <a:schemeClr val="bg1"/>
+              </a:solidFill>
+            </a:endParaRPr>
+          </a:p>
+        </p:txBody>
+      </p:sp>
+    </p:spTree>
+    <p:extLst>
+      <p:ext uri="{BB962C8B-B14F-4D97-AF65-F5344CB8AC3E}">
+        <p14:creationId xmlns:p14="http://schemas.microsoft.com/office/powerpoint/2010/main" val="952815320"/>
+      </p:ext>
+    </p:extLst>
+  </p:cSld>
+  <p:clrMapOvr>
+    <a:masterClrMapping/>
+  </p:clrMapOvr>
+  <p:timing>
+    <p:tnLst>
+      <p:par>
+        <p:cTn id="1" dur="indefinite" restart="never" nodeType="tmRoot">
+          <p:childTnLst>
+            <p:seq concurrent="1" nextAc="seek">
+              <p:cTn id="2" dur="indefinite" nodeType="mainSeq">
+                <p:childTnLst>
+                  <p:par>
+                    <p:cTn id="3" fill="hold">
+                      <p:stCondLst>
+                        <p:cond delay="indefinite"/>
+                      </p:stCondLst>
+                      <p:childTnLst>
+                        <p:par>
+                          <p:cTn id="4" fill="hold">
+                            <p:stCondLst>
+                              <p:cond delay="0"/>
+                            </p:stCondLst>
+                            <p:childTnLst>
+                              <p:par>
+                                <p:cTn id="5" presetID="1" presetClass="entr" presetSubtype="0" fill="hold" nodeType="clickEffect">
+                                  <p:stCondLst>
+                                    <p:cond delay="0"/>
+                                  </p:stCondLst>
+                                  <p:childTnLst>
+                                    <p:set>
+                                      <p:cBhvr>
+                                        <p:cTn id="6" dur="1" fill="hold">
+                                          <p:stCondLst>
+                                            <p:cond delay="0"/>
+                                          </p:stCondLst>
+                                        </p:cTn>
+                                        <p:tgtEl>
+                                          <p:spTgt spid="4"/>
+                                        </p:tgtEl>
+                                        <p:attrNameLst>
+                                          <p:attrName>style.visibility</p:attrName>
+                                        </p:attrNameLst>
+                                      </p:cBhvr>
+                                      <p:to>
+                                        <p:strVal val="visible"/>
+                                      </p:to>
+                                    </p:set>
+                                  </p:childTnLst>
+                                </p:cTn>
+                              </p:par>
+                            </p:childTnLst>
+                          </p:cTn>
+                        </p:par>
+                      </p:childTnLst>
+                    </p:cTn>
+                  </p:par>
+                  <p:par>
+                    <p:cTn id="7" fill="hold">
+                      <p:stCondLst>
+                        <p:cond delay="indefinite"/>
+                      </p:stCondLst>
+                      <p:childTnLst>
+                        <p:par>
+                          <p:cTn id="8" fill="hold">
+                            <p:stCondLst>
+                              <p:cond delay="0"/>
+                            </p:stCondLst>
+                            <p:childTnLst>
+                              <p:par>
+                                <p:cTn id="9" presetID="1" presetClass="entr" presetSubtype="0" fill="hold" grpId="0" nodeType="clickEffect">
+                                  <p:stCondLst>
+                                    <p:cond delay="0"/>
+                                  </p:stCondLst>
+                                  <p:childTnLst>
+                                    <p:set>
+                                      <p:cBhvr>
+                                        <p:cTn id="10" dur="1" fill="hold">
+                                          <p:stCondLst>
+                                            <p:cond delay="0"/>
+                                          </p:stCondLst>
+                                        </p:cTn>
+                                        <p:tgtEl>
+                                          <p:spTgt spid="10"/>
+                                        </p:tgtEl>
+                                        <p:attrNameLst>
+                                          <p:attrName>style.visibility</p:attrName>
+                                        </p:attrNameLst>
+                                      </p:cBhvr>
+                                      <p:to>
+                                        <p:strVal val="visible"/>
+                                      </p:to>
+                                    </p:set>
+                                  </p:childTnLst>
+                                </p:cTn>
+                              </p:par>
+                            </p:childTnLst>
+                          </p:cTn>
+                        </p:par>
+                      </p:childTnLst>
+                    </p:cTn>
+                  </p:par>
+                  <p:par>
+                    <p:cTn id="11" fill="hold">
+                      <p:stCondLst>
+                        <p:cond delay="indefinite"/>
+                      </p:stCondLst>
+                      <p:childTnLst>
+                        <p:par>
+                          <p:cTn id="12" fill="hold">
+                            <p:stCondLst>
+                              <p:cond delay="0"/>
+                            </p:stCondLst>
+                            <p:childTnLst>
+                              <p:par>
+                                <p:cTn id="13" presetID="1" presetClass="entr" presetSubtype="0" fill="hold" grpId="0" nodeType="clickEffect">
+                                  <p:stCondLst>
+                                    <p:cond delay="0"/>
+                                  </p:stCondLst>
+                                  <p:childTnLst>
+                                    <p:set>
+                                      <p:cBhvr>
+                                        <p:cTn id="14" dur="1" fill="hold">
+                                          <p:stCondLst>
+                                            <p:cond delay="0"/>
+                                          </p:stCondLst>
+                                        </p:cTn>
+                                        <p:tgtEl>
+                                          <p:spTgt spid="11"/>
+                                        </p:tgtEl>
+                                        <p:attrNameLst>
+                                          <p:attrName>style.visibility</p:attrName>
+                                        </p:attrNameLst>
+                                      </p:cBhvr>
+                                      <p:to>
+                                        <p:strVal val="visible"/>
+                                      </p:to>
+                                    </p:set>
+                                  </p:childTnLst>
+                                </p:cTn>
+                              </p:par>
+                            </p:childTnLst>
+                          </p:cTn>
+                        </p:par>
+                      </p:childTnLst>
+                    </p:cTn>
+                  </p:par>
+                  <p:par>
+                    <p:cTn id="15" fill="hold">
+                      <p:stCondLst>
+                        <p:cond delay="indefinite"/>
+                      </p:stCondLst>
+                      <p:childTnLst>
+                        <p:par>
+                          <p:cTn id="16" fill="hold">
+                            <p:stCondLst>
+                              <p:cond delay="0"/>
+                            </p:stCondLst>
+                            <p:childTnLst>
+                              <p:par>
+                                <p:cTn id="17" presetID="1" presetClass="entr" presetSubtype="0" fill="hold" grpId="0" nodeType="clickEffect">
+                                  <p:stCondLst>
+                                    <p:cond delay="0"/>
+                                  </p:stCondLst>
+                                  <p:childTnLst>
+                                    <p:set>
+                                      <p:cBhvr>
+                                        <p:cTn id="18" dur="1" fill="hold">
+                                          <p:stCondLst>
+                                            <p:cond delay="0"/>
+                                          </p:stCondLst>
+                                        </p:cTn>
+                                        <p:tgtEl>
+                                          <p:spTgt spid="12"/>
+                                        </p:tgtEl>
+                                        <p:attrNameLst>
+                                          <p:attrName>style.visibility</p:attrName>
+                                        </p:attrNameLst>
+                                      </p:cBhvr>
+                                      <p:to>
+                                        <p:strVal val="visible"/>
+                                      </p:to>
+                                    </p:set>
+                                  </p:childTnLst>
+                                </p:cTn>
+                              </p:par>
+                            </p:childTnLst>
+                          </p:cTn>
+                        </p:par>
+                      </p:childTnLst>
+                    </p:cTn>
+                  </p:par>
+                </p:childTnLst>
+              </p:cTn>
+              <p:prevCondLst>
+                <p:cond evt="onPrev" delay="0">
+                  <p:tgtEl>
+                    <p:sldTgt/>
+                  </p:tgtEl>
+                </p:cond>
+              </p:prevCondLst>
+              <p:nextCondLst>
+                <p:cond evt="onNext" delay="0">
+                  <p:tgtEl>
+                    <p:sldTgt/>
+                  </p:tgtEl>
+                </p:cond>
+              </p:nextCondLst>
+            </p:seq>
+          </p:childTnLst>
+        </p:cTn>
+      </p:par>
+    </p:tnLst>
+    <p:bldLst>
+      <p:bldP spid="10" grpId="0"/>
+      <p:bldP spid="11" grpId="0"/>
+      <p:bldP spid="12" grpId="0"/>
+    </p:bldLst>
+  </p:timing>
+</p:sld>
+</file>
+
+<file path=ppt/slides/slide14.xml><?xml version="1.0" encoding="utf-8"?>
+<p:sld xmlns:a="http://schemas.openxmlformats.org/drawingml/2006/main" xmlns:r="http://schemas.openxmlformats.org/officeDocument/2006/relationships" xmlns:p="http://schemas.openxmlformats.org/presentationml/2006/main">
+  <p:cSld>
+    <p:spTree>
+      <p:nvGrpSpPr>
+        <p:cNvPr id="1" name=""/>
+        <p:cNvGrpSpPr/>
+        <p:nvPr/>
+      </p:nvGrpSpPr>
+      <p:grpSpPr>
+        <a:xfrm>
+          <a:off x="0" y="0"/>
+          <a:ext cx="0" cy="0"/>
+          <a:chOff x="0" y="0"/>
+          <a:chExt cx="0" cy="0"/>
+        </a:xfrm>
+      </p:grpSpPr>
+      <p:sp>
+        <p:nvSpPr>
+          <p:cNvPr id="2" name="Text Placeholder 1"/>
+          <p:cNvSpPr>
+            <a:spLocks noGrp="1"/>
+          </p:cNvSpPr>
+          <p:nvPr>
+            <p:ph type="body" sz="quarter" idx="11"/>
+          </p:nvPr>
+        </p:nvSpPr>
+        <p:spPr>
+          <a:xfrm>
             <a:off x="328613" y="1079047"/>
             <a:ext cx="8401246" cy="485802"/>
           </a:xfrm>
@@ -5213,34 +7159,31 @@
       </p:pic>
       <p:sp>
         <p:nvSpPr>
-          <p:cNvPr id="9" name="Frame 8"/>
+          <p:cNvPr id="10" name="Right Arrow 9"/>
           <p:cNvSpPr/>
           <p:nvPr/>
         </p:nvSpPr>
         <p:spPr>
           <a:xfrm>
-            <a:off x="2592198" y="4043494"/>
-            <a:ext cx="4588778" cy="746620"/>
+            <a:off x="1828800" y="4043493"/>
+            <a:ext cx="1087464" cy="520118"/>
           </a:xfrm>
-          <a:prstGeom prst="frame">
+          <a:prstGeom prst="rightArrow">
             <a:avLst/>
           </a:prstGeom>
           <a:solidFill>
-            <a:srgbClr val="92D050"/>
+            <a:srgbClr val="FF0000"/>
           </a:solidFill>
-          <a:ln w="6350">
-            <a:round/>
-          </a:ln>
         </p:spPr>
         <p:style>
           <a:lnRef idx="1">
-            <a:schemeClr val="accent2"/>
+            <a:schemeClr val="accent1"/>
           </a:lnRef>
           <a:fillRef idx="3">
-            <a:schemeClr val="accent2"/>
+            <a:schemeClr val="accent1"/>
           </a:fillRef>
           <a:effectRef idx="2">
-            <a:schemeClr val="accent2"/>
+            <a:schemeClr val="accent1"/>
           </a:effectRef>
           <a:fontRef idx="minor">
             <a:schemeClr val="lt1"/>
@@ -5251,11 +7194,7 @@
           <a:lstStyle/>
           <a:p>
             <a:pPr algn="ctr"/>
-            <a:endParaRPr lang="en-US">
-              <a:solidFill>
-                <a:schemeClr val="tx1"/>
-              </a:solidFill>
-            </a:endParaRPr>
+            <a:endParaRPr lang="en-US"/>
           </a:p>
         </p:txBody>
       </p:sp>
@@ -5290,7 +7229,7 @@
                             </p:stCondLst>
                             <p:childTnLst>
                               <p:par>
-                                <p:cTn id="5" presetID="1" presetClass="entr" presetSubtype="0" fill="hold" grpId="0" nodeType="clickEffect">
+                                <p:cTn id="5" presetID="1" presetClass="entr" presetSubtype="0" fill="hold" nodeType="clickEffect">
                                   <p:stCondLst>
                                     <p:cond delay="0"/>
                                   </p:stCondLst>
@@ -5303,7 +7242,52 @@
                                           </p:stCondLst>
                                         </p:cTn>
                                         <p:tgtEl>
-                                          <p:spTgt spid="9"/>
+                                          <p:spTgt spid="4"/>
+                                        </p:tgtEl>
+                                        <p:attrNameLst>
+                                          <p:attrName>style.visibility</p:attrName>
+                                        </p:attrNameLst>
+                                      </p:cBhvr>
+                                      <p:to>
+                                        <p:strVal val="visible"/>
+                                      </p:to>
+                                    </p:set>
+                                  </p:childTnLst>
+                                </p:cTn>
+                              </p:par>
+                            </p:childTnLst>
+                          </p:cTn>
+                        </p:par>
+                      </p:childTnLst>
+                    </p:cTn>
+                  </p:par>
+                  <p:par>
+                    <p:cTn id="7" fill="hold">
+                      <p:stCondLst>
+                        <p:cond delay="indefinite"/>
+                      </p:stCondLst>
+                      <p:childTnLst>
+                        <p:par>
+                          <p:cTn id="8" fill="hold">
+                            <p:stCondLst>
+                              <p:cond delay="0"/>
+                            </p:stCondLst>
+                            <p:childTnLst>
+                              <p:par>
+                                <p:cTn id="9" presetID="1" presetClass="entr" presetSubtype="0" fill="hold" grpId="0" nodeType="clickEffect">
+                                  <p:stCondLst>
+                                    <p:cond delay="0"/>
+                                  </p:stCondLst>
+                                  <p:childTnLst>
+                                    <p:set>
+                                      <p:cBhvr>
+                                        <p:cTn id="10" dur="1" fill="hold">
+                                          <p:stCondLst>
+                                            <p:cond delay="0"/>
+                                          </p:stCondLst>
+                                        </p:cTn>
+                                        <p:tgtEl>
+                                          <p:spTgt spid="10"/>
                                         </p:tgtEl>
                                         <p:attrNameLst>
                                           <p:attrName>style.visibility</p:attrName>
@@ -5344,7 +7328,7 @@
       </p:par>
     </p:tnLst>
     <p:bldLst>
-      <p:bldP spid="9" grpId="0" animBg="1"/>
+      <p:bldP spid="10" grpId="0" animBg="1"/>
     </p:bldLst>
   </p:timing>
 </p:sld>
@@ -5537,9 +7521,55 @@
           </a:p>
         </p:txBody>
       </p:sp>
+      <p:sp>
+        <p:nvSpPr>
+          <p:cNvPr id="10" name="TextBox 9"/>
+          <p:cNvSpPr txBox="1"/>
+          <p:nvPr/>
+        </p:nvSpPr>
+        <p:spPr>
+          <a:xfrm>
+            <a:off x="771785" y="2840411"/>
+            <a:ext cx="5276675" cy="369332"/>
+          </a:xfrm>
+          <a:prstGeom prst="rect">
+            <a:avLst/>
+          </a:prstGeom>
+          <a:noFill/>
+        </p:spPr>
+        <p:txBody>
+          <a:bodyPr wrap="square" lIns="90000" rtlCol="0">
+            <a:spAutoFit/>
+          </a:bodyPr>
+          <a:lstStyle/>
+          <a:p>
+            <a:r>
+              <a:rPr lang="mr-IN" dirty="0" smtClean="0">
+                <a:solidFill>
+                  <a:schemeClr val="bg1"/>
+                </a:solidFill>
+              </a:rPr>
+              <a:t>…</a:t>
+            </a:r>
+            <a:r>
+              <a:rPr lang="en-GB" dirty="0" smtClean="0">
+                <a:solidFill>
+                  <a:schemeClr val="bg1"/>
+                </a:solidFill>
+              </a:rPr>
+              <a:t>so I can write something like this</a:t>
+            </a:r>
+            <a:endParaRPr lang="en-US" dirty="0">
+              <a:solidFill>
+                <a:schemeClr val="bg1"/>
+              </a:solidFill>
+            </a:endParaRPr>
+          </a:p>
+        </p:txBody>
+      </p:sp>
       <p:pic>
         <p:nvPicPr>
-          <p:cNvPr id="7" name="Picture 6"/>
+          <p:cNvPr id="8" name="Picture 7"/>
           <p:cNvPicPr>
             <a:picLocks noChangeAspect="1"/>
           </p:cNvPicPr>
@@ -5559,60 +7589,14 @@
         </p:blipFill>
         <p:spPr>
           <a:xfrm>
-            <a:off x="771786" y="3454314"/>
-            <a:ext cx="6121400" cy="1308100"/>
+            <a:off x="771785" y="3454547"/>
+            <a:ext cx="4102100" cy="1231900"/>
           </a:xfrm>
           <a:prstGeom prst="rect">
             <a:avLst/>
           </a:prstGeom>
         </p:spPr>
       </p:pic>
-      <p:sp>
-        <p:nvSpPr>
-          <p:cNvPr id="10" name="TextBox 9"/>
-          <p:cNvSpPr txBox="1"/>
-          <p:nvPr/>
-        </p:nvSpPr>
-        <p:spPr>
-          <a:xfrm>
-            <a:off x="771785" y="2840411"/>
-            <a:ext cx="5276675" cy="369332"/>
-          </a:xfrm>
-          <a:prstGeom prst="rect">
-            <a:avLst/>
-          </a:prstGeom>
-          <a:noFill/>
-        </p:spPr>
-        <p:txBody>
-          <a:bodyPr wrap="square" lIns="90000" rtlCol="0">
-            <a:spAutoFit/>
-          </a:bodyPr>
-          <a:lstStyle/>
-          <a:p>
-            <a:r>
-              <a:rPr lang="mr-IN" dirty="0" smtClean="0">
-                <a:solidFill>
-                  <a:schemeClr val="bg1"/>
-                </a:solidFill>
-              </a:rPr>
-              <a:t>…</a:t>
-            </a:r>
-            <a:r>
-              <a:rPr lang="en-GB" dirty="0" smtClean="0">
-                <a:solidFill>
-                  <a:schemeClr val="bg1"/>
-                </a:solidFill>
-              </a:rPr>
-              <a:t>so I can write something like this</a:t>
-            </a:r>
-            <a:endParaRPr lang="en-US" dirty="0">
-              <a:solidFill>
-                <a:schemeClr val="bg1"/>
-              </a:solidFill>
-            </a:endParaRPr>
-          </a:p>
-        </p:txBody>
-      </p:sp>
     </p:spTree>
     <p:extLst>
       <p:ext uri="{BB962C8B-B14F-4D97-AF65-F5344CB8AC3E}">
@@ -5792,7 +7776,7 @@
                                           </p:stCondLst>
                                         </p:cTn>
                                         <p:tgtEl>
-                                          <p:spTgt spid="7"/>
+                                          <p:spTgt spid="8"/>
                                         </p:tgtEl>
                                         <p:attrNameLst>
                                           <p:attrName>style.visibility</p:attrName>

</xml_diff>

<commit_message>
adding maybe monad for return null.
</commit_message>
<xml_diff>
--- a/docs/noif.pptx
+++ b/docs/noif.pptx
@@ -6,7 +6,7 @@
     <p:sldMasterId id="2147483648" r:id="rId2"/>
   </p:sldMasterIdLst>
   <p:notesMasterIdLst>
-    <p:notesMasterId r:id="rId17"/>
+    <p:notesMasterId r:id="rId21"/>
   </p:notesMasterIdLst>
   <p:sldIdLst>
     <p:sldId id="264" r:id="rId3"/>
@@ -15,14 +15,18 @@
     <p:sldId id="314" r:id="rId6"/>
     <p:sldId id="316" r:id="rId7"/>
     <p:sldId id="312" r:id="rId8"/>
-    <p:sldId id="318" r:id="rId9"/>
-    <p:sldId id="319" r:id="rId10"/>
-    <p:sldId id="320" r:id="rId11"/>
-    <p:sldId id="321" r:id="rId12"/>
-    <p:sldId id="322" r:id="rId13"/>
-    <p:sldId id="323" r:id="rId14"/>
-    <p:sldId id="324" r:id="rId15"/>
-    <p:sldId id="317" r:id="rId16"/>
+    <p:sldId id="328" r:id="rId9"/>
+    <p:sldId id="318" r:id="rId10"/>
+    <p:sldId id="319" r:id="rId11"/>
+    <p:sldId id="320" r:id="rId12"/>
+    <p:sldId id="321" r:id="rId13"/>
+    <p:sldId id="322" r:id="rId14"/>
+    <p:sldId id="323" r:id="rId15"/>
+    <p:sldId id="324" r:id="rId16"/>
+    <p:sldId id="325" r:id="rId17"/>
+    <p:sldId id="326" r:id="rId18"/>
+    <p:sldId id="327" r:id="rId19"/>
+    <p:sldId id="317" r:id="rId20"/>
   </p:sldIdLst>
   <p:sldSz cx="9144000" cy="6858000" type="screen4x3"/>
   <p:notesSz cx="6858000" cy="9144000"/>
@@ -633,55 +637,10 @@
           <a:bodyPr/>
           <a:lstStyle/>
           <a:p>
-            <a:pPr marL="171450" marR="0" lvl="0" indent="-171450" algn="l" defTabSz="914400" rtl="0" eaLnBrk="1" fontAlgn="auto" latinLnBrk="0" hangingPunct="1">
-              <a:lnSpc>
-                <a:spcPct val="100000"/>
-              </a:lnSpc>
-              <a:spcBef>
-                <a:spcPts val="0"/>
-              </a:spcBef>
-              <a:spcAft>
-                <a:spcPts val="0"/>
-              </a:spcAft>
-              <a:buClrTx/>
-              <a:buSzTx/>
+            <a:pPr marL="171450" indent="-171450">
               <a:buFontTx/>
-              <a:buNone/>
-              <a:tabLst/>
-              <a:defRPr/>
+              <a:buChar char="-"/>
             </a:pPr>
-            <a:r>
-              <a:rPr lang="it-IT" dirty="0" smtClean="0"/>
-              <a:t>- </a:t>
-            </a:r>
-            <a:r>
-              <a:rPr lang="it-IT" dirty="0" err="1" smtClean="0"/>
-              <a:t>Sometimes</a:t>
-            </a:r>
-            <a:r>
-              <a:rPr lang="it-IT" dirty="0" smtClean="0"/>
-              <a:t> </a:t>
-            </a:r>
-            <a:r>
-              <a:rPr lang="it-IT" dirty="0" err="1" smtClean="0"/>
-              <a:t>methods</a:t>
-            </a:r>
-            <a:r>
-              <a:rPr lang="it-IT" dirty="0" smtClean="0"/>
-              <a:t> </a:t>
-            </a:r>
-            <a:r>
-              <a:rPr lang="it-IT" dirty="0" err="1" smtClean="0"/>
-              <a:t>return</a:t>
-            </a:r>
-            <a:r>
-              <a:rPr lang="it-IT" dirty="0" smtClean="0"/>
-              <a:t> </a:t>
-            </a:r>
-            <a:r>
-              <a:rPr lang="it-IT" dirty="0" err="1" smtClean="0"/>
-              <a:t>null</a:t>
-            </a:r>
             <a:endParaRPr lang="it-IT" dirty="0"/>
           </a:p>
         </p:txBody>
@@ -712,7 +671,7 @@
     </p:spTree>
     <p:extLst>
       <p:ext uri="{BB962C8B-B14F-4D97-AF65-F5344CB8AC3E}">
-        <p14:creationId xmlns:p14="http://schemas.microsoft.com/office/powerpoint/2010/main" val="792088354"/>
+        <p14:creationId xmlns:p14="http://schemas.microsoft.com/office/powerpoint/2010/main" val="1662219671"/>
       </p:ext>
     </p:extLst>
   </p:cSld>
@@ -766,10 +725,55 @@
           <a:bodyPr/>
           <a:lstStyle/>
           <a:p>
-            <a:pPr marL="171450" indent="-171450">
+            <a:pPr marL="171450" marR="0" lvl="0" indent="-171450" algn="l" defTabSz="914400" rtl="0" eaLnBrk="1" fontAlgn="auto" latinLnBrk="0" hangingPunct="1">
+              <a:lnSpc>
+                <a:spcPct val="100000"/>
+              </a:lnSpc>
+              <a:spcBef>
+                <a:spcPts val="0"/>
+              </a:spcBef>
+              <a:spcAft>
+                <a:spcPts val="0"/>
+              </a:spcAft>
+              <a:buClrTx/>
+              <a:buSzTx/>
               <a:buFontTx/>
-              <a:buChar char="-"/>
+              <a:buNone/>
+              <a:tabLst/>
+              <a:defRPr/>
             </a:pPr>
+            <a:r>
+              <a:rPr lang="it-IT" dirty="0" smtClean="0"/>
+              <a:t>- </a:t>
+            </a:r>
+            <a:r>
+              <a:rPr lang="it-IT" dirty="0" err="1" smtClean="0"/>
+              <a:t>Sometimes</a:t>
+            </a:r>
+            <a:r>
+              <a:rPr lang="it-IT" dirty="0" smtClean="0"/>
+              <a:t> </a:t>
+            </a:r>
+            <a:r>
+              <a:rPr lang="it-IT" dirty="0" err="1" smtClean="0"/>
+              <a:t>methods</a:t>
+            </a:r>
+            <a:r>
+              <a:rPr lang="it-IT" dirty="0" smtClean="0"/>
+              <a:t> </a:t>
+            </a:r>
+            <a:r>
+              <a:rPr lang="it-IT" dirty="0" err="1" smtClean="0"/>
+              <a:t>return</a:t>
+            </a:r>
+            <a:r>
+              <a:rPr lang="it-IT" dirty="0" smtClean="0"/>
+              <a:t> </a:t>
+            </a:r>
+            <a:r>
+              <a:rPr lang="it-IT" dirty="0" err="1" smtClean="0"/>
+              <a:t>null</a:t>
+            </a:r>
             <a:endParaRPr lang="it-IT" dirty="0"/>
           </a:p>
         </p:txBody>
@@ -800,7 +804,7 @@
     </p:spTree>
     <p:extLst>
       <p:ext uri="{BB962C8B-B14F-4D97-AF65-F5344CB8AC3E}">
-        <p14:creationId xmlns:p14="http://schemas.microsoft.com/office/powerpoint/2010/main" val="1151283582"/>
+        <p14:creationId xmlns:p14="http://schemas.microsoft.com/office/powerpoint/2010/main" val="792088354"/>
       </p:ext>
     </p:extLst>
   </p:cSld>
@@ -888,7 +892,7 @@
     </p:spTree>
     <p:extLst>
       <p:ext uri="{BB962C8B-B14F-4D97-AF65-F5344CB8AC3E}">
-        <p14:creationId xmlns:p14="http://schemas.microsoft.com/office/powerpoint/2010/main" val="1710101006"/>
+        <p14:creationId xmlns:p14="http://schemas.microsoft.com/office/powerpoint/2010/main" val="1151283582"/>
       </p:ext>
     </p:extLst>
   </p:cSld>
@@ -976,7 +980,7 @@
     </p:spTree>
     <p:extLst>
       <p:ext uri="{BB962C8B-B14F-4D97-AF65-F5344CB8AC3E}">
-        <p14:creationId xmlns:p14="http://schemas.microsoft.com/office/powerpoint/2010/main" val="181527561"/>
+        <p14:creationId xmlns:p14="http://schemas.microsoft.com/office/powerpoint/2010/main" val="1710101006"/>
       </p:ext>
     </p:extLst>
   </p:cSld>
@@ -1030,6 +1034,10 @@
           <a:bodyPr/>
           <a:lstStyle/>
           <a:p>
+            <a:pPr marL="171450" indent="-171450">
+              <a:buFontTx/>
+              <a:buChar char="-"/>
+            </a:pPr>
             <a:endParaRPr lang="it-IT" dirty="0"/>
           </a:p>
         </p:txBody>
@@ -1052,6 +1060,354 @@
             <a:fld id="{2C5A56FE-B2E8-4285-8F31-2AEEB8EA39C6}" type="slidenum">
               <a:rPr lang="en-GB" smtClean="0"/>
               <a:t>14</a:t>
+            </a:fld>
+            <a:endParaRPr lang="en-GB"/>
+          </a:p>
+        </p:txBody>
+      </p:sp>
+    </p:spTree>
+    <p:extLst>
+      <p:ext uri="{BB962C8B-B14F-4D97-AF65-F5344CB8AC3E}">
+        <p14:creationId xmlns:p14="http://schemas.microsoft.com/office/powerpoint/2010/main" val="181527561"/>
+      </p:ext>
+    </p:extLst>
+  </p:cSld>
+  <p:clrMapOvr>
+    <a:masterClrMapping/>
+  </p:clrMapOvr>
+</p:notes>
+</file>
+
+<file path=ppt/notesSlides/notesSlide15.xml><?xml version="1.0" encoding="utf-8"?>
+<p:notes xmlns:a="http://schemas.openxmlformats.org/drawingml/2006/main" xmlns:r="http://schemas.openxmlformats.org/officeDocument/2006/relationships" xmlns:p="http://schemas.openxmlformats.org/presentationml/2006/main">
+  <p:cSld>
+    <p:spTree>
+      <p:nvGrpSpPr>
+        <p:cNvPr id="1" name=""/>
+        <p:cNvGrpSpPr/>
+        <p:nvPr/>
+      </p:nvGrpSpPr>
+      <p:grpSpPr>
+        <a:xfrm>
+          <a:off x="0" y="0"/>
+          <a:ext cx="0" cy="0"/>
+          <a:chOff x="0" y="0"/>
+          <a:chExt cx="0" cy="0"/>
+        </a:xfrm>
+      </p:grpSpPr>
+      <p:sp>
+        <p:nvSpPr>
+          <p:cNvPr id="2" name="Slide Image Placeholder 1"/>
+          <p:cNvSpPr>
+            <a:spLocks noGrp="1" noRot="1" noChangeAspect="1"/>
+          </p:cNvSpPr>
+          <p:nvPr>
+            <p:ph type="sldImg"/>
+          </p:nvPr>
+        </p:nvSpPr>
+        <p:spPr/>
+      </p:sp>
+      <p:sp>
+        <p:nvSpPr>
+          <p:cNvPr id="3" name="Notes Placeholder 2"/>
+          <p:cNvSpPr>
+            <a:spLocks noGrp="1"/>
+          </p:cNvSpPr>
+          <p:nvPr>
+            <p:ph type="body" idx="1"/>
+          </p:nvPr>
+        </p:nvSpPr>
+        <p:spPr/>
+        <p:txBody>
+          <a:bodyPr/>
+          <a:lstStyle/>
+          <a:p>
+            <a:pPr marL="171450" indent="-171450">
+              <a:buFontTx/>
+              <a:buChar char="-"/>
+            </a:pPr>
+            <a:endParaRPr lang="it-IT" dirty="0"/>
+          </a:p>
+        </p:txBody>
+      </p:sp>
+      <p:sp>
+        <p:nvSpPr>
+          <p:cNvPr id="4" name="Slide Number Placeholder 3"/>
+          <p:cNvSpPr>
+            <a:spLocks noGrp="1"/>
+          </p:cNvSpPr>
+          <p:nvPr>
+            <p:ph type="sldNum" sz="quarter" idx="10"/>
+          </p:nvPr>
+        </p:nvSpPr>
+        <p:spPr/>
+        <p:txBody>
+          <a:bodyPr/>
+          <a:lstStyle/>
+          <a:p>
+            <a:fld id="{2C5A56FE-B2E8-4285-8F31-2AEEB8EA39C6}" type="slidenum">
+              <a:rPr lang="en-GB" smtClean="0"/>
+              <a:t>15</a:t>
+            </a:fld>
+            <a:endParaRPr lang="en-GB"/>
+          </a:p>
+        </p:txBody>
+      </p:sp>
+    </p:spTree>
+    <p:extLst>
+      <p:ext uri="{BB962C8B-B14F-4D97-AF65-F5344CB8AC3E}">
+        <p14:creationId xmlns:p14="http://schemas.microsoft.com/office/powerpoint/2010/main" val="388241380"/>
+      </p:ext>
+    </p:extLst>
+  </p:cSld>
+  <p:clrMapOvr>
+    <a:masterClrMapping/>
+  </p:clrMapOvr>
+</p:notes>
+</file>
+
+<file path=ppt/notesSlides/notesSlide16.xml><?xml version="1.0" encoding="utf-8"?>
+<p:notes xmlns:a="http://schemas.openxmlformats.org/drawingml/2006/main" xmlns:r="http://schemas.openxmlformats.org/officeDocument/2006/relationships" xmlns:p="http://schemas.openxmlformats.org/presentationml/2006/main">
+  <p:cSld>
+    <p:spTree>
+      <p:nvGrpSpPr>
+        <p:cNvPr id="1" name=""/>
+        <p:cNvGrpSpPr/>
+        <p:nvPr/>
+      </p:nvGrpSpPr>
+      <p:grpSpPr>
+        <a:xfrm>
+          <a:off x="0" y="0"/>
+          <a:ext cx="0" cy="0"/>
+          <a:chOff x="0" y="0"/>
+          <a:chExt cx="0" cy="0"/>
+        </a:xfrm>
+      </p:grpSpPr>
+      <p:sp>
+        <p:nvSpPr>
+          <p:cNvPr id="2" name="Slide Image Placeholder 1"/>
+          <p:cNvSpPr>
+            <a:spLocks noGrp="1" noRot="1" noChangeAspect="1"/>
+          </p:cNvSpPr>
+          <p:nvPr>
+            <p:ph type="sldImg"/>
+          </p:nvPr>
+        </p:nvSpPr>
+        <p:spPr/>
+      </p:sp>
+      <p:sp>
+        <p:nvSpPr>
+          <p:cNvPr id="3" name="Notes Placeholder 2"/>
+          <p:cNvSpPr>
+            <a:spLocks noGrp="1"/>
+          </p:cNvSpPr>
+          <p:nvPr>
+            <p:ph type="body" idx="1"/>
+          </p:nvPr>
+        </p:nvSpPr>
+        <p:spPr/>
+        <p:txBody>
+          <a:bodyPr/>
+          <a:lstStyle/>
+          <a:p>
+            <a:pPr marL="171450" indent="-171450">
+              <a:buFontTx/>
+              <a:buChar char="-"/>
+            </a:pPr>
+            <a:endParaRPr lang="it-IT" dirty="0"/>
+          </a:p>
+        </p:txBody>
+      </p:sp>
+      <p:sp>
+        <p:nvSpPr>
+          <p:cNvPr id="4" name="Slide Number Placeholder 3"/>
+          <p:cNvSpPr>
+            <a:spLocks noGrp="1"/>
+          </p:cNvSpPr>
+          <p:nvPr>
+            <p:ph type="sldNum" sz="quarter" idx="10"/>
+          </p:nvPr>
+        </p:nvSpPr>
+        <p:spPr/>
+        <p:txBody>
+          <a:bodyPr/>
+          <a:lstStyle/>
+          <a:p>
+            <a:fld id="{2C5A56FE-B2E8-4285-8F31-2AEEB8EA39C6}" type="slidenum">
+              <a:rPr lang="en-GB" smtClean="0"/>
+              <a:t>16</a:t>
+            </a:fld>
+            <a:endParaRPr lang="en-GB"/>
+          </a:p>
+        </p:txBody>
+      </p:sp>
+    </p:spTree>
+    <p:extLst>
+      <p:ext uri="{BB962C8B-B14F-4D97-AF65-F5344CB8AC3E}">
+        <p14:creationId xmlns:p14="http://schemas.microsoft.com/office/powerpoint/2010/main" val="76746028"/>
+      </p:ext>
+    </p:extLst>
+  </p:cSld>
+  <p:clrMapOvr>
+    <a:masterClrMapping/>
+  </p:clrMapOvr>
+</p:notes>
+</file>
+
+<file path=ppt/notesSlides/notesSlide17.xml><?xml version="1.0" encoding="utf-8"?>
+<p:notes xmlns:a="http://schemas.openxmlformats.org/drawingml/2006/main" xmlns:r="http://schemas.openxmlformats.org/officeDocument/2006/relationships" xmlns:p="http://schemas.openxmlformats.org/presentationml/2006/main">
+  <p:cSld>
+    <p:spTree>
+      <p:nvGrpSpPr>
+        <p:cNvPr id="1" name=""/>
+        <p:cNvGrpSpPr/>
+        <p:nvPr/>
+      </p:nvGrpSpPr>
+      <p:grpSpPr>
+        <a:xfrm>
+          <a:off x="0" y="0"/>
+          <a:ext cx="0" cy="0"/>
+          <a:chOff x="0" y="0"/>
+          <a:chExt cx="0" cy="0"/>
+        </a:xfrm>
+      </p:grpSpPr>
+      <p:sp>
+        <p:nvSpPr>
+          <p:cNvPr id="2" name="Slide Image Placeholder 1"/>
+          <p:cNvSpPr>
+            <a:spLocks noGrp="1" noRot="1" noChangeAspect="1"/>
+          </p:cNvSpPr>
+          <p:nvPr>
+            <p:ph type="sldImg"/>
+          </p:nvPr>
+        </p:nvSpPr>
+        <p:spPr/>
+      </p:sp>
+      <p:sp>
+        <p:nvSpPr>
+          <p:cNvPr id="3" name="Notes Placeholder 2"/>
+          <p:cNvSpPr>
+            <a:spLocks noGrp="1"/>
+          </p:cNvSpPr>
+          <p:nvPr>
+            <p:ph type="body" idx="1"/>
+          </p:nvPr>
+        </p:nvSpPr>
+        <p:spPr/>
+        <p:txBody>
+          <a:bodyPr/>
+          <a:lstStyle/>
+          <a:p>
+            <a:pPr marL="171450" indent="-171450">
+              <a:buFontTx/>
+              <a:buChar char="-"/>
+            </a:pPr>
+            <a:endParaRPr lang="it-IT" dirty="0"/>
+          </a:p>
+        </p:txBody>
+      </p:sp>
+      <p:sp>
+        <p:nvSpPr>
+          <p:cNvPr id="4" name="Slide Number Placeholder 3"/>
+          <p:cNvSpPr>
+            <a:spLocks noGrp="1"/>
+          </p:cNvSpPr>
+          <p:nvPr>
+            <p:ph type="sldNum" sz="quarter" idx="10"/>
+          </p:nvPr>
+        </p:nvSpPr>
+        <p:spPr/>
+        <p:txBody>
+          <a:bodyPr/>
+          <a:lstStyle/>
+          <a:p>
+            <a:fld id="{2C5A56FE-B2E8-4285-8F31-2AEEB8EA39C6}" type="slidenum">
+              <a:rPr lang="en-GB" smtClean="0"/>
+              <a:t>17</a:t>
+            </a:fld>
+            <a:endParaRPr lang="en-GB"/>
+          </a:p>
+        </p:txBody>
+      </p:sp>
+    </p:spTree>
+    <p:extLst>
+      <p:ext uri="{BB962C8B-B14F-4D97-AF65-F5344CB8AC3E}">
+        <p14:creationId xmlns:p14="http://schemas.microsoft.com/office/powerpoint/2010/main" val="2110194744"/>
+      </p:ext>
+    </p:extLst>
+  </p:cSld>
+  <p:clrMapOvr>
+    <a:masterClrMapping/>
+  </p:clrMapOvr>
+</p:notes>
+</file>
+
+<file path=ppt/notesSlides/notesSlide18.xml><?xml version="1.0" encoding="utf-8"?>
+<p:notes xmlns:a="http://schemas.openxmlformats.org/drawingml/2006/main" xmlns:r="http://schemas.openxmlformats.org/officeDocument/2006/relationships" xmlns:p="http://schemas.openxmlformats.org/presentationml/2006/main">
+  <p:cSld>
+    <p:spTree>
+      <p:nvGrpSpPr>
+        <p:cNvPr id="1" name=""/>
+        <p:cNvGrpSpPr/>
+        <p:nvPr/>
+      </p:nvGrpSpPr>
+      <p:grpSpPr>
+        <a:xfrm>
+          <a:off x="0" y="0"/>
+          <a:ext cx="0" cy="0"/>
+          <a:chOff x="0" y="0"/>
+          <a:chExt cx="0" cy="0"/>
+        </a:xfrm>
+      </p:grpSpPr>
+      <p:sp>
+        <p:nvSpPr>
+          <p:cNvPr id="2" name="Slide Image Placeholder 1"/>
+          <p:cNvSpPr>
+            <a:spLocks noGrp="1" noRot="1" noChangeAspect="1"/>
+          </p:cNvSpPr>
+          <p:nvPr>
+            <p:ph type="sldImg"/>
+          </p:nvPr>
+        </p:nvSpPr>
+        <p:spPr/>
+      </p:sp>
+      <p:sp>
+        <p:nvSpPr>
+          <p:cNvPr id="3" name="Notes Placeholder 2"/>
+          <p:cNvSpPr>
+            <a:spLocks noGrp="1"/>
+          </p:cNvSpPr>
+          <p:nvPr>
+            <p:ph type="body" idx="1"/>
+          </p:nvPr>
+        </p:nvSpPr>
+        <p:spPr/>
+        <p:txBody>
+          <a:bodyPr/>
+          <a:lstStyle/>
+          <a:p>
+            <a:endParaRPr lang="it-IT" dirty="0"/>
+          </a:p>
+        </p:txBody>
+      </p:sp>
+      <p:sp>
+        <p:nvSpPr>
+          <p:cNvPr id="4" name="Slide Number Placeholder 3"/>
+          <p:cNvSpPr>
+            <a:spLocks noGrp="1"/>
+          </p:cNvSpPr>
+          <p:nvPr>
+            <p:ph type="sldNum" sz="quarter" idx="10"/>
+          </p:nvPr>
+        </p:nvSpPr>
+        <p:spPr/>
+        <p:txBody>
+          <a:bodyPr/>
+          <a:lstStyle/>
+          <a:p>
+            <a:fld id="{2C5A56FE-B2E8-4285-8F31-2AEEB8EA39C6}" type="slidenum">
+              <a:rPr lang="en-GB" smtClean="0"/>
+              <a:t>18</a:t>
             </a:fld>
             <a:endParaRPr lang="en-GB"/>
           </a:p>
@@ -1767,64 +2123,6 @@
           <a:bodyPr/>
           <a:lstStyle/>
           <a:p>
-            <a:pPr marL="171450" indent="-171450">
-              <a:buFontTx/>
-              <a:buChar char="-"/>
-            </a:pPr>
-            <a:r>
-              <a:rPr lang="it-IT" dirty="0" err="1" smtClean="0"/>
-              <a:t>Every</a:t>
-            </a:r>
-            <a:r>
-              <a:rPr lang="it-IT" baseline="0" dirty="0" smtClean="0"/>
-              <a:t> time </a:t>
-            </a:r>
-            <a:r>
-              <a:rPr lang="it-IT" baseline="0" dirty="0" err="1" smtClean="0"/>
-              <a:t>we</a:t>
-            </a:r>
-            <a:r>
-              <a:rPr lang="it-IT" baseline="0" dirty="0" smtClean="0"/>
-              <a:t> call </a:t>
-            </a:r>
-            <a:r>
-              <a:rPr lang="it-IT" baseline="0" dirty="0" err="1" smtClean="0"/>
-              <a:t>getInstance</a:t>
-            </a:r>
-            <a:r>
-              <a:rPr lang="it-IT" baseline="0" dirty="0" smtClean="0"/>
-              <a:t> </a:t>
-            </a:r>
-            <a:r>
-              <a:rPr lang="it-IT" baseline="0" dirty="0" err="1" smtClean="0"/>
-              <a:t>method</a:t>
-            </a:r>
-            <a:r>
-              <a:rPr lang="it-IT" baseline="0" dirty="0" smtClean="0"/>
-              <a:t> </a:t>
-            </a:r>
-            <a:r>
-              <a:rPr lang="it-IT" baseline="0" dirty="0" err="1" smtClean="0"/>
-              <a:t>we</a:t>
-            </a:r>
-            <a:r>
-              <a:rPr lang="it-IT" baseline="0" dirty="0" smtClean="0"/>
-              <a:t> </a:t>
-            </a:r>
-            <a:r>
-              <a:rPr lang="it-IT" baseline="0" dirty="0" err="1" smtClean="0"/>
-              <a:t>perform</a:t>
-            </a:r>
-            <a:r>
-              <a:rPr lang="it-IT" baseline="0" dirty="0" smtClean="0"/>
-              <a:t> an IF statement</a:t>
-            </a:r>
-          </a:p>
-          <a:p>
-            <a:pPr marL="171450" indent="-171450">
-              <a:buFontTx/>
-              <a:buChar char="-"/>
-            </a:pPr>
             <a:endParaRPr lang="it-IT" dirty="0"/>
           </a:p>
         </p:txBody>
@@ -1855,7 +2153,7 @@
     </p:spTree>
     <p:extLst>
       <p:ext uri="{BB962C8B-B14F-4D97-AF65-F5344CB8AC3E}">
-        <p14:creationId xmlns:p14="http://schemas.microsoft.com/office/powerpoint/2010/main" val="13604617"/>
+        <p14:creationId xmlns:p14="http://schemas.microsoft.com/office/powerpoint/2010/main" val="717949672"/>
       </p:ext>
     </p:extLst>
   </p:cSld>
@@ -1909,22 +2207,63 @@
           <a:bodyPr/>
           <a:lstStyle/>
           <a:p>
-            <a:pPr marL="171450" marR="0" lvl="0" indent="-171450" algn="l" defTabSz="914400" rtl="0" eaLnBrk="1" fontAlgn="auto" latinLnBrk="0" hangingPunct="1">
-              <a:lnSpc>
-                <a:spcPct val="100000"/>
-              </a:lnSpc>
-              <a:spcBef>
-                <a:spcPts val="0"/>
-              </a:spcBef>
-              <a:spcAft>
-                <a:spcPts val="0"/>
-              </a:spcAft>
-              <a:buClrTx/>
-              <a:buSzTx/>
+            <a:pPr marL="171450" indent="-171450">
               <a:buFontTx/>
-              <a:buNone/>
-              <a:tabLst/>
-              <a:defRPr/>
+              <a:buChar char="-"/>
+            </a:pPr>
+            <a:r>
+              <a:rPr lang="it-IT" dirty="0" err="1" smtClean="0"/>
+              <a:t>Every</a:t>
+            </a:r>
+            <a:r>
+              <a:rPr lang="it-IT" baseline="0" dirty="0" smtClean="0"/>
+              <a:t> time </a:t>
+            </a:r>
+            <a:r>
+              <a:rPr lang="it-IT" baseline="0" dirty="0" err="1" smtClean="0"/>
+              <a:t>we</a:t>
+            </a:r>
+            <a:r>
+              <a:rPr lang="it-IT" baseline="0" dirty="0" smtClean="0"/>
+              <a:t> call </a:t>
+            </a:r>
+            <a:r>
+              <a:rPr lang="it-IT" baseline="0" dirty="0" err="1" smtClean="0"/>
+              <a:t>getInstance</a:t>
+            </a:r>
+            <a:r>
+              <a:rPr lang="it-IT" baseline="0" dirty="0" smtClean="0"/>
+              <a:t> </a:t>
+            </a:r>
+            <a:r>
+              <a:rPr lang="it-IT" baseline="0" dirty="0" err="1" smtClean="0"/>
+              <a:t>method</a:t>
+            </a:r>
+            <a:r>
+              <a:rPr lang="it-IT" baseline="0" dirty="0" smtClean="0"/>
+              <a:t> </a:t>
+            </a:r>
+            <a:r>
+              <a:rPr lang="it-IT" baseline="0" dirty="0" err="1" smtClean="0"/>
+              <a:t>we</a:t>
+            </a:r>
+            <a:r>
+              <a:rPr lang="it-IT" baseline="0" dirty="0" smtClean="0"/>
+              <a:t> </a:t>
+            </a:r>
+            <a:r>
+              <a:rPr lang="it-IT" baseline="0" dirty="0" err="1" smtClean="0"/>
+              <a:t>perform</a:t>
+            </a:r>
+            <a:r>
+              <a:rPr lang="it-IT" baseline="0" dirty="0" smtClean="0"/>
+              <a:t> an IF statement</a:t>
+            </a:r>
+          </a:p>
+          <a:p>
+            <a:pPr marL="171450" indent="-171450">
+              <a:buFontTx/>
+              <a:buChar char="-"/>
             </a:pPr>
             <a:endParaRPr lang="it-IT" dirty="0"/>
           </a:p>
@@ -1956,7 +2295,7 @@
     </p:spTree>
     <p:extLst>
       <p:ext uri="{BB962C8B-B14F-4D97-AF65-F5344CB8AC3E}">
-        <p14:creationId xmlns:p14="http://schemas.microsoft.com/office/powerpoint/2010/main" val="368492531"/>
+        <p14:creationId xmlns:p14="http://schemas.microsoft.com/office/powerpoint/2010/main" val="13604617"/>
       </p:ext>
     </p:extLst>
   </p:cSld>
@@ -2010,9 +2349,22 @@
           <a:bodyPr/>
           <a:lstStyle/>
           <a:p>
-            <a:pPr marL="171450" indent="-171450">
+            <a:pPr marL="171450" marR="0" lvl="0" indent="-171450" algn="l" defTabSz="914400" rtl="0" eaLnBrk="1" fontAlgn="auto" latinLnBrk="0" hangingPunct="1">
+              <a:lnSpc>
+                <a:spcPct val="100000"/>
+              </a:lnSpc>
+              <a:spcBef>
+                <a:spcPts val="0"/>
+              </a:spcBef>
+              <a:spcAft>
+                <a:spcPts val="0"/>
+              </a:spcAft>
+              <a:buClrTx/>
+              <a:buSzTx/>
               <a:buFontTx/>
-              <a:buChar char="-"/>
+              <a:buNone/>
+              <a:tabLst/>
+              <a:defRPr/>
             </a:pPr>
             <a:endParaRPr lang="it-IT" dirty="0"/>
           </a:p>
@@ -2044,7 +2396,7 @@
     </p:spTree>
     <p:extLst>
       <p:ext uri="{BB962C8B-B14F-4D97-AF65-F5344CB8AC3E}">
-        <p14:creationId xmlns:p14="http://schemas.microsoft.com/office/powerpoint/2010/main" val="1662219671"/>
+        <p14:creationId xmlns:p14="http://schemas.microsoft.com/office/powerpoint/2010/main" val="368492531"/>
       </p:ext>
     </p:extLst>
   </p:cSld>
@@ -4592,6 +4944,128 @@
                   <a:schemeClr val="bg1"/>
                 </a:solidFill>
               </a:rPr>
+              <a:t>Singleton</a:t>
+            </a:r>
+            <a:r>
+              <a:rPr lang="en-US" sz="1800" dirty="0">
+                <a:solidFill>
+                  <a:schemeClr val="bg1"/>
+                </a:solidFill>
+              </a:rPr>
+              <a:t> </a:t>
+            </a:r>
+            <a:r>
+              <a:rPr lang="en-US" sz="1800" dirty="0" smtClean="0">
+                <a:solidFill>
+                  <a:schemeClr val="bg1"/>
+                </a:solidFill>
+              </a:rPr>
+              <a:t>revisited</a:t>
+            </a:r>
+            <a:endParaRPr lang="en-US" sz="1800" dirty="0" smtClean="0">
+              <a:solidFill>
+                <a:schemeClr val="bg1"/>
+              </a:solidFill>
+            </a:endParaRPr>
+          </a:p>
+        </p:txBody>
+      </p:sp>
+      <p:pic>
+        <p:nvPicPr>
+          <p:cNvPr id="3" name="Picture 2"/>
+          <p:cNvPicPr>
+            <a:picLocks noChangeAspect="1"/>
+          </p:cNvPicPr>
+          <p:nvPr/>
+        </p:nvPicPr>
+        <p:blipFill>
+          <a:blip r:embed="rId3">
+            <a:extLst>
+              <a:ext uri="{28A0092B-C50C-407E-A947-70E740481C1C}">
+                <a14:useLocalDpi xmlns:a14="http://schemas.microsoft.com/office/drawing/2010/main" val="0"/>
+              </a:ext>
+            </a:extLst>
+          </a:blip>
+          <a:stretch>
+            <a:fillRect/>
+          </a:stretch>
+        </p:blipFill>
+        <p:spPr>
+          <a:xfrm>
+            <a:off x="2611345" y="1180146"/>
+            <a:ext cx="3982402" cy="5371222"/>
+          </a:xfrm>
+          <a:prstGeom prst="rect">
+            <a:avLst/>
+          </a:prstGeom>
+        </p:spPr>
+      </p:pic>
+    </p:spTree>
+    <p:extLst>
+      <p:ext uri="{BB962C8B-B14F-4D97-AF65-F5344CB8AC3E}">
+        <p14:creationId xmlns:p14="http://schemas.microsoft.com/office/powerpoint/2010/main" val="1493767243"/>
+      </p:ext>
+    </p:extLst>
+  </p:cSld>
+  <p:clrMapOvr>
+    <a:masterClrMapping/>
+  </p:clrMapOvr>
+  <p:timing>
+    <p:tnLst>
+      <p:par>
+        <p:cTn id="1" dur="indefinite" restart="never" nodeType="tmRoot"/>
+      </p:par>
+    </p:tnLst>
+  </p:timing>
+</p:sld>
+</file>
+
+<file path=ppt/slides/slide11.xml><?xml version="1.0" encoding="utf-8"?>
+<p:sld xmlns:a="http://schemas.openxmlformats.org/drawingml/2006/main" xmlns:r="http://schemas.openxmlformats.org/officeDocument/2006/relationships" xmlns:p="http://schemas.openxmlformats.org/presentationml/2006/main">
+  <p:cSld>
+    <p:spTree>
+      <p:nvGrpSpPr>
+        <p:cNvPr id="1" name=""/>
+        <p:cNvGrpSpPr/>
+        <p:nvPr/>
+      </p:nvGrpSpPr>
+      <p:grpSpPr>
+        <a:xfrm>
+          <a:off x="0" y="0"/>
+          <a:ext cx="0" cy="0"/>
+          <a:chOff x="0" y="0"/>
+          <a:chExt cx="0" cy="0"/>
+        </a:xfrm>
+      </p:grpSpPr>
+      <p:sp>
+        <p:nvSpPr>
+          <p:cNvPr id="2" name="Text Placeholder 1"/>
+          <p:cNvSpPr>
+            <a:spLocks noGrp="1"/>
+          </p:cNvSpPr>
+          <p:nvPr>
+            <p:ph type="body" sz="quarter" idx="11"/>
+          </p:nvPr>
+        </p:nvSpPr>
+        <p:spPr>
+          <a:xfrm>
+            <a:off x="328613" y="1079046"/>
+            <a:ext cx="8401246" cy="5573423"/>
+          </a:xfrm>
+          <a:solidFill>
+            <a:schemeClr val="tx1"/>
+          </a:solidFill>
+        </p:spPr>
+        <p:txBody>
+          <a:bodyPr/>
+          <a:lstStyle/>
+          <a:p>
+            <a:r>
+              <a:rPr lang="en-US" sz="1800" dirty="0" smtClean="0">
+                <a:solidFill>
+                  <a:schemeClr val="bg1"/>
+                </a:solidFill>
+              </a:rPr>
               <a:t>Return null</a:t>
             </a:r>
             <a:endParaRPr lang="en-US" sz="1800" dirty="0" smtClean="0">
@@ -4816,7 +5290,7 @@
 </p:sld>
 </file>
 
-<file path=ppt/slides/slide11.xml><?xml version="1.0" encoding="utf-8"?>
+<file path=ppt/slides/slide12.xml><?xml version="1.0" encoding="utf-8"?>
 <p:sld xmlns:a="http://schemas.openxmlformats.org/drawingml/2006/main" xmlns:r="http://schemas.openxmlformats.org/officeDocument/2006/relationships" xmlns:p="http://schemas.openxmlformats.org/presentationml/2006/main">
   <p:cSld>
     <p:spTree>
@@ -5176,7 +5650,7 @@
 </p:sld>
 </file>
 
-<file path=ppt/slides/slide12.xml><?xml version="1.0" encoding="utf-8"?>
+<file path=ppt/slides/slide13.xml><?xml version="1.0" encoding="utf-8"?>
 <p:sld xmlns:a="http://schemas.openxmlformats.org/drawingml/2006/main" xmlns:r="http://schemas.openxmlformats.org/officeDocument/2006/relationships" xmlns:p="http://schemas.openxmlformats.org/presentationml/2006/main">
   <p:cSld>
     <p:spTree>
@@ -5661,7 +6135,7 @@
 </p:sld>
 </file>
 
-<file path=ppt/slides/slide13.xml><?xml version="1.0" encoding="utf-8"?>
+<file path=ppt/slides/slide14.xml><?xml version="1.0" encoding="utf-8"?>
 <p:sld xmlns:a="http://schemas.openxmlformats.org/drawingml/2006/main" xmlns:r="http://schemas.openxmlformats.org/officeDocument/2006/relationships" xmlns:p="http://schemas.openxmlformats.org/presentationml/2006/main">
   <p:cSld>
     <p:spTree>
@@ -5690,8 +6164,8 @@
         </p:nvSpPr>
         <p:spPr>
           <a:xfrm>
-            <a:off x="202778" y="1146157"/>
-            <a:ext cx="8401246" cy="5573423"/>
+            <a:off x="202777" y="1146157"/>
+            <a:ext cx="8714719" cy="5573423"/>
           </a:xfrm>
           <a:solidFill>
             <a:schemeClr val="tx1"/>
@@ -6145,7 +6619,959 @@
 </p:sld>
 </file>
 
-<file path=ppt/slides/slide14.xml><?xml version="1.0" encoding="utf-8"?>
+<file path=ppt/slides/slide15.xml><?xml version="1.0" encoding="utf-8"?>
+<p:sld xmlns:a="http://schemas.openxmlformats.org/drawingml/2006/main" xmlns:r="http://schemas.openxmlformats.org/officeDocument/2006/relationships" xmlns:p="http://schemas.openxmlformats.org/presentationml/2006/main">
+  <p:cSld>
+    <p:spTree>
+      <p:nvGrpSpPr>
+        <p:cNvPr id="1" name=""/>
+        <p:cNvGrpSpPr/>
+        <p:nvPr/>
+      </p:nvGrpSpPr>
+      <p:grpSpPr>
+        <a:xfrm>
+          <a:off x="0" y="0"/>
+          <a:ext cx="0" cy="0"/>
+          <a:chOff x="0" y="0"/>
+          <a:chExt cx="0" cy="0"/>
+        </a:xfrm>
+      </p:grpSpPr>
+      <p:sp>
+        <p:nvSpPr>
+          <p:cNvPr id="2" name="Text Placeholder 1"/>
+          <p:cNvSpPr>
+            <a:spLocks noGrp="1"/>
+          </p:cNvSpPr>
+          <p:nvPr>
+            <p:ph type="body" sz="quarter" idx="11"/>
+          </p:nvPr>
+        </p:nvSpPr>
+        <p:spPr>
+          <a:xfrm>
+            <a:off x="328613" y="1079046"/>
+            <a:ext cx="8401246" cy="5573423"/>
+          </a:xfrm>
+          <a:solidFill>
+            <a:schemeClr val="tx1"/>
+          </a:solidFill>
+        </p:spPr>
+        <p:txBody>
+          <a:bodyPr/>
+          <a:lstStyle/>
+          <a:p>
+            <a:r>
+              <a:rPr lang="en-US" sz="1800" dirty="0" smtClean="0">
+                <a:solidFill>
+                  <a:schemeClr val="bg1"/>
+                </a:solidFill>
+              </a:rPr>
+              <a:t>Return null functional approach using maybe monad</a:t>
+            </a:r>
+            <a:r>
+              <a:rPr lang="mr-IN" sz="1800" dirty="0" smtClean="0">
+                <a:solidFill>
+                  <a:schemeClr val="bg1"/>
+                </a:solidFill>
+              </a:rPr>
+              <a:t>…</a:t>
+            </a:r>
+            <a:endParaRPr lang="en-US" sz="1800" dirty="0" smtClean="0">
+              <a:solidFill>
+                <a:schemeClr val="bg1"/>
+              </a:solidFill>
+            </a:endParaRPr>
+          </a:p>
+        </p:txBody>
+      </p:sp>
+      <p:pic>
+        <p:nvPicPr>
+          <p:cNvPr id="4" name="Picture 3"/>
+          <p:cNvPicPr>
+            <a:picLocks noChangeAspect="1"/>
+          </p:cNvPicPr>
+          <p:nvPr/>
+        </p:nvPicPr>
+        <p:blipFill>
+          <a:blip r:embed="rId3">
+            <a:extLst>
+              <a:ext uri="{28A0092B-C50C-407E-A947-70E740481C1C}">
+                <a14:useLocalDpi xmlns:a14="http://schemas.microsoft.com/office/drawing/2010/main" val="0"/>
+              </a:ext>
+            </a:extLst>
+          </a:blip>
+          <a:stretch>
+            <a:fillRect/>
+          </a:stretch>
+        </p:blipFill>
+        <p:spPr>
+          <a:xfrm>
+            <a:off x="507982" y="1965121"/>
+            <a:ext cx="8042508" cy="4142064"/>
+          </a:xfrm>
+          <a:prstGeom prst="rect">
+            <a:avLst/>
+          </a:prstGeom>
+        </p:spPr>
+      </p:pic>
+      <p:sp>
+        <p:nvSpPr>
+          <p:cNvPr id="10" name="Line Callout 2 9"/>
+          <p:cNvSpPr/>
+          <p:nvPr/>
+        </p:nvSpPr>
+        <p:spPr>
+          <a:xfrm>
+            <a:off x="3440884" y="3241284"/>
+            <a:ext cx="981512" cy="687897"/>
+          </a:xfrm>
+          <a:prstGeom prst="borderCallout2">
+            <a:avLst>
+              <a:gd name="adj1" fmla="val 18750"/>
+              <a:gd name="adj2" fmla="val -8333"/>
+              <a:gd name="adj3" fmla="val 18750"/>
+              <a:gd name="adj4" fmla="val -16667"/>
+              <a:gd name="adj5" fmla="val -77744"/>
+              <a:gd name="adj6" fmla="val -94530"/>
+            </a:avLst>
+          </a:prstGeom>
+        </p:spPr>
+        <p:style>
+          <a:lnRef idx="1">
+            <a:schemeClr val="accent3"/>
+          </a:lnRef>
+          <a:fillRef idx="2">
+            <a:schemeClr val="accent3"/>
+          </a:fillRef>
+          <a:effectRef idx="1">
+            <a:schemeClr val="accent3"/>
+          </a:effectRef>
+          <a:fontRef idx="minor">
+            <a:schemeClr val="dk1"/>
+          </a:fontRef>
+        </p:style>
+        <p:txBody>
+          <a:bodyPr rtlCol="0" anchor="ctr"/>
+          <a:lstStyle/>
+          <a:p>
+            <a:pPr algn="ctr"/>
+            <a:r>
+              <a:rPr lang="en-US" dirty="0" smtClean="0"/>
+              <a:t>Maybe</a:t>
+            </a:r>
+          </a:p>
+          <a:p>
+            <a:pPr algn="ctr"/>
+            <a:r>
+              <a:rPr lang="en-US" dirty="0" smtClean="0"/>
+              <a:t>Monad</a:t>
+            </a:r>
+            <a:endParaRPr lang="en-US" dirty="0"/>
+          </a:p>
+        </p:txBody>
+      </p:sp>
+    </p:spTree>
+    <p:extLst>
+      <p:ext uri="{BB962C8B-B14F-4D97-AF65-F5344CB8AC3E}">
+        <p14:creationId xmlns:p14="http://schemas.microsoft.com/office/powerpoint/2010/main" val="514948970"/>
+      </p:ext>
+    </p:extLst>
+  </p:cSld>
+  <p:clrMapOvr>
+    <a:masterClrMapping/>
+  </p:clrMapOvr>
+  <p:timing>
+    <p:tnLst>
+      <p:par>
+        <p:cTn id="1" dur="indefinite" restart="never" nodeType="tmRoot">
+          <p:childTnLst>
+            <p:seq concurrent="1" nextAc="seek">
+              <p:cTn id="2" dur="indefinite" nodeType="mainSeq">
+                <p:childTnLst>
+                  <p:par>
+                    <p:cTn id="3" fill="hold">
+                      <p:stCondLst>
+                        <p:cond delay="indefinite"/>
+                      </p:stCondLst>
+                      <p:childTnLst>
+                        <p:par>
+                          <p:cTn id="4" fill="hold">
+                            <p:stCondLst>
+                              <p:cond delay="0"/>
+                            </p:stCondLst>
+                            <p:childTnLst>
+                              <p:par>
+                                <p:cTn id="5" presetID="1" presetClass="entr" presetSubtype="0" fill="hold" nodeType="clickEffect">
+                                  <p:stCondLst>
+                                    <p:cond delay="0"/>
+                                  </p:stCondLst>
+                                  <p:childTnLst>
+                                    <p:set>
+                                      <p:cBhvr>
+                                        <p:cTn id="6" dur="1" fill="hold">
+                                          <p:stCondLst>
+                                            <p:cond delay="0"/>
+                                          </p:stCondLst>
+                                        </p:cTn>
+                                        <p:tgtEl>
+                                          <p:spTgt spid="4"/>
+                                        </p:tgtEl>
+                                        <p:attrNameLst>
+                                          <p:attrName>style.visibility</p:attrName>
+                                        </p:attrNameLst>
+                                      </p:cBhvr>
+                                      <p:to>
+                                        <p:strVal val="visible"/>
+                                      </p:to>
+                                    </p:set>
+                                  </p:childTnLst>
+                                </p:cTn>
+                              </p:par>
+                            </p:childTnLst>
+                          </p:cTn>
+                        </p:par>
+                      </p:childTnLst>
+                    </p:cTn>
+                  </p:par>
+                  <p:par>
+                    <p:cTn id="7" fill="hold">
+                      <p:stCondLst>
+                        <p:cond delay="indefinite"/>
+                      </p:stCondLst>
+                      <p:childTnLst>
+                        <p:par>
+                          <p:cTn id="8" fill="hold">
+                            <p:stCondLst>
+                              <p:cond delay="0"/>
+                            </p:stCondLst>
+                            <p:childTnLst>
+                              <p:par>
+                                <p:cTn id="9" presetID="1" presetClass="entr" presetSubtype="0" fill="hold" grpId="0" nodeType="clickEffect">
+                                  <p:stCondLst>
+                                    <p:cond delay="0"/>
+                                  </p:stCondLst>
+                                  <p:childTnLst>
+                                    <p:set>
+                                      <p:cBhvr>
+                                        <p:cTn id="10" dur="1" fill="hold">
+                                          <p:stCondLst>
+                                            <p:cond delay="0"/>
+                                          </p:stCondLst>
+                                        </p:cTn>
+                                        <p:tgtEl>
+                                          <p:spTgt spid="10"/>
+                                        </p:tgtEl>
+                                        <p:attrNameLst>
+                                          <p:attrName>style.visibility</p:attrName>
+                                        </p:attrNameLst>
+                                      </p:cBhvr>
+                                      <p:to>
+                                        <p:strVal val="visible"/>
+                                      </p:to>
+                                    </p:set>
+                                  </p:childTnLst>
+                                </p:cTn>
+                              </p:par>
+                            </p:childTnLst>
+                          </p:cTn>
+                        </p:par>
+                      </p:childTnLst>
+                    </p:cTn>
+                  </p:par>
+                </p:childTnLst>
+              </p:cTn>
+              <p:prevCondLst>
+                <p:cond evt="onPrev" delay="0">
+                  <p:tgtEl>
+                    <p:sldTgt/>
+                  </p:tgtEl>
+                </p:cond>
+              </p:prevCondLst>
+              <p:nextCondLst>
+                <p:cond evt="onNext" delay="0">
+                  <p:tgtEl>
+                    <p:sldTgt/>
+                  </p:tgtEl>
+                </p:cond>
+              </p:nextCondLst>
+            </p:seq>
+          </p:childTnLst>
+        </p:cTn>
+      </p:par>
+    </p:tnLst>
+    <p:bldLst>
+      <p:bldP spid="10" grpId="0" animBg="1"/>
+    </p:bldLst>
+  </p:timing>
+</p:sld>
+</file>
+
+<file path=ppt/slides/slide16.xml><?xml version="1.0" encoding="utf-8"?>
+<p:sld xmlns:a="http://schemas.openxmlformats.org/drawingml/2006/main" xmlns:r="http://schemas.openxmlformats.org/officeDocument/2006/relationships" xmlns:p="http://schemas.openxmlformats.org/presentationml/2006/main">
+  <p:cSld>
+    <p:spTree>
+      <p:nvGrpSpPr>
+        <p:cNvPr id="1" name=""/>
+        <p:cNvGrpSpPr/>
+        <p:nvPr/>
+      </p:nvGrpSpPr>
+      <p:grpSpPr>
+        <a:xfrm>
+          <a:off x="0" y="0"/>
+          <a:ext cx="0" cy="0"/>
+          <a:chOff x="0" y="0"/>
+          <a:chExt cx="0" cy="0"/>
+        </a:xfrm>
+      </p:grpSpPr>
+      <p:sp>
+        <p:nvSpPr>
+          <p:cNvPr id="2" name="Text Placeholder 1"/>
+          <p:cNvSpPr>
+            <a:spLocks noGrp="1"/>
+          </p:cNvSpPr>
+          <p:nvPr>
+            <p:ph type="body" sz="quarter" idx="11"/>
+          </p:nvPr>
+        </p:nvSpPr>
+        <p:spPr>
+          <a:xfrm>
+            <a:off x="328613" y="1079046"/>
+            <a:ext cx="8401246" cy="5573423"/>
+          </a:xfrm>
+          <a:solidFill>
+            <a:schemeClr val="tx1"/>
+          </a:solidFill>
+        </p:spPr>
+        <p:txBody>
+          <a:bodyPr/>
+          <a:lstStyle/>
+          <a:p>
+            <a:r>
+              <a:rPr lang="en-US" sz="1800" dirty="0" smtClean="0">
+                <a:solidFill>
+                  <a:schemeClr val="bg1"/>
+                </a:solidFill>
+              </a:rPr>
+              <a:t>Return null functional approach using maybe monad</a:t>
+            </a:r>
+            <a:r>
+              <a:rPr lang="mr-IN" sz="1800" dirty="0" smtClean="0">
+                <a:solidFill>
+                  <a:schemeClr val="bg1"/>
+                </a:solidFill>
+              </a:rPr>
+              <a:t>…</a:t>
+            </a:r>
+            <a:endParaRPr lang="en-US" sz="1800" dirty="0" smtClean="0">
+              <a:solidFill>
+                <a:schemeClr val="bg1"/>
+              </a:solidFill>
+            </a:endParaRPr>
+          </a:p>
+        </p:txBody>
+      </p:sp>
+      <p:pic>
+        <p:nvPicPr>
+          <p:cNvPr id="3" name="Picture 2"/>
+          <p:cNvPicPr>
+            <a:picLocks noChangeAspect="1"/>
+          </p:cNvPicPr>
+          <p:nvPr/>
+        </p:nvPicPr>
+        <p:blipFill>
+          <a:blip r:embed="rId3">
+            <a:extLst>
+              <a:ext uri="{28A0092B-C50C-407E-A947-70E740481C1C}">
+                <a14:useLocalDpi xmlns:a14="http://schemas.microsoft.com/office/drawing/2010/main" val="0"/>
+              </a:ext>
+            </a:extLst>
+          </a:blip>
+          <a:stretch>
+            <a:fillRect/>
+          </a:stretch>
+        </p:blipFill>
+        <p:spPr>
+          <a:xfrm>
+            <a:off x="889814" y="1633989"/>
+            <a:ext cx="7071337" cy="4625599"/>
+          </a:xfrm>
+          <a:prstGeom prst="rect">
+            <a:avLst/>
+          </a:prstGeom>
+        </p:spPr>
+      </p:pic>
+    </p:spTree>
+    <p:extLst>
+      <p:ext uri="{BB962C8B-B14F-4D97-AF65-F5344CB8AC3E}">
+        <p14:creationId xmlns:p14="http://schemas.microsoft.com/office/powerpoint/2010/main" val="1861020769"/>
+      </p:ext>
+    </p:extLst>
+  </p:cSld>
+  <p:clrMapOvr>
+    <a:masterClrMapping/>
+  </p:clrMapOvr>
+  <p:timing>
+    <p:tnLst>
+      <p:par>
+        <p:cTn id="1" dur="indefinite" restart="never" nodeType="tmRoot">
+          <p:childTnLst>
+            <p:seq concurrent="1" nextAc="seek">
+              <p:cTn id="2" dur="indefinite" nodeType="mainSeq">
+                <p:childTnLst>
+                  <p:par>
+                    <p:cTn id="3" fill="hold">
+                      <p:stCondLst>
+                        <p:cond delay="indefinite"/>
+                      </p:stCondLst>
+                      <p:childTnLst>
+                        <p:par>
+                          <p:cTn id="4" fill="hold">
+                            <p:stCondLst>
+                              <p:cond delay="0"/>
+                            </p:stCondLst>
+                            <p:childTnLst>
+                              <p:par>
+                                <p:cTn id="5" presetID="1" presetClass="entr" presetSubtype="0" fill="hold" nodeType="clickEffect">
+                                  <p:stCondLst>
+                                    <p:cond delay="0"/>
+                                  </p:stCondLst>
+                                  <p:childTnLst>
+                                    <p:set>
+                                      <p:cBhvr>
+                                        <p:cTn id="6" dur="1" fill="hold">
+                                          <p:stCondLst>
+                                            <p:cond delay="0"/>
+                                          </p:stCondLst>
+                                        </p:cTn>
+                                        <p:tgtEl>
+                                          <p:spTgt spid="3"/>
+                                        </p:tgtEl>
+                                        <p:attrNameLst>
+                                          <p:attrName>style.visibility</p:attrName>
+                                        </p:attrNameLst>
+                                      </p:cBhvr>
+                                      <p:to>
+                                        <p:strVal val="visible"/>
+                                      </p:to>
+                                    </p:set>
+                                  </p:childTnLst>
+                                </p:cTn>
+                              </p:par>
+                            </p:childTnLst>
+                          </p:cTn>
+                        </p:par>
+                      </p:childTnLst>
+                    </p:cTn>
+                  </p:par>
+                </p:childTnLst>
+              </p:cTn>
+              <p:prevCondLst>
+                <p:cond evt="onPrev" delay="0">
+                  <p:tgtEl>
+                    <p:sldTgt/>
+                  </p:tgtEl>
+                </p:cond>
+              </p:prevCondLst>
+              <p:nextCondLst>
+                <p:cond evt="onNext" delay="0">
+                  <p:tgtEl>
+                    <p:sldTgt/>
+                  </p:tgtEl>
+                </p:cond>
+              </p:nextCondLst>
+            </p:seq>
+          </p:childTnLst>
+        </p:cTn>
+      </p:par>
+    </p:tnLst>
+  </p:timing>
+</p:sld>
+</file>
+
+<file path=ppt/slides/slide17.xml><?xml version="1.0" encoding="utf-8"?>
+<p:sld xmlns:a="http://schemas.openxmlformats.org/drawingml/2006/main" xmlns:r="http://schemas.openxmlformats.org/officeDocument/2006/relationships" xmlns:p="http://schemas.openxmlformats.org/presentationml/2006/main">
+  <p:cSld>
+    <p:spTree>
+      <p:nvGrpSpPr>
+        <p:cNvPr id="1" name=""/>
+        <p:cNvGrpSpPr/>
+        <p:nvPr/>
+      </p:nvGrpSpPr>
+      <p:grpSpPr>
+        <a:xfrm>
+          <a:off x="0" y="0"/>
+          <a:ext cx="0" cy="0"/>
+          <a:chOff x="0" y="0"/>
+          <a:chExt cx="0" cy="0"/>
+        </a:xfrm>
+      </p:grpSpPr>
+      <p:sp>
+        <p:nvSpPr>
+          <p:cNvPr id="2" name="Text Placeholder 1"/>
+          <p:cNvSpPr>
+            <a:spLocks noGrp="1"/>
+          </p:cNvSpPr>
+          <p:nvPr>
+            <p:ph type="body" sz="quarter" idx="11"/>
+          </p:nvPr>
+        </p:nvSpPr>
+        <p:spPr>
+          <a:xfrm>
+            <a:off x="202777" y="1146157"/>
+            <a:ext cx="8714719" cy="5573423"/>
+          </a:xfrm>
+          <a:solidFill>
+            <a:schemeClr val="tx1"/>
+          </a:solidFill>
+        </p:spPr>
+        <p:txBody>
+          <a:bodyPr/>
+          <a:lstStyle/>
+          <a:p>
+            <a:r>
+              <a:rPr lang="en-US" sz="1800" dirty="0" smtClean="0">
+                <a:solidFill>
+                  <a:schemeClr val="bg1"/>
+                </a:solidFill>
+              </a:rPr>
+              <a:t>Return null </a:t>
+            </a:r>
+            <a:r>
+              <a:rPr lang="en-US" sz="1800" dirty="0">
+                <a:solidFill>
+                  <a:schemeClr val="bg1"/>
+                </a:solidFill>
+              </a:rPr>
+              <a:t>functional approach </a:t>
+            </a:r>
+            <a:r>
+              <a:rPr lang="en-US" sz="1800" dirty="0" smtClean="0">
+                <a:solidFill>
+                  <a:schemeClr val="bg1"/>
+                </a:solidFill>
+              </a:rPr>
+              <a:t>from client</a:t>
+            </a:r>
+            <a:r>
+              <a:rPr lang="mr-IN" sz="1800" dirty="0" smtClean="0">
+                <a:solidFill>
+                  <a:schemeClr val="bg1"/>
+                </a:solidFill>
+              </a:rPr>
+              <a:t>…</a:t>
+            </a:r>
+            <a:endParaRPr lang="en-US" sz="1800" dirty="0" smtClean="0">
+              <a:solidFill>
+                <a:schemeClr val="bg1"/>
+              </a:solidFill>
+            </a:endParaRPr>
+          </a:p>
+        </p:txBody>
+      </p:sp>
+      <p:sp>
+        <p:nvSpPr>
+          <p:cNvPr id="10" name="TextBox 9"/>
+          <p:cNvSpPr txBox="1"/>
+          <p:nvPr/>
+        </p:nvSpPr>
+        <p:spPr>
+          <a:xfrm>
+            <a:off x="696286" y="4919161"/>
+            <a:ext cx="2262799" cy="369332"/>
+          </a:xfrm>
+          <a:prstGeom prst="rect">
+            <a:avLst/>
+          </a:prstGeom>
+          <a:noFill/>
+        </p:spPr>
+        <p:txBody>
+          <a:bodyPr wrap="none" rtlCol="0">
+            <a:spAutoFit/>
+          </a:bodyPr>
+          <a:lstStyle/>
+          <a:p>
+            <a:r>
+              <a:rPr lang="en-US" dirty="0" smtClean="0">
+                <a:solidFill>
+                  <a:schemeClr val="bg1"/>
+                </a:solidFill>
+              </a:rPr>
+              <a:t>Using maybe monad</a:t>
+            </a:r>
+            <a:r>
+              <a:rPr lang="mr-IN" dirty="0" smtClean="0">
+                <a:solidFill>
+                  <a:schemeClr val="bg1"/>
+                </a:solidFill>
+              </a:rPr>
+              <a:t>…</a:t>
+            </a:r>
+            <a:endParaRPr lang="en-US" dirty="0">
+              <a:solidFill>
+                <a:schemeClr val="bg1"/>
+              </a:solidFill>
+            </a:endParaRPr>
+          </a:p>
+        </p:txBody>
+      </p:sp>
+      <p:sp>
+        <p:nvSpPr>
+          <p:cNvPr id="11" name="TextBox 10"/>
+          <p:cNvSpPr txBox="1"/>
+          <p:nvPr/>
+        </p:nvSpPr>
+        <p:spPr>
+          <a:xfrm>
+            <a:off x="696286" y="5379273"/>
+            <a:ext cx="2645468" cy="369332"/>
+          </a:xfrm>
+          <a:prstGeom prst="rect">
+            <a:avLst/>
+          </a:prstGeom>
+          <a:noFill/>
+        </p:spPr>
+        <p:txBody>
+          <a:bodyPr wrap="none" rtlCol="0">
+            <a:spAutoFit/>
+          </a:bodyPr>
+          <a:lstStyle/>
+          <a:p>
+            <a:r>
+              <a:rPr lang="mr-IN" dirty="0" smtClean="0">
+                <a:solidFill>
+                  <a:schemeClr val="bg1"/>
+                </a:solidFill>
+              </a:rPr>
+              <a:t>…</a:t>
+            </a:r>
+            <a:r>
+              <a:rPr lang="en-GB" dirty="0" smtClean="0">
+                <a:solidFill>
+                  <a:schemeClr val="bg1"/>
+                </a:solidFill>
+              </a:rPr>
+              <a:t> we remove the IF and </a:t>
+            </a:r>
+            <a:r>
+              <a:rPr lang="mr-IN" dirty="0" smtClean="0">
+                <a:solidFill>
+                  <a:schemeClr val="bg1"/>
+                </a:solidFill>
+              </a:rPr>
+              <a:t>…</a:t>
+            </a:r>
+            <a:endParaRPr lang="en-US" dirty="0">
+              <a:solidFill>
+                <a:schemeClr val="bg1"/>
+              </a:solidFill>
+            </a:endParaRPr>
+          </a:p>
+        </p:txBody>
+      </p:sp>
+      <p:sp>
+        <p:nvSpPr>
+          <p:cNvPr id="12" name="TextBox 11"/>
+          <p:cNvSpPr txBox="1"/>
+          <p:nvPr/>
+        </p:nvSpPr>
+        <p:spPr>
+          <a:xfrm>
+            <a:off x="696286" y="5748605"/>
+            <a:ext cx="1922065" cy="369332"/>
+          </a:xfrm>
+          <a:prstGeom prst="rect">
+            <a:avLst/>
+          </a:prstGeom>
+          <a:noFill/>
+        </p:spPr>
+        <p:txBody>
+          <a:bodyPr wrap="none" rtlCol="0">
+            <a:spAutoFit/>
+          </a:bodyPr>
+          <a:lstStyle/>
+          <a:p>
+            <a:r>
+              <a:rPr lang="mr-IN" dirty="0" smtClean="0">
+                <a:solidFill>
+                  <a:schemeClr val="bg1"/>
+                </a:solidFill>
+              </a:rPr>
+              <a:t>…</a:t>
+            </a:r>
+            <a:r>
+              <a:rPr lang="en-GB" dirty="0" smtClean="0">
+                <a:solidFill>
+                  <a:schemeClr val="bg1"/>
+                </a:solidFill>
+              </a:rPr>
+              <a:t>the code is SAFE</a:t>
+            </a:r>
+            <a:endParaRPr lang="en-US" dirty="0">
+              <a:solidFill>
+                <a:schemeClr val="bg1"/>
+              </a:solidFill>
+            </a:endParaRPr>
+          </a:p>
+        </p:txBody>
+      </p:sp>
+      <p:pic>
+        <p:nvPicPr>
+          <p:cNvPr id="3" name="Picture 2"/>
+          <p:cNvPicPr>
+            <a:picLocks noChangeAspect="1"/>
+          </p:cNvPicPr>
+          <p:nvPr/>
+        </p:nvPicPr>
+        <p:blipFill>
+          <a:blip r:embed="rId3">
+            <a:extLst>
+              <a:ext uri="{28A0092B-C50C-407E-A947-70E740481C1C}">
+                <a14:useLocalDpi xmlns:a14="http://schemas.microsoft.com/office/drawing/2010/main" val="0"/>
+              </a:ext>
+            </a:extLst>
+          </a:blip>
+          <a:stretch>
+            <a:fillRect/>
+          </a:stretch>
+        </p:blipFill>
+        <p:spPr>
+          <a:xfrm>
+            <a:off x="696286" y="1942265"/>
+            <a:ext cx="7340600" cy="2628900"/>
+          </a:xfrm>
+          <a:prstGeom prst="rect">
+            <a:avLst/>
+          </a:prstGeom>
+        </p:spPr>
+      </p:pic>
+    </p:spTree>
+    <p:extLst>
+      <p:ext uri="{BB962C8B-B14F-4D97-AF65-F5344CB8AC3E}">
+        <p14:creationId xmlns:p14="http://schemas.microsoft.com/office/powerpoint/2010/main" val="1221892594"/>
+      </p:ext>
+    </p:extLst>
+  </p:cSld>
+  <p:clrMapOvr>
+    <a:masterClrMapping/>
+  </p:clrMapOvr>
+  <p:timing>
+    <p:tnLst>
+      <p:par>
+        <p:cTn id="1" dur="indefinite" restart="never" nodeType="tmRoot">
+          <p:childTnLst>
+            <p:seq concurrent="1" nextAc="seek">
+              <p:cTn id="2" dur="indefinite" nodeType="mainSeq">
+                <p:childTnLst>
+                  <p:par>
+                    <p:cTn id="3" fill="hold">
+                      <p:stCondLst>
+                        <p:cond delay="indefinite"/>
+                      </p:stCondLst>
+                      <p:childTnLst>
+                        <p:par>
+                          <p:cTn id="4" fill="hold">
+                            <p:stCondLst>
+                              <p:cond delay="0"/>
+                            </p:stCondLst>
+                            <p:childTnLst>
+                              <p:par>
+                                <p:cTn id="5" presetID="1" presetClass="entr" presetSubtype="0" fill="hold" nodeType="clickEffect">
+                                  <p:stCondLst>
+                                    <p:cond delay="0"/>
+                                  </p:stCondLst>
+                                  <p:childTnLst>
+                                    <p:set>
+                                      <p:cBhvr>
+                                        <p:cTn id="6" dur="1" fill="hold">
+                                          <p:stCondLst>
+                                            <p:cond delay="0"/>
+                                          </p:stCondLst>
+                                        </p:cTn>
+                                        <p:tgtEl>
+                                          <p:spTgt spid="3"/>
+                                        </p:tgtEl>
+                                        <p:attrNameLst>
+                                          <p:attrName>style.visibility</p:attrName>
+                                        </p:attrNameLst>
+                                      </p:cBhvr>
+                                      <p:to>
+                                        <p:strVal val="visible"/>
+                                      </p:to>
+                                    </p:set>
+                                  </p:childTnLst>
+                                </p:cTn>
+                              </p:par>
+                            </p:childTnLst>
+                          </p:cTn>
+                        </p:par>
+                      </p:childTnLst>
+                    </p:cTn>
+                  </p:par>
+                  <p:par>
+                    <p:cTn id="7" fill="hold">
+                      <p:stCondLst>
+                        <p:cond delay="indefinite"/>
+                      </p:stCondLst>
+                      <p:childTnLst>
+                        <p:par>
+                          <p:cTn id="8" fill="hold">
+                            <p:stCondLst>
+                              <p:cond delay="0"/>
+                            </p:stCondLst>
+                            <p:childTnLst>
+                              <p:par>
+                                <p:cTn id="9" presetID="1" presetClass="entr" presetSubtype="0" fill="hold" grpId="0" nodeType="clickEffect">
+                                  <p:stCondLst>
+                                    <p:cond delay="0"/>
+                                  </p:stCondLst>
+                                  <p:childTnLst>
+                                    <p:set>
+                                      <p:cBhvr>
+                                        <p:cTn id="10" dur="1" fill="hold">
+                                          <p:stCondLst>
+                                            <p:cond delay="0"/>
+                                          </p:stCondLst>
+                                        </p:cTn>
+                                        <p:tgtEl>
+                                          <p:spTgt spid="10"/>
+                                        </p:tgtEl>
+                                        <p:attrNameLst>
+                                          <p:attrName>style.visibility</p:attrName>
+                                        </p:attrNameLst>
+                                      </p:cBhvr>
+                                      <p:to>
+                                        <p:strVal val="visible"/>
+                                      </p:to>
+                                    </p:set>
+                                  </p:childTnLst>
+                                </p:cTn>
+                              </p:par>
+                            </p:childTnLst>
+                          </p:cTn>
+                        </p:par>
+                      </p:childTnLst>
+                    </p:cTn>
+                  </p:par>
+                  <p:par>
+                    <p:cTn id="11" fill="hold">
+                      <p:stCondLst>
+                        <p:cond delay="indefinite"/>
+                      </p:stCondLst>
+                      <p:childTnLst>
+                        <p:par>
+                          <p:cTn id="12" fill="hold">
+                            <p:stCondLst>
+                              <p:cond delay="0"/>
+                            </p:stCondLst>
+                            <p:childTnLst>
+                              <p:par>
+                                <p:cTn id="13" presetID="1" presetClass="entr" presetSubtype="0" fill="hold" grpId="0" nodeType="clickEffect">
+                                  <p:stCondLst>
+                                    <p:cond delay="0"/>
+                                  </p:stCondLst>
+                                  <p:childTnLst>
+                                    <p:set>
+                                      <p:cBhvr>
+                                        <p:cTn id="14" dur="1" fill="hold">
+                                          <p:stCondLst>
+                                            <p:cond delay="0"/>
+                                          </p:stCondLst>
+                                        </p:cTn>
+                                        <p:tgtEl>
+                                          <p:spTgt spid="11"/>
+                                        </p:tgtEl>
+                                        <p:attrNameLst>
+                                          <p:attrName>style.visibility</p:attrName>
+                                        </p:attrNameLst>
+                                      </p:cBhvr>
+                                      <p:to>
+                                        <p:strVal val="visible"/>
+                                      </p:to>
+                                    </p:set>
+                                  </p:childTnLst>
+                                </p:cTn>
+                              </p:par>
+                            </p:childTnLst>
+                          </p:cTn>
+                        </p:par>
+                      </p:childTnLst>
+                    </p:cTn>
+                  </p:par>
+                  <p:par>
+                    <p:cTn id="15" fill="hold">
+                      <p:stCondLst>
+                        <p:cond delay="indefinite"/>
+                      </p:stCondLst>
+                      <p:childTnLst>
+                        <p:par>
+                          <p:cTn id="16" fill="hold">
+                            <p:stCondLst>
+                              <p:cond delay="0"/>
+                            </p:stCondLst>
+                            <p:childTnLst>
+                              <p:par>
+                                <p:cTn id="17" presetID="1" presetClass="entr" presetSubtype="0" fill="hold" grpId="0" nodeType="clickEffect">
+                                  <p:stCondLst>
+                                    <p:cond delay="0"/>
+                                  </p:stCondLst>
+                                  <p:childTnLst>
+                                    <p:set>
+                                      <p:cBhvr>
+                                        <p:cTn id="18" dur="1" fill="hold">
+                                          <p:stCondLst>
+                                            <p:cond delay="0"/>
+                                          </p:stCondLst>
+                                        </p:cTn>
+                                        <p:tgtEl>
+                                          <p:spTgt spid="12"/>
+                                        </p:tgtEl>
+                                        <p:attrNameLst>
+                                          <p:attrName>style.visibility</p:attrName>
+                                        </p:attrNameLst>
+                                      </p:cBhvr>
+                                      <p:to>
+                                        <p:strVal val="visible"/>
+                                      </p:to>
+                                    </p:set>
+                                  </p:childTnLst>
+                                </p:cTn>
+                              </p:par>
+                            </p:childTnLst>
+                          </p:cTn>
+                        </p:par>
+                      </p:childTnLst>
+                    </p:cTn>
+                  </p:par>
+                </p:childTnLst>
+              </p:cTn>
+              <p:prevCondLst>
+                <p:cond evt="onPrev" delay="0">
+                  <p:tgtEl>
+                    <p:sldTgt/>
+                  </p:tgtEl>
+                </p:cond>
+              </p:prevCondLst>
+              <p:nextCondLst>
+                <p:cond evt="onNext" delay="0">
+                  <p:tgtEl>
+                    <p:sldTgt/>
+                  </p:tgtEl>
+                </p:cond>
+              </p:nextCondLst>
+            </p:seq>
+          </p:childTnLst>
+        </p:cTn>
+      </p:par>
+    </p:tnLst>
+    <p:bldLst>
+      <p:bldP spid="10" grpId="0"/>
+      <p:bldP spid="11" grpId="0"/>
+      <p:bldP spid="12" grpId="0"/>
+    </p:bldLst>
+  </p:timing>
+</p:sld>
+</file>
+
+<file path=ppt/slides/slide18.xml><?xml version="1.0" encoding="utf-8"?>
 <p:sld xmlns:a="http://schemas.openxmlformats.org/drawingml/2006/main" xmlns:r="http://schemas.openxmlformats.org/officeDocument/2006/relationships" xmlns:p="http://schemas.openxmlformats.org/presentationml/2006/main">
   <p:cSld>
     <p:spTree>
@@ -7065,6 +8491,165 @@
 </file>
 
 <file path=ppt/slides/slide7.xml><?xml version="1.0" encoding="utf-8"?>
+<p:sld xmlns:a="http://schemas.openxmlformats.org/drawingml/2006/main" xmlns:r="http://schemas.openxmlformats.org/officeDocument/2006/relationships" xmlns:p="http://schemas.openxmlformats.org/presentationml/2006/main">
+  <p:cSld>
+    <p:spTree>
+      <p:nvGrpSpPr>
+        <p:cNvPr id="1" name=""/>
+        <p:cNvGrpSpPr/>
+        <p:nvPr/>
+      </p:nvGrpSpPr>
+      <p:grpSpPr>
+        <a:xfrm>
+          <a:off x="0" y="0"/>
+          <a:ext cx="0" cy="0"/>
+          <a:chOff x="0" y="0"/>
+          <a:chExt cx="0" cy="0"/>
+        </a:xfrm>
+      </p:grpSpPr>
+      <p:sp>
+        <p:nvSpPr>
+          <p:cNvPr id="2" name="Text Placeholder 1"/>
+          <p:cNvSpPr>
+            <a:spLocks noGrp="1"/>
+          </p:cNvSpPr>
+          <p:nvPr>
+            <p:ph type="body" sz="quarter" idx="11"/>
+          </p:nvPr>
+        </p:nvSpPr>
+        <p:spPr>
+          <a:xfrm>
+            <a:off x="328613" y="1079047"/>
+            <a:ext cx="8401246" cy="485802"/>
+          </a:xfrm>
+        </p:spPr>
+        <p:txBody>
+          <a:bodyPr/>
+          <a:lstStyle/>
+          <a:p>
+            <a:r>
+              <a:rPr lang="en-US" sz="2400" dirty="0"/>
+              <a:t>What I will speak and coding of </a:t>
+            </a:r>
+            <a:r>
+              <a:rPr lang="mr-IN" sz="2400" dirty="0" smtClean="0"/>
+              <a:t>…</a:t>
+            </a:r>
+            <a:endParaRPr lang="en-US" sz="2400" dirty="0" smtClean="0"/>
+          </a:p>
+          <a:p>
+            <a:endParaRPr lang="en-US" sz="1800" dirty="0" smtClean="0"/>
+          </a:p>
+          <a:p>
+            <a:endParaRPr lang="en-US" sz="1800" dirty="0" smtClean="0"/>
+          </a:p>
+        </p:txBody>
+      </p:sp>
+      <p:sp>
+        <p:nvSpPr>
+          <p:cNvPr id="5" name="TextBox 4"/>
+          <p:cNvSpPr txBox="1"/>
+          <p:nvPr/>
+        </p:nvSpPr>
+        <p:spPr>
+          <a:xfrm>
+            <a:off x="621372" y="1501213"/>
+            <a:ext cx="8210747" cy="1815882"/>
+          </a:xfrm>
+          <a:prstGeom prst="rect">
+            <a:avLst/>
+          </a:prstGeom>
+          <a:noFill/>
+        </p:spPr>
+        <p:txBody>
+          <a:bodyPr wrap="square" rtlCol="0">
+            <a:spAutoFit/>
+          </a:bodyPr>
+          <a:lstStyle/>
+          <a:p>
+            <a:endParaRPr lang="en-GB" sz="1600" u="sng" dirty="0" smtClean="0">
+              <a:latin typeface="Chronicle Display" pitchFamily="50" charset="0"/>
+            </a:endParaRPr>
+          </a:p>
+          <a:p>
+            <a:endParaRPr lang="en-GB" sz="1600" u="sng" dirty="0">
+              <a:latin typeface="Chronicle Display" pitchFamily="50" charset="0"/>
+            </a:endParaRPr>
+          </a:p>
+          <a:p>
+            <a:pPr marL="285750" indent="-285750">
+              <a:buFontTx/>
+              <a:buChar char="-"/>
+            </a:pPr>
+            <a:r>
+              <a:rPr lang="en-GB" sz="1600" b="1" dirty="0" smtClean="0">
+                <a:latin typeface="Chronicle Display" pitchFamily="50" charset="0"/>
+              </a:rPr>
+              <a:t>Singleton</a:t>
+            </a:r>
+          </a:p>
+          <a:p>
+            <a:pPr marL="285750" indent="-285750">
+              <a:buFontTx/>
+              <a:buChar char="-"/>
+            </a:pPr>
+            <a:endParaRPr lang="en-GB" sz="1600" dirty="0">
+              <a:latin typeface="Chronicle Display" pitchFamily="50" charset="0"/>
+            </a:endParaRPr>
+          </a:p>
+          <a:p>
+            <a:pPr marL="285750" indent="-285750">
+              <a:buFontTx/>
+              <a:buChar char="-"/>
+            </a:pPr>
+            <a:r>
+              <a:rPr lang="en-GB" sz="1600" b="1" dirty="0" smtClean="0">
+                <a:latin typeface="Chronicle Display" pitchFamily="50" charset="0"/>
+              </a:rPr>
+              <a:t>Return null</a:t>
+            </a:r>
+          </a:p>
+          <a:p>
+            <a:pPr marL="285750" indent="-285750">
+              <a:buFontTx/>
+              <a:buChar char="-"/>
+            </a:pPr>
+            <a:endParaRPr lang="en-GB" sz="1600" dirty="0">
+              <a:latin typeface="Chronicle Display" pitchFamily="50" charset="0"/>
+            </a:endParaRPr>
+          </a:p>
+          <a:p>
+            <a:pPr marL="285750" indent="-285750">
+              <a:buFontTx/>
+              <a:buChar char="-"/>
+            </a:pPr>
+            <a:endParaRPr lang="en-GB" sz="1600" dirty="0" smtClean="0">
+              <a:latin typeface="Chronicle Display" pitchFamily="50" charset="0"/>
+            </a:endParaRPr>
+          </a:p>
+        </p:txBody>
+      </p:sp>
+    </p:spTree>
+    <p:extLst>
+      <p:ext uri="{BB962C8B-B14F-4D97-AF65-F5344CB8AC3E}">
+        <p14:creationId xmlns:p14="http://schemas.microsoft.com/office/powerpoint/2010/main" val="526084853"/>
+      </p:ext>
+    </p:extLst>
+  </p:cSld>
+  <p:clrMapOvr>
+    <a:masterClrMapping/>
+  </p:clrMapOvr>
+  <p:timing>
+    <p:tnLst>
+      <p:par>
+        <p:cTn id="1" dur="indefinite" restart="never" nodeType="tmRoot"/>
+      </p:par>
+    </p:tnLst>
+  </p:timing>
+</p:sld>
+</file>
+
+<file path=ppt/slides/slide8.xml><?xml version="1.0" encoding="utf-8"?>
 <p:sld xmlns:a="http://schemas.openxmlformats.org/drawingml/2006/main" xmlns:r="http://schemas.openxmlformats.org/officeDocument/2006/relationships" xmlns:p="http://schemas.openxmlformats.org/presentationml/2006/main">
   <p:cSld>
     <p:spTree>
@@ -7334,7 +8919,7 @@
 </p:sld>
 </file>
 
-<file path=ppt/slides/slide8.xml><?xml version="1.0" encoding="utf-8"?>
+<file path=ppt/slides/slide9.xml><?xml version="1.0" encoding="utf-8"?>
 <p:sld xmlns:a="http://schemas.openxmlformats.org/drawingml/2006/main" xmlns:r="http://schemas.openxmlformats.org/officeDocument/2006/relationships" xmlns:p="http://schemas.openxmlformats.org/presentationml/2006/main">
   <p:cSld>
     <p:spTree>
@@ -7821,128 +9406,6 @@
       <p:bldP spid="6" grpId="0"/>
       <p:bldP spid="10" grpId="0"/>
     </p:bldLst>
-  </p:timing>
-</p:sld>
-</file>
-
-<file path=ppt/slides/slide9.xml><?xml version="1.0" encoding="utf-8"?>
-<p:sld xmlns:a="http://schemas.openxmlformats.org/drawingml/2006/main" xmlns:r="http://schemas.openxmlformats.org/officeDocument/2006/relationships" xmlns:p="http://schemas.openxmlformats.org/presentationml/2006/main">
-  <p:cSld>
-    <p:spTree>
-      <p:nvGrpSpPr>
-        <p:cNvPr id="1" name=""/>
-        <p:cNvGrpSpPr/>
-        <p:nvPr/>
-      </p:nvGrpSpPr>
-      <p:grpSpPr>
-        <a:xfrm>
-          <a:off x="0" y="0"/>
-          <a:ext cx="0" cy="0"/>
-          <a:chOff x="0" y="0"/>
-          <a:chExt cx="0" cy="0"/>
-        </a:xfrm>
-      </p:grpSpPr>
-      <p:sp>
-        <p:nvSpPr>
-          <p:cNvPr id="2" name="Text Placeholder 1"/>
-          <p:cNvSpPr>
-            <a:spLocks noGrp="1"/>
-          </p:cNvSpPr>
-          <p:nvPr>
-            <p:ph type="body" sz="quarter" idx="11"/>
-          </p:nvPr>
-        </p:nvSpPr>
-        <p:spPr>
-          <a:xfrm>
-            <a:off x="328613" y="1079046"/>
-            <a:ext cx="8401246" cy="5573423"/>
-          </a:xfrm>
-          <a:solidFill>
-            <a:schemeClr val="tx1"/>
-          </a:solidFill>
-        </p:spPr>
-        <p:txBody>
-          <a:bodyPr/>
-          <a:lstStyle/>
-          <a:p>
-            <a:r>
-              <a:rPr lang="en-US" sz="1800" dirty="0" smtClean="0">
-                <a:solidFill>
-                  <a:schemeClr val="bg1"/>
-                </a:solidFill>
-              </a:rPr>
-              <a:t>Singleton</a:t>
-            </a:r>
-            <a:r>
-              <a:rPr lang="en-US" sz="1800" dirty="0">
-                <a:solidFill>
-                  <a:schemeClr val="bg1"/>
-                </a:solidFill>
-              </a:rPr>
-              <a:t> </a:t>
-            </a:r>
-            <a:r>
-              <a:rPr lang="en-US" sz="1800" dirty="0" smtClean="0">
-                <a:solidFill>
-                  <a:schemeClr val="bg1"/>
-                </a:solidFill>
-              </a:rPr>
-              <a:t>revisited</a:t>
-            </a:r>
-            <a:endParaRPr lang="en-US" sz="1800" dirty="0" smtClean="0">
-              <a:solidFill>
-                <a:schemeClr val="bg1"/>
-              </a:solidFill>
-            </a:endParaRPr>
-          </a:p>
-        </p:txBody>
-      </p:sp>
-      <p:pic>
-        <p:nvPicPr>
-          <p:cNvPr id="3" name="Picture 2"/>
-          <p:cNvPicPr>
-            <a:picLocks noChangeAspect="1"/>
-          </p:cNvPicPr>
-          <p:nvPr/>
-        </p:nvPicPr>
-        <p:blipFill>
-          <a:blip r:embed="rId3">
-            <a:extLst>
-              <a:ext uri="{28A0092B-C50C-407E-A947-70E740481C1C}">
-                <a14:useLocalDpi xmlns:a14="http://schemas.microsoft.com/office/drawing/2010/main" val="0"/>
-              </a:ext>
-            </a:extLst>
-          </a:blip>
-          <a:stretch>
-            <a:fillRect/>
-          </a:stretch>
-        </p:blipFill>
-        <p:spPr>
-          <a:xfrm>
-            <a:off x="2611345" y="1180146"/>
-            <a:ext cx="3982402" cy="5371222"/>
-          </a:xfrm>
-          <a:prstGeom prst="rect">
-            <a:avLst/>
-          </a:prstGeom>
-        </p:spPr>
-      </p:pic>
-    </p:spTree>
-    <p:extLst>
-      <p:ext uri="{BB962C8B-B14F-4D97-AF65-F5344CB8AC3E}">
-        <p14:creationId xmlns:p14="http://schemas.microsoft.com/office/powerpoint/2010/main" val="1493767243"/>
-      </p:ext>
-    </p:extLst>
-  </p:cSld>
-  <p:clrMapOvr>
-    <a:masterClrMapping/>
-  </p:clrMapOvr>
-  <p:timing>
-    <p:tnLst>
-      <p:par>
-        <p:cTn id="1" dur="indefinite" restart="never" nodeType="tmRoot"/>
-      </p:par>
-    </p:tnLst>
   </p:timing>
 </p:sld>
 </file>

</xml_diff>